<commit_message>
Updating my slides slightly. more on monday
</commit_message>
<xml_diff>
--- a/PMLG talk.pptx
+++ b/PMLG talk.pptx
@@ -159,7 +159,7 @@
 <file path=ppt/revisionInfo.xml><?xml version="1.0" encoding="utf-8"?>
 <p1510:revInfo xmlns:a="http://schemas.openxmlformats.org/drawingml/2006/main" xmlns:r="http://schemas.openxmlformats.org/officeDocument/2006/relationships" xmlns:p1510="http://schemas.microsoft.com/office/powerpoint/2015/10/main">
   <p1510:revLst>
-    <p1510:client id="{80D561A8-B16A-4DB0-ADD0-1D4EA6CA7967}" v="51" dt="2023-06-16T06:55:56.150"/>
+    <p1510:client id="{80D561A8-B16A-4DB0-ADD0-1D4EA6CA7967}" v="145" dt="2023-06-17T13:03:55.395"/>
   </p1510:revLst>
 </p1510:revInfo>
 </file>
@@ -169,7 +169,7 @@
   <pc:docChgLst>
     <pc:chgData name="Philipp Bayer" userId="f1ce6f2d-d6ba-4d38-8b9a-d25f69ad1513" providerId="ADAL" clId="{80D561A8-B16A-4DB0-ADD0-1D4EA6CA7967}"/>
     <pc:docChg chg="undo custSel addSld delSld modSld">
-      <pc:chgData name="Philipp Bayer" userId="f1ce6f2d-d6ba-4d38-8b9a-d25f69ad1513" providerId="ADAL" clId="{80D561A8-B16A-4DB0-ADD0-1D4EA6CA7967}" dt="2023-06-16T07:02:49.306" v="409" actId="20577"/>
+      <pc:chgData name="Philipp Bayer" userId="f1ce6f2d-d6ba-4d38-8b9a-d25f69ad1513" providerId="ADAL" clId="{80D561A8-B16A-4DB0-ADD0-1D4EA6CA7967}" dt="2023-06-17T13:04:10.292" v="516" actId="14100"/>
       <pc:docMkLst>
         <pc:docMk/>
       </pc:docMkLst>
@@ -187,6 +187,37 @@
             <ac:spMk id="2" creationId="{A9C2B54C-EA22-B51A-3E76-7B71114D1D8C}"/>
           </ac:spMkLst>
         </pc:spChg>
+      </pc:sldChg>
+      <pc:sldChg chg="addSp delSp modSp mod modAnim">
+        <pc:chgData name="Philipp Bayer" userId="f1ce6f2d-d6ba-4d38-8b9a-d25f69ad1513" providerId="ADAL" clId="{80D561A8-B16A-4DB0-ADD0-1D4EA6CA7967}" dt="2023-06-17T13:04:10.292" v="516" actId="14100"/>
+        <pc:sldMkLst>
+          <pc:docMk/>
+          <pc:sldMk cId="2404152885" sldId="281"/>
+        </pc:sldMkLst>
+        <pc:spChg chg="add mod">
+          <ac:chgData name="Philipp Bayer" userId="f1ce6f2d-d6ba-4d38-8b9a-d25f69ad1513" providerId="ADAL" clId="{80D561A8-B16A-4DB0-ADD0-1D4EA6CA7967}" dt="2023-06-17T13:04:10.292" v="516" actId="14100"/>
+          <ac:spMkLst>
+            <pc:docMk/>
+            <pc:sldMk cId="2404152885" sldId="281"/>
+            <ac:spMk id="5" creationId="{9EDCC85D-1D15-C249-0935-48BA92CFD7C6}"/>
+          </ac:spMkLst>
+        </pc:spChg>
+        <pc:spChg chg="mod">
+          <ac:chgData name="Philipp Bayer" userId="f1ce6f2d-d6ba-4d38-8b9a-d25f69ad1513" providerId="ADAL" clId="{80D561A8-B16A-4DB0-ADD0-1D4EA6CA7967}" dt="2023-06-17T13:03:52.563" v="485" actId="21"/>
+          <ac:spMkLst>
+            <pc:docMk/>
+            <pc:sldMk cId="2404152885" sldId="281"/>
+            <ac:spMk id="8" creationId="{11B93F59-E86F-BB9B-E9F0-9F9F97DAAF6D}"/>
+          </ac:spMkLst>
+        </pc:spChg>
+        <pc:picChg chg="add del mod">
+          <ac:chgData name="Philipp Bayer" userId="f1ce6f2d-d6ba-4d38-8b9a-d25f69ad1513" providerId="ADAL" clId="{80D561A8-B16A-4DB0-ADD0-1D4EA6CA7967}" dt="2023-06-17T13:03:55.394" v="509" actId="1035"/>
+          <ac:picMkLst>
+            <pc:docMk/>
+            <pc:sldMk cId="2404152885" sldId="281"/>
+            <ac:picMk id="1026" creationId="{8AD83AEF-D79C-31B4-42BC-95521827571C}"/>
+          </ac:picMkLst>
+        </pc:picChg>
       </pc:sldChg>
       <pc:sldChg chg="modSp add mod">
         <pc:chgData name="Philipp Bayer" userId="f1ce6f2d-d6ba-4d38-8b9a-d25f69ad1513" providerId="ADAL" clId="{80D561A8-B16A-4DB0-ADD0-1D4EA6CA7967}" dt="2023-06-16T06:56:05.238" v="315" actId="20577"/>
@@ -277,11 +308,19 @@
         </pc:spChg>
       </pc:sldChg>
       <pc:sldChg chg="modSp mod">
-        <pc:chgData name="Philipp Bayer" userId="f1ce6f2d-d6ba-4d38-8b9a-d25f69ad1513" providerId="ADAL" clId="{80D561A8-B16A-4DB0-ADD0-1D4EA6CA7967}" dt="2023-06-16T07:00:49.091" v="343" actId="20577"/>
+        <pc:chgData name="Philipp Bayer" userId="f1ce6f2d-d6ba-4d38-8b9a-d25f69ad1513" providerId="ADAL" clId="{80D561A8-B16A-4DB0-ADD0-1D4EA6CA7967}" dt="2023-06-16T12:38:07.304" v="416" actId="20577"/>
         <pc:sldMkLst>
           <pc:docMk/>
           <pc:sldMk cId="3654797181" sldId="8414"/>
         </pc:sldMkLst>
+        <pc:spChg chg="mod">
+          <ac:chgData name="Philipp Bayer" userId="f1ce6f2d-d6ba-4d38-8b9a-d25f69ad1513" providerId="ADAL" clId="{80D561A8-B16A-4DB0-ADD0-1D4EA6CA7967}" dt="2023-06-16T12:38:07.304" v="416" actId="20577"/>
+          <ac:spMkLst>
+            <pc:docMk/>
+            <pc:sldMk cId="3654797181" sldId="8414"/>
+            <ac:spMk id="8" creationId="{11B93F59-E86F-BB9B-E9F0-9F9F97DAAF6D}"/>
+          </ac:spMkLst>
+        </pc:spChg>
         <pc:spChg chg="mod">
           <ac:chgData name="Philipp Bayer" userId="f1ce6f2d-d6ba-4d38-8b9a-d25f69ad1513" providerId="ADAL" clId="{80D561A8-B16A-4DB0-ADD0-1D4EA6CA7967}" dt="2023-06-16T07:00:49.091" v="343" actId="20577"/>
           <ac:spMkLst>
@@ -413,7 +452,7 @@
           <a:p>
             <a:fld id="{48F0A80C-92E7-DB49-AE63-B2F956E951EE}" type="datetimeFigureOut">
               <a:rPr lang="en-US" smtClean="0"/>
-              <a:t>6/16/2023</a:t>
+              <a:t>6/17/2023</a:t>
             </a:fld>
             <a:endParaRPr lang="en-US"/>
           </a:p>
@@ -606,7 +645,7 @@
           <a:p>
             <a:fld id="{A7440A9C-2DCF-4342-81E6-FCA45242C801}" type="datetimeFigureOut">
               <a:rPr lang="en-US" smtClean="0"/>
-              <a:t>6/16/2023</a:t>
+              <a:t>6/17/2023</a:t>
             </a:fld>
             <a:endParaRPr lang="en-US"/>
           </a:p>
@@ -1548,7 +1587,7 @@
             <a:blip r:embed="rId2">
               <a:extLst>
                 <a:ext uri="{28A0092B-C50C-407E-A947-70E740481C1C}">
-                  <a14:useLocalDpi xmlns:a14="http://schemas.microsoft.com/office/drawing/2010/main" val="0"/>
+                  <a14:useLocalDpi xmlns:a14="http://schemas.microsoft.com/office/drawing/2010/main"/>
                 </a:ext>
                 <a:ext uri="{96DAC541-7B7A-43D3-8B79-37D633B846F1}">
                   <asvg:svgBlip xmlns:asvg="http://schemas.microsoft.com/office/drawing/2016/SVG/main" r:embed="rId3"/>
@@ -2327,7 +2366,7 @@
             <a:blip r:embed="rId2">
               <a:extLst>
                 <a:ext uri="{28A0092B-C50C-407E-A947-70E740481C1C}">
-                  <a14:useLocalDpi xmlns:a14="http://schemas.microsoft.com/office/drawing/2010/main" val="0"/>
+                  <a14:useLocalDpi xmlns:a14="http://schemas.microsoft.com/office/drawing/2010/main"/>
                 </a:ext>
                 <a:ext uri="{96DAC541-7B7A-43D3-8B79-37D633B846F1}">
                   <asvg:svgBlip xmlns:asvg="http://schemas.microsoft.com/office/drawing/2016/SVG/main" r:embed="rId3"/>
@@ -2814,7 +2853,7 @@
             <a:blip r:embed="rId2">
               <a:extLst>
                 <a:ext uri="{28A0092B-C50C-407E-A947-70E740481C1C}">
-                  <a14:useLocalDpi xmlns:a14="http://schemas.microsoft.com/office/drawing/2010/main" val="0"/>
+                  <a14:useLocalDpi xmlns:a14="http://schemas.microsoft.com/office/drawing/2010/main"/>
                 </a:ext>
                 <a:ext uri="{96DAC541-7B7A-43D3-8B79-37D633B846F1}">
                   <asvg:svgBlip xmlns:asvg="http://schemas.microsoft.com/office/drawing/2016/SVG/main" r:embed="rId3"/>
@@ -3483,7 +3522,7 @@
             <a:blip r:embed="rId2">
               <a:extLst>
                 <a:ext uri="{28A0092B-C50C-407E-A947-70E740481C1C}">
-                  <a14:useLocalDpi xmlns:a14="http://schemas.microsoft.com/office/drawing/2010/main" val="0"/>
+                  <a14:useLocalDpi xmlns:a14="http://schemas.microsoft.com/office/drawing/2010/main"/>
                 </a:ext>
                 <a:ext uri="{96DAC541-7B7A-43D3-8B79-37D633B846F1}">
                   <asvg:svgBlip xmlns:asvg="http://schemas.microsoft.com/office/drawing/2016/SVG/main" r:embed="rId3"/>
@@ -6091,7 +6130,7 @@
             <a:blip r:embed="rId2">
               <a:extLst>
                 <a:ext uri="{28A0092B-C50C-407E-A947-70E740481C1C}">
-                  <a14:useLocalDpi xmlns:a14="http://schemas.microsoft.com/office/drawing/2010/main" val="0"/>
+                  <a14:useLocalDpi xmlns:a14="http://schemas.microsoft.com/office/drawing/2010/main"/>
                 </a:ext>
                 <a:ext uri="{96DAC541-7B7A-43D3-8B79-37D633B846F1}">
                   <asvg:svgBlip xmlns:asvg="http://schemas.microsoft.com/office/drawing/2016/SVG/main" r:embed="rId3"/>
@@ -9366,7 +9405,7 @@
             <a:blip r:embed="rId2">
               <a:extLst>
                 <a:ext uri="{28A0092B-C50C-407E-A947-70E740481C1C}">
-                  <a14:useLocalDpi xmlns:a14="http://schemas.microsoft.com/office/drawing/2010/main" val="0"/>
+                  <a14:useLocalDpi xmlns:a14="http://schemas.microsoft.com/office/drawing/2010/main"/>
                 </a:ext>
                 <a:ext uri="{96DAC541-7B7A-43D3-8B79-37D633B846F1}">
                   <asvg:svgBlip xmlns:asvg="http://schemas.microsoft.com/office/drawing/2016/SVG/main" r:embed="rId3"/>
@@ -9915,12 +9954,17 @@
     <p:bg>
       <p:bgPr>
         <a:blipFill dpi="0" rotWithShape="1">
-          <a:blip r:embed="rId2">
+          <a:blip r:embed="rId2" cstate="hqprint">
             <a:lum/>
+            <a:extLst>
+              <a:ext uri="{28A0092B-C50C-407E-A947-70E740481C1C}">
+                <a14:useLocalDpi xmlns:a14="http://schemas.microsoft.com/office/drawing/2010/main"/>
+              </a:ext>
+            </a:extLst>
           </a:blip>
           <a:srcRect/>
           <a:stretch>
-            <a:fillRect t="-39000" b="-39000"/>
+            <a:fillRect/>
           </a:stretch>
         </a:blipFill>
         <a:effectLst/>
@@ -10095,7 +10139,7 @@
           <a:blip r:embed="rId3">
             <a:extLst>
               <a:ext uri="{28A0092B-C50C-407E-A947-70E740481C1C}">
-                <a14:useLocalDpi xmlns:a14="http://schemas.microsoft.com/office/drawing/2010/main" val="0"/>
+                <a14:useLocalDpi xmlns:a14="http://schemas.microsoft.com/office/drawing/2010/main"/>
               </a:ext>
               <a:ext uri="{96DAC541-7B7A-43D3-8B79-37D633B846F1}">
                 <asvg:svgBlip xmlns:asvg="http://schemas.microsoft.com/office/drawing/2016/SVG/main" r:embed="rId4"/>
@@ -10477,13 +10521,13 @@
   <p:clrMapOvr>
     <a:masterClrMapping/>
   </p:clrMapOvr>
-  <mc:AlternateContent xmlns:mc="http://schemas.openxmlformats.org/markup-compatibility/2006">
-    <mc:Choice xmlns:p14="http://schemas.microsoft.com/office/powerpoint/2010/main" Requires="p14">
+  <mc:AlternateContent xmlns:mc="http://schemas.openxmlformats.org/markup-compatibility/2006" xmlns:p14="http://schemas.microsoft.com/office/powerpoint/2010/main">
+    <mc:Choice Requires="p14">
       <p:transition spd="med" p14:dur="700">
         <p:fade/>
       </p:transition>
     </mc:Choice>
-    <mc:Fallback>
+    <mc:Fallback xmlns="">
       <p:transition spd="med">
         <p:fade/>
       </p:transition>
@@ -10498,12 +10542,17 @@
     <p:bg>
       <p:bgPr>
         <a:blipFill dpi="0" rotWithShape="1">
-          <a:blip r:embed="rId2">
+          <a:blip r:embed="rId2" cstate="hqprint">
             <a:lum/>
+            <a:extLst>
+              <a:ext uri="{28A0092B-C50C-407E-A947-70E740481C1C}">
+                <a14:useLocalDpi xmlns:a14="http://schemas.microsoft.com/office/drawing/2010/main"/>
+              </a:ext>
+            </a:extLst>
           </a:blip>
           <a:srcRect/>
           <a:stretch>
-            <a:fillRect t="-39000" b="-39000"/>
+            <a:fillRect/>
           </a:stretch>
         </a:blipFill>
         <a:effectLst/>
@@ -10766,7 +10815,7 @@
           <a:blip r:embed="rId3">
             <a:extLst>
               <a:ext uri="{28A0092B-C50C-407E-A947-70E740481C1C}">
-                <a14:useLocalDpi xmlns:a14="http://schemas.microsoft.com/office/drawing/2010/main" val="0"/>
+                <a14:useLocalDpi xmlns:a14="http://schemas.microsoft.com/office/drawing/2010/main"/>
               </a:ext>
               <a:ext uri="{96DAC541-7B7A-43D3-8B79-37D633B846F1}">
                 <asvg:svgBlip xmlns:asvg="http://schemas.microsoft.com/office/drawing/2016/SVG/main" r:embed="rId4"/>
@@ -10852,13 +10901,13 @@
   <p:clrMapOvr>
     <a:masterClrMapping/>
   </p:clrMapOvr>
-  <mc:AlternateContent xmlns:mc="http://schemas.openxmlformats.org/markup-compatibility/2006">
-    <mc:Choice xmlns:p14="http://schemas.microsoft.com/office/powerpoint/2010/main" Requires="p14">
+  <mc:AlternateContent xmlns:mc="http://schemas.openxmlformats.org/markup-compatibility/2006" xmlns:p14="http://schemas.microsoft.com/office/powerpoint/2010/main">
+    <mc:Choice Requires="p14">
       <p:transition spd="med" p14:dur="700">
         <p:fade/>
       </p:transition>
     </mc:Choice>
-    <mc:Fallback>
+    <mc:Fallback xmlns="">
       <p:transition spd="med">
         <p:fade/>
       </p:transition>
@@ -11049,7 +11098,7 @@
           <a:blip r:embed="rId2">
             <a:extLst>
               <a:ext uri="{28A0092B-C50C-407E-A947-70E740481C1C}">
-                <a14:useLocalDpi xmlns:a14="http://schemas.microsoft.com/office/drawing/2010/main" val="0"/>
+                <a14:useLocalDpi xmlns:a14="http://schemas.microsoft.com/office/drawing/2010/main"/>
               </a:ext>
               <a:ext uri="{96DAC541-7B7A-43D3-8B79-37D633B846F1}">
                 <asvg:svgBlip xmlns:asvg="http://schemas.microsoft.com/office/drawing/2016/SVG/main" r:embed="rId3"/>
@@ -11132,13 +11181,13 @@
   <p:clrMapOvr>
     <a:masterClrMapping/>
   </p:clrMapOvr>
-  <mc:AlternateContent xmlns:mc="http://schemas.openxmlformats.org/markup-compatibility/2006">
-    <mc:Choice xmlns:p14="http://schemas.microsoft.com/office/powerpoint/2010/main" Requires="p14">
+  <mc:AlternateContent xmlns:mc="http://schemas.openxmlformats.org/markup-compatibility/2006" xmlns:p14="http://schemas.microsoft.com/office/powerpoint/2010/main">
+    <mc:Choice Requires="p14">
       <p:transition spd="med" p14:dur="700">
         <p:fade/>
       </p:transition>
     </mc:Choice>
-    <mc:Fallback>
+    <mc:Fallback xmlns="">
       <p:transition spd="med">
         <p:fade/>
       </p:transition>
@@ -11421,7 +11470,7 @@
           <a:blip r:embed="rId3">
             <a:extLst>
               <a:ext uri="{28A0092B-C50C-407E-A947-70E740481C1C}">
-                <a14:useLocalDpi xmlns:a14="http://schemas.microsoft.com/office/drawing/2010/main" val="0"/>
+                <a14:useLocalDpi xmlns:a14="http://schemas.microsoft.com/office/drawing/2010/main"/>
               </a:ext>
               <a:ext uri="{96DAC541-7B7A-43D3-8B79-37D633B846F1}">
                 <asvg:svgBlip xmlns:asvg="http://schemas.microsoft.com/office/drawing/2016/SVG/main" r:embed="rId4"/>
@@ -11507,13 +11556,13 @@
   <p:clrMapOvr>
     <a:masterClrMapping/>
   </p:clrMapOvr>
-  <mc:AlternateContent xmlns:mc="http://schemas.openxmlformats.org/markup-compatibility/2006">
-    <mc:Choice xmlns:p14="http://schemas.microsoft.com/office/powerpoint/2010/main" Requires="p14">
+  <mc:AlternateContent xmlns:mc="http://schemas.openxmlformats.org/markup-compatibility/2006" xmlns:p14="http://schemas.microsoft.com/office/powerpoint/2010/main">
+    <mc:Choice Requires="p14">
       <p:transition spd="med" p14:dur="700">
         <p:fade/>
       </p:transition>
     </mc:Choice>
-    <mc:Fallback>
+    <mc:Fallback xmlns="">
       <p:transition spd="med">
         <p:fade/>
       </p:transition>
@@ -11773,12 +11822,17 @@
     <p:bg>
       <p:bgPr>
         <a:blipFill dpi="0" rotWithShape="1">
-          <a:blip r:embed="rId2">
+          <a:blip r:embed="rId2" cstate="hqprint">
             <a:lum/>
+            <a:extLst>
+              <a:ext uri="{28A0092B-C50C-407E-A947-70E740481C1C}">
+                <a14:useLocalDpi xmlns:a14="http://schemas.microsoft.com/office/drawing/2010/main"/>
+              </a:ext>
+            </a:extLst>
           </a:blip>
           <a:srcRect/>
           <a:stretch>
-            <a:fillRect t="-39000" b="-39000"/>
+            <a:fillRect/>
           </a:stretch>
         </a:blipFill>
         <a:effectLst/>
@@ -11954,7 +12008,7 @@
           <a:blip r:embed="rId3">
             <a:extLst>
               <a:ext uri="{28A0092B-C50C-407E-A947-70E740481C1C}">
-                <a14:useLocalDpi xmlns:a14="http://schemas.microsoft.com/office/drawing/2010/main" val="0"/>
+                <a14:useLocalDpi xmlns:a14="http://schemas.microsoft.com/office/drawing/2010/main"/>
               </a:ext>
               <a:ext uri="{96DAC541-7B7A-43D3-8B79-37D633B846F1}">
                 <asvg:svgBlip xmlns:asvg="http://schemas.microsoft.com/office/drawing/2016/SVG/main" r:embed="rId4"/>
@@ -12136,13 +12190,13 @@
   <p:clrMapOvr>
     <a:masterClrMapping/>
   </p:clrMapOvr>
-  <mc:AlternateContent xmlns:mc="http://schemas.openxmlformats.org/markup-compatibility/2006">
-    <mc:Choice xmlns:p14="http://schemas.microsoft.com/office/powerpoint/2010/main" Requires="p14">
+  <mc:AlternateContent xmlns:mc="http://schemas.openxmlformats.org/markup-compatibility/2006" xmlns:p14="http://schemas.microsoft.com/office/powerpoint/2010/main">
+    <mc:Choice Requires="p14">
       <p:transition spd="med" p14:dur="700">
         <p:fade/>
       </p:transition>
     </mc:Choice>
-    <mc:Fallback>
+    <mc:Fallback xmlns="">
       <p:transition spd="med">
         <p:fade/>
       </p:transition>
@@ -12425,7 +12479,7 @@
           <a:blip r:embed="rId3">
             <a:extLst>
               <a:ext uri="{28A0092B-C50C-407E-A947-70E740481C1C}">
-                <a14:useLocalDpi xmlns:a14="http://schemas.microsoft.com/office/drawing/2010/main" val="0"/>
+                <a14:useLocalDpi xmlns:a14="http://schemas.microsoft.com/office/drawing/2010/main"/>
               </a:ext>
               <a:ext uri="{96DAC541-7B7A-43D3-8B79-37D633B846F1}">
                 <asvg:svgBlip xmlns:asvg="http://schemas.microsoft.com/office/drawing/2016/SVG/main" r:embed="rId4"/>
@@ -12511,13 +12565,13 @@
   <p:clrMapOvr>
     <a:masterClrMapping/>
   </p:clrMapOvr>
-  <mc:AlternateContent xmlns:mc="http://schemas.openxmlformats.org/markup-compatibility/2006">
-    <mc:Choice xmlns:p14="http://schemas.microsoft.com/office/powerpoint/2010/main" Requires="p14">
+  <mc:AlternateContent xmlns:mc="http://schemas.openxmlformats.org/markup-compatibility/2006" xmlns:p14="http://schemas.microsoft.com/office/powerpoint/2010/main">
+    <mc:Choice Requires="p14">
       <p:transition spd="med" p14:dur="700">
         <p:fade/>
       </p:transition>
     </mc:Choice>
-    <mc:Fallback>
+    <mc:Fallback xmlns="">
       <p:transition spd="med">
         <p:fade/>
       </p:transition>
@@ -12751,7 +12805,7 @@
           <a:blip r:embed="rId3">
             <a:extLst>
               <a:ext uri="{28A0092B-C50C-407E-A947-70E740481C1C}">
-                <a14:useLocalDpi xmlns:a14="http://schemas.microsoft.com/office/drawing/2010/main" val="0"/>
+                <a14:useLocalDpi xmlns:a14="http://schemas.microsoft.com/office/drawing/2010/main"/>
               </a:ext>
               <a:ext uri="{96DAC541-7B7A-43D3-8B79-37D633B846F1}">
                 <asvg:svgBlip xmlns:asvg="http://schemas.microsoft.com/office/drawing/2016/SVG/main" r:embed="rId4"/>
@@ -12837,13 +12891,13 @@
   <p:clrMapOvr>
     <a:masterClrMapping/>
   </p:clrMapOvr>
-  <mc:AlternateContent xmlns:mc="http://schemas.openxmlformats.org/markup-compatibility/2006">
-    <mc:Choice xmlns:p14="http://schemas.microsoft.com/office/powerpoint/2010/main" Requires="p14">
+  <mc:AlternateContent xmlns:mc="http://schemas.openxmlformats.org/markup-compatibility/2006" xmlns:p14="http://schemas.microsoft.com/office/powerpoint/2010/main">
+    <mc:Choice Requires="p14">
       <p:transition spd="med" p14:dur="700">
         <p:fade/>
       </p:transition>
     </mc:Choice>
-    <mc:Fallback>
+    <mc:Fallback xmlns="">
       <p:transition spd="med">
         <p:fade/>
       </p:transition>
@@ -13052,7 +13106,7 @@
           <a:blip r:embed="rId2">
             <a:extLst>
               <a:ext uri="{28A0092B-C50C-407E-A947-70E740481C1C}">
-                <a14:useLocalDpi xmlns:a14="http://schemas.microsoft.com/office/drawing/2010/main" val="0"/>
+                <a14:useLocalDpi xmlns:a14="http://schemas.microsoft.com/office/drawing/2010/main"/>
               </a:ext>
               <a:ext uri="{96DAC541-7B7A-43D3-8B79-37D633B846F1}">
                 <asvg:svgBlip xmlns:asvg="http://schemas.microsoft.com/office/drawing/2016/SVG/main" r:embed="rId3"/>
@@ -13083,13 +13137,13 @@
   <p:clrMapOvr>
     <a:masterClrMapping/>
   </p:clrMapOvr>
-  <mc:AlternateContent xmlns:mc="http://schemas.openxmlformats.org/markup-compatibility/2006">
-    <mc:Choice xmlns:p14="http://schemas.microsoft.com/office/powerpoint/2010/main" Requires="p14">
+  <mc:AlternateContent xmlns:mc="http://schemas.openxmlformats.org/markup-compatibility/2006" xmlns:p14="http://schemas.microsoft.com/office/powerpoint/2010/main">
+    <mc:Choice Requires="p14">
       <p:transition spd="med" p14:dur="700">
         <p:fade/>
       </p:transition>
     </mc:Choice>
-    <mc:Fallback>
+    <mc:Fallback xmlns="">
       <p:transition spd="med">
         <p:fade/>
       </p:transition>
@@ -13141,7 +13195,7 @@
           <a:blip r:embed="rId2">
             <a:extLst>
               <a:ext uri="{28A0092B-C50C-407E-A947-70E740481C1C}">
-                <a14:useLocalDpi xmlns:a14="http://schemas.microsoft.com/office/drawing/2010/main" val="0"/>
+                <a14:useLocalDpi xmlns:a14="http://schemas.microsoft.com/office/drawing/2010/main"/>
               </a:ext>
               <a:ext uri="{96DAC541-7B7A-43D3-8B79-37D633B846F1}">
                 <asvg:svgBlip xmlns:asvg="http://schemas.microsoft.com/office/drawing/2016/SVG/main" r:embed="rId3"/>
@@ -13329,13 +13383,13 @@
   <p:clrMapOvr>
     <a:masterClrMapping/>
   </p:clrMapOvr>
-  <mc:AlternateContent xmlns:mc="http://schemas.openxmlformats.org/markup-compatibility/2006">
-    <mc:Choice xmlns:p14="http://schemas.microsoft.com/office/powerpoint/2010/main" Requires="p14">
+  <mc:AlternateContent xmlns:mc="http://schemas.openxmlformats.org/markup-compatibility/2006" xmlns:p14="http://schemas.microsoft.com/office/powerpoint/2010/main">
+    <mc:Choice Requires="p14">
       <p:transition spd="med" p14:dur="700">
         <p:fade/>
       </p:transition>
     </mc:Choice>
-    <mc:Fallback>
+    <mc:Fallback xmlns="">
       <p:transition spd="med">
         <p:fade/>
       </p:transition>
@@ -13521,7 +13575,7 @@
             <a:blip r:embed="rId2">
               <a:extLst>
                 <a:ext uri="{28A0092B-C50C-407E-A947-70E740481C1C}">
-                  <a14:useLocalDpi xmlns:a14="http://schemas.microsoft.com/office/drawing/2010/main" val="0"/>
+                  <a14:useLocalDpi xmlns:a14="http://schemas.microsoft.com/office/drawing/2010/main"/>
                 </a:ext>
                 <a:ext uri="{96DAC541-7B7A-43D3-8B79-37D633B846F1}">
                   <asvg:svgBlip xmlns:asvg="http://schemas.microsoft.com/office/drawing/2016/SVG/main" r:embed="rId3"/>
@@ -13752,13 +13806,13 @@
   <p:clrMapOvr>
     <a:masterClrMapping/>
   </p:clrMapOvr>
-  <mc:AlternateContent xmlns:mc="http://schemas.openxmlformats.org/markup-compatibility/2006">
-    <mc:Choice xmlns:p14="http://schemas.microsoft.com/office/powerpoint/2010/main" Requires="p14">
+  <mc:AlternateContent xmlns:mc="http://schemas.openxmlformats.org/markup-compatibility/2006" xmlns:p14="http://schemas.microsoft.com/office/powerpoint/2010/main">
+    <mc:Choice Requires="p14">
       <p:transition spd="med" p14:dur="700">
         <p:fade/>
       </p:transition>
     </mc:Choice>
-    <mc:Fallback>
+    <mc:Fallback xmlns="">
       <p:transition spd="med">
         <p:fade/>
       </p:transition>
@@ -13858,7 +13912,7 @@
             <a:blip r:embed="rId2">
               <a:extLst>
                 <a:ext uri="{28A0092B-C50C-407E-A947-70E740481C1C}">
-                  <a14:useLocalDpi xmlns:a14="http://schemas.microsoft.com/office/drawing/2010/main" val="0"/>
+                  <a14:useLocalDpi xmlns:a14="http://schemas.microsoft.com/office/drawing/2010/main"/>
                 </a:ext>
                 <a:ext uri="{96DAC541-7B7A-43D3-8B79-37D633B846F1}">
                   <asvg:svgBlip xmlns:asvg="http://schemas.microsoft.com/office/drawing/2016/SVG/main" r:embed="rId3"/>
@@ -14175,13 +14229,13 @@
   <p:clrMapOvr>
     <a:masterClrMapping/>
   </p:clrMapOvr>
-  <mc:AlternateContent xmlns:mc="http://schemas.openxmlformats.org/markup-compatibility/2006">
-    <mc:Choice xmlns:p14="http://schemas.microsoft.com/office/powerpoint/2010/main" Requires="p14">
+  <mc:AlternateContent xmlns:mc="http://schemas.openxmlformats.org/markup-compatibility/2006" xmlns:p14="http://schemas.microsoft.com/office/powerpoint/2010/main">
+    <mc:Choice Requires="p14">
       <p:transition spd="med" p14:dur="700">
         <p:fade/>
       </p:transition>
     </mc:Choice>
-    <mc:Fallback>
+    <mc:Fallback xmlns="">
       <p:transition spd="med">
         <p:fade/>
       </p:transition>
@@ -14487,7 +14541,7 @@
           <a:blip r:embed="rId2">
             <a:extLst>
               <a:ext uri="{28A0092B-C50C-407E-A947-70E740481C1C}">
-                <a14:useLocalDpi xmlns:a14="http://schemas.microsoft.com/office/drawing/2010/main" val="0"/>
+                <a14:useLocalDpi xmlns:a14="http://schemas.microsoft.com/office/drawing/2010/main"/>
               </a:ext>
               <a:ext uri="{96DAC541-7B7A-43D3-8B79-37D633B846F1}">
                 <asvg:svgBlip xmlns:asvg="http://schemas.microsoft.com/office/drawing/2016/SVG/main" r:embed="rId3"/>
@@ -14600,13 +14654,13 @@
   <p:clrMapOvr>
     <a:masterClrMapping/>
   </p:clrMapOvr>
-  <mc:AlternateContent xmlns:mc="http://schemas.openxmlformats.org/markup-compatibility/2006">
-    <mc:Choice xmlns:p14="http://schemas.microsoft.com/office/powerpoint/2010/main" Requires="p14">
+  <mc:AlternateContent xmlns:mc="http://schemas.openxmlformats.org/markup-compatibility/2006" xmlns:p14="http://schemas.microsoft.com/office/powerpoint/2010/main">
+    <mc:Choice Requires="p14">
       <p:transition spd="med" p14:dur="700">
         <p:fade/>
       </p:transition>
     </mc:Choice>
-    <mc:Fallback>
+    <mc:Fallback xmlns="">
       <p:transition spd="med">
         <p:fade/>
       </p:transition>
@@ -14739,7 +14793,7 @@
           <a:blip r:embed="rId2">
             <a:extLst>
               <a:ext uri="{28A0092B-C50C-407E-A947-70E740481C1C}">
-                <a14:useLocalDpi xmlns:a14="http://schemas.microsoft.com/office/drawing/2010/main" val="0"/>
+                <a14:useLocalDpi xmlns:a14="http://schemas.microsoft.com/office/drawing/2010/main"/>
               </a:ext>
               <a:ext uri="{96DAC541-7B7A-43D3-8B79-37D633B846F1}">
                 <asvg:svgBlip xmlns:asvg="http://schemas.microsoft.com/office/drawing/2016/SVG/main" r:embed="rId3"/>
@@ -15013,13 +15067,13 @@
   <p:clrMapOvr>
     <a:masterClrMapping/>
   </p:clrMapOvr>
-  <mc:AlternateContent xmlns:mc="http://schemas.openxmlformats.org/markup-compatibility/2006">
-    <mc:Choice xmlns:p14="http://schemas.microsoft.com/office/powerpoint/2010/main" Requires="p14">
+  <mc:AlternateContent xmlns:mc="http://schemas.openxmlformats.org/markup-compatibility/2006" xmlns:p14="http://schemas.microsoft.com/office/powerpoint/2010/main">
+    <mc:Choice Requires="p14">
       <p:transition spd="med" p14:dur="700">
         <p:fade/>
       </p:transition>
     </mc:Choice>
-    <mc:Fallback>
+    <mc:Fallback xmlns="">
       <p:transition spd="med">
         <p:fade/>
       </p:transition>
@@ -15263,13 +15317,13 @@
   <p:clrMapOvr>
     <a:masterClrMapping/>
   </p:clrMapOvr>
-  <mc:AlternateContent xmlns:mc="http://schemas.openxmlformats.org/markup-compatibility/2006">
-    <mc:Choice xmlns:p14="http://schemas.microsoft.com/office/powerpoint/2010/main" Requires="p14">
+  <mc:AlternateContent xmlns:mc="http://schemas.openxmlformats.org/markup-compatibility/2006" xmlns:p14="http://schemas.microsoft.com/office/powerpoint/2010/main">
+    <mc:Choice Requires="p14">
       <p:transition spd="med" p14:dur="700">
         <p:fade/>
       </p:transition>
     </mc:Choice>
-    <mc:Fallback>
+    <mc:Fallback xmlns="">
       <p:transition spd="med">
         <p:fade/>
       </p:transition>
@@ -15797,13 +15851,13 @@
   <p:clrMapOvr>
     <a:masterClrMapping/>
   </p:clrMapOvr>
-  <mc:AlternateContent xmlns:mc="http://schemas.openxmlformats.org/markup-compatibility/2006">
-    <mc:Choice xmlns:p14="http://schemas.microsoft.com/office/powerpoint/2010/main" Requires="p14">
+  <mc:AlternateContent xmlns:mc="http://schemas.openxmlformats.org/markup-compatibility/2006" xmlns:p14="http://schemas.microsoft.com/office/powerpoint/2010/main">
+    <mc:Choice Requires="p14">
       <p:transition spd="med" p14:dur="700">
         <p:fade/>
       </p:transition>
     </mc:Choice>
-    <mc:Fallback>
+    <mc:Fallback xmlns="">
       <p:transition spd="med">
         <p:fade/>
       </p:transition>
@@ -17010,13 +17064,13 @@
   <p:clrMapOvr>
     <a:masterClrMapping/>
   </p:clrMapOvr>
-  <mc:AlternateContent xmlns:mc="http://schemas.openxmlformats.org/markup-compatibility/2006">
-    <mc:Choice xmlns:p14="http://schemas.microsoft.com/office/powerpoint/2010/main" Requires="p14">
+  <mc:AlternateContent xmlns:mc="http://schemas.openxmlformats.org/markup-compatibility/2006" xmlns:p14="http://schemas.microsoft.com/office/powerpoint/2010/main">
+    <mc:Choice Requires="p14">
       <p:transition spd="med" p14:dur="700">
         <p:fade/>
       </p:transition>
     </mc:Choice>
-    <mc:Fallback>
+    <mc:Fallback xmlns="">
       <p:transition spd="med">
         <p:fade/>
       </p:transition>
@@ -17285,13 +17339,13 @@
   <p:clrMapOvr>
     <a:masterClrMapping/>
   </p:clrMapOvr>
-  <mc:AlternateContent xmlns:mc="http://schemas.openxmlformats.org/markup-compatibility/2006">
-    <mc:Choice xmlns:p14="http://schemas.microsoft.com/office/powerpoint/2010/main" Requires="p14">
+  <mc:AlternateContent xmlns:mc="http://schemas.openxmlformats.org/markup-compatibility/2006" xmlns:p14="http://schemas.microsoft.com/office/powerpoint/2010/main">
+    <mc:Choice Requires="p14">
       <p:transition spd="med" p14:dur="700">
         <p:fade/>
       </p:transition>
     </mc:Choice>
-    <mc:Fallback>
+    <mc:Fallback xmlns="">
       <p:transition spd="med">
         <p:fade/>
       </p:transition>
@@ -17536,13 +17590,13 @@
   <p:clrMapOvr>
     <a:masterClrMapping/>
   </p:clrMapOvr>
-  <mc:AlternateContent xmlns:mc="http://schemas.openxmlformats.org/markup-compatibility/2006">
-    <mc:Choice xmlns:p14="http://schemas.microsoft.com/office/powerpoint/2010/main" Requires="p14">
+  <mc:AlternateContent xmlns:mc="http://schemas.openxmlformats.org/markup-compatibility/2006" xmlns:p14="http://schemas.microsoft.com/office/powerpoint/2010/main">
+    <mc:Choice Requires="p14">
       <p:transition spd="med" p14:dur="700">
         <p:fade/>
       </p:transition>
     </mc:Choice>
-    <mc:Fallback>
+    <mc:Fallback xmlns="">
       <p:transition spd="med">
         <p:fade/>
       </p:transition>
@@ -17873,13 +17927,13 @@
   <p:clrMapOvr>
     <a:masterClrMapping/>
   </p:clrMapOvr>
-  <mc:AlternateContent xmlns:mc="http://schemas.openxmlformats.org/markup-compatibility/2006">
-    <mc:Choice xmlns:p14="http://schemas.microsoft.com/office/powerpoint/2010/main" Requires="p14">
+  <mc:AlternateContent xmlns:mc="http://schemas.openxmlformats.org/markup-compatibility/2006" xmlns:p14="http://schemas.microsoft.com/office/powerpoint/2010/main">
+    <mc:Choice Requires="p14">
       <p:transition spd="med" p14:dur="700">
         <p:fade/>
       </p:transition>
     </mc:Choice>
-    <mc:Fallback>
+    <mc:Fallback xmlns="">
       <p:transition spd="med">
         <p:fade/>
       </p:transition>
@@ -18256,13 +18310,13 @@
   <p:clrMapOvr>
     <a:masterClrMapping/>
   </p:clrMapOvr>
-  <mc:AlternateContent xmlns:mc="http://schemas.openxmlformats.org/markup-compatibility/2006">
-    <mc:Choice xmlns:p14="http://schemas.microsoft.com/office/powerpoint/2010/main" Requires="p14">
+  <mc:AlternateContent xmlns:mc="http://schemas.openxmlformats.org/markup-compatibility/2006" xmlns:p14="http://schemas.microsoft.com/office/powerpoint/2010/main">
+    <mc:Choice Requires="p14">
       <p:transition spd="med" p14:dur="700">
         <p:fade/>
       </p:transition>
     </mc:Choice>
-    <mc:Fallback>
+    <mc:Fallback xmlns="">
       <p:transition spd="med">
         <p:fade/>
       </p:transition>
@@ -18787,13 +18841,13 @@
   <p:clrMapOvr>
     <a:masterClrMapping/>
   </p:clrMapOvr>
-  <mc:AlternateContent xmlns:mc="http://schemas.openxmlformats.org/markup-compatibility/2006">
-    <mc:Choice xmlns:p14="http://schemas.microsoft.com/office/powerpoint/2010/main" Requires="p14">
+  <mc:AlternateContent xmlns:mc="http://schemas.openxmlformats.org/markup-compatibility/2006" xmlns:p14="http://schemas.microsoft.com/office/powerpoint/2010/main">
+    <mc:Choice Requires="p14">
       <p:transition spd="med" p14:dur="700">
         <p:fade/>
       </p:transition>
     </mc:Choice>
-    <mc:Fallback>
+    <mc:Fallback xmlns="">
       <p:transition spd="med">
         <p:fade/>
       </p:transition>
@@ -19311,13 +19365,13 @@
   <p:clrMapOvr>
     <a:masterClrMapping/>
   </p:clrMapOvr>
-  <mc:AlternateContent xmlns:mc="http://schemas.openxmlformats.org/markup-compatibility/2006">
-    <mc:Choice xmlns:p14="http://schemas.microsoft.com/office/powerpoint/2010/main" Requires="p14">
+  <mc:AlternateContent xmlns:mc="http://schemas.openxmlformats.org/markup-compatibility/2006" xmlns:p14="http://schemas.microsoft.com/office/powerpoint/2010/main">
+    <mc:Choice Requires="p14">
       <p:transition spd="med" p14:dur="700">
         <p:fade/>
       </p:transition>
     </mc:Choice>
-    <mc:Fallback>
+    <mc:Fallback xmlns="">
       <p:transition spd="med">
         <p:fade/>
       </p:transition>
@@ -19699,13 +19753,13 @@
   <p:clrMapOvr>
     <a:masterClrMapping/>
   </p:clrMapOvr>
-  <mc:AlternateContent xmlns:mc="http://schemas.openxmlformats.org/markup-compatibility/2006">
-    <mc:Choice xmlns:p14="http://schemas.microsoft.com/office/powerpoint/2010/main" Requires="p14">
+  <mc:AlternateContent xmlns:mc="http://schemas.openxmlformats.org/markup-compatibility/2006" xmlns:p14="http://schemas.microsoft.com/office/powerpoint/2010/main">
+    <mc:Choice Requires="p14">
       <p:transition spd="med" p14:dur="700">
         <p:fade/>
       </p:transition>
     </mc:Choice>
-    <mc:Fallback>
+    <mc:Fallback xmlns="">
       <p:transition spd="med">
         <p:fade/>
       </p:transition>
@@ -20087,13 +20141,13 @@
   <p:clrMapOvr>
     <a:masterClrMapping/>
   </p:clrMapOvr>
-  <mc:AlternateContent xmlns:mc="http://schemas.openxmlformats.org/markup-compatibility/2006">
-    <mc:Choice xmlns:p14="http://schemas.microsoft.com/office/powerpoint/2010/main" Requires="p14">
+  <mc:AlternateContent xmlns:mc="http://schemas.openxmlformats.org/markup-compatibility/2006" xmlns:p14="http://schemas.microsoft.com/office/powerpoint/2010/main">
+    <mc:Choice Requires="p14">
       <p:transition spd="med" p14:dur="700">
         <p:fade/>
       </p:transition>
     </mc:Choice>
-    <mc:Fallback>
+    <mc:Fallback xmlns="">
       <p:transition spd="med">
         <p:fade/>
       </p:transition>
@@ -20765,13 +20819,13 @@
   <p:clrMapOvr>
     <a:masterClrMapping/>
   </p:clrMapOvr>
-  <mc:AlternateContent xmlns:mc="http://schemas.openxmlformats.org/markup-compatibility/2006">
-    <mc:Choice xmlns:p14="http://schemas.microsoft.com/office/powerpoint/2010/main" Requires="p14">
+  <mc:AlternateContent xmlns:mc="http://schemas.openxmlformats.org/markup-compatibility/2006" xmlns:p14="http://schemas.microsoft.com/office/powerpoint/2010/main">
+    <mc:Choice Requires="p14">
       <p:transition spd="med" p14:dur="700">
         <p:fade/>
       </p:transition>
     </mc:Choice>
-    <mc:Fallback>
+    <mc:Fallback xmlns="">
       <p:transition spd="med">
         <p:fade/>
       </p:transition>
@@ -21270,13 +21324,13 @@
   <p:clrMapOvr>
     <a:masterClrMapping/>
   </p:clrMapOvr>
-  <mc:AlternateContent xmlns:mc="http://schemas.openxmlformats.org/markup-compatibility/2006">
-    <mc:Choice xmlns:p14="http://schemas.microsoft.com/office/powerpoint/2010/main" Requires="p14">
+  <mc:AlternateContent xmlns:mc="http://schemas.openxmlformats.org/markup-compatibility/2006" xmlns:p14="http://schemas.microsoft.com/office/powerpoint/2010/main">
+    <mc:Choice Requires="p14">
       <p:transition spd="med" p14:dur="700">
         <p:fade/>
       </p:transition>
     </mc:Choice>
-    <mc:Fallback>
+    <mc:Fallback xmlns="">
       <p:transition spd="med">
         <p:fade/>
       </p:transition>
@@ -21617,13 +21671,13 @@
   <p:clrMapOvr>
     <a:masterClrMapping/>
   </p:clrMapOvr>
-  <mc:AlternateContent xmlns:mc="http://schemas.openxmlformats.org/markup-compatibility/2006">
-    <mc:Choice xmlns:p14="http://schemas.microsoft.com/office/powerpoint/2010/main" Requires="p14">
+  <mc:AlternateContent xmlns:mc="http://schemas.openxmlformats.org/markup-compatibility/2006" xmlns:p14="http://schemas.microsoft.com/office/powerpoint/2010/main">
+    <mc:Choice Requires="p14">
       <p:transition spd="med" p14:dur="700">
         <p:fade/>
       </p:transition>
     </mc:Choice>
-    <mc:Fallback>
+    <mc:Fallback xmlns="">
       <p:transition spd="med">
         <p:fade/>
       </p:transition>
@@ -22141,13 +22195,13 @@
   <p:clrMapOvr>
     <a:masterClrMapping/>
   </p:clrMapOvr>
-  <mc:AlternateContent xmlns:mc="http://schemas.openxmlformats.org/markup-compatibility/2006">
-    <mc:Choice xmlns:p14="http://schemas.microsoft.com/office/powerpoint/2010/main" Requires="p14">
+  <mc:AlternateContent xmlns:mc="http://schemas.openxmlformats.org/markup-compatibility/2006" xmlns:p14="http://schemas.microsoft.com/office/powerpoint/2010/main">
+    <mc:Choice Requires="p14">
       <p:transition spd="med" p14:dur="700">
         <p:fade/>
       </p:transition>
     </mc:Choice>
-    <mc:Fallback>
+    <mc:Fallback xmlns="">
       <p:transition spd="med">
         <p:fade/>
       </p:transition>
@@ -22765,13 +22819,13 @@
   <p:clrMapOvr>
     <a:masterClrMapping/>
   </p:clrMapOvr>
-  <mc:AlternateContent xmlns:mc="http://schemas.openxmlformats.org/markup-compatibility/2006">
-    <mc:Choice xmlns:p14="http://schemas.microsoft.com/office/powerpoint/2010/main" Requires="p14">
+  <mc:AlternateContent xmlns:mc="http://schemas.openxmlformats.org/markup-compatibility/2006" xmlns:p14="http://schemas.microsoft.com/office/powerpoint/2010/main">
+    <mc:Choice Requires="p14">
       <p:transition spd="med" p14:dur="700">
         <p:fade/>
       </p:transition>
     </mc:Choice>
-    <mc:Fallback>
+    <mc:Fallback xmlns="">
       <p:transition spd="med">
         <p:fade/>
       </p:transition>
@@ -23257,13 +23311,13 @@
   <p:clrMapOvr>
     <a:masterClrMapping/>
   </p:clrMapOvr>
-  <mc:AlternateContent xmlns:mc="http://schemas.openxmlformats.org/markup-compatibility/2006">
-    <mc:Choice xmlns:p14="http://schemas.microsoft.com/office/powerpoint/2010/main" Requires="p14">
+  <mc:AlternateContent xmlns:mc="http://schemas.openxmlformats.org/markup-compatibility/2006" xmlns:p14="http://schemas.microsoft.com/office/powerpoint/2010/main">
+    <mc:Choice Requires="p14">
       <p:transition spd="med" p14:dur="700">
         <p:fade/>
       </p:transition>
     </mc:Choice>
-    <mc:Fallback>
+    <mc:Fallback xmlns="">
       <p:transition spd="med">
         <p:fade/>
       </p:transition>
@@ -23811,13 +23865,13 @@
   <p:clrMapOvr>
     <a:masterClrMapping/>
   </p:clrMapOvr>
-  <mc:AlternateContent xmlns:mc="http://schemas.openxmlformats.org/markup-compatibility/2006">
-    <mc:Choice xmlns:p14="http://schemas.microsoft.com/office/powerpoint/2010/main" Requires="p14">
+  <mc:AlternateContent xmlns:mc="http://schemas.openxmlformats.org/markup-compatibility/2006" xmlns:p14="http://schemas.microsoft.com/office/powerpoint/2010/main">
+    <mc:Choice Requires="p14">
       <p:transition spd="med" p14:dur="700">
         <p:fade/>
       </p:transition>
     </mc:Choice>
-    <mc:Fallback>
+    <mc:Fallback xmlns="">
       <p:transition spd="med">
         <p:fade/>
       </p:transition>
@@ -24173,13 +24227,13 @@
   <p:clrMapOvr>
     <a:masterClrMapping/>
   </p:clrMapOvr>
-  <mc:AlternateContent xmlns:mc="http://schemas.openxmlformats.org/markup-compatibility/2006">
-    <mc:Choice xmlns:p14="http://schemas.microsoft.com/office/powerpoint/2010/main" Requires="p14">
+  <mc:AlternateContent xmlns:mc="http://schemas.openxmlformats.org/markup-compatibility/2006" xmlns:p14="http://schemas.microsoft.com/office/powerpoint/2010/main">
+    <mc:Choice Requires="p14">
       <p:transition spd="med" p14:dur="700">
         <p:fade/>
       </p:transition>
     </mc:Choice>
-    <mc:Fallback>
+    <mc:Fallback xmlns="">
       <p:transition spd="med">
         <p:fade/>
       </p:transition>
@@ -24535,13 +24589,13 @@
   <p:clrMapOvr>
     <a:masterClrMapping/>
   </p:clrMapOvr>
-  <mc:AlternateContent xmlns:mc="http://schemas.openxmlformats.org/markup-compatibility/2006">
-    <mc:Choice xmlns:p14="http://schemas.microsoft.com/office/powerpoint/2010/main" Requires="p14">
+  <mc:AlternateContent xmlns:mc="http://schemas.openxmlformats.org/markup-compatibility/2006" xmlns:p14="http://schemas.microsoft.com/office/powerpoint/2010/main">
+    <mc:Choice Requires="p14">
       <p:transition spd="med" p14:dur="700">
         <p:fade/>
       </p:transition>
     </mc:Choice>
-    <mc:Fallback>
+    <mc:Fallback xmlns="">
       <p:transition spd="med">
         <p:fade/>
       </p:transition>
@@ -24897,13 +24951,13 @@
   <p:clrMapOvr>
     <a:masterClrMapping/>
   </p:clrMapOvr>
-  <mc:AlternateContent xmlns:mc="http://schemas.openxmlformats.org/markup-compatibility/2006">
-    <mc:Choice xmlns:p14="http://schemas.microsoft.com/office/powerpoint/2010/main" Requires="p14">
+  <mc:AlternateContent xmlns:mc="http://schemas.openxmlformats.org/markup-compatibility/2006" xmlns:p14="http://schemas.microsoft.com/office/powerpoint/2010/main">
+    <mc:Choice Requires="p14">
       <p:transition spd="med" p14:dur="700">
         <p:fade/>
       </p:transition>
     </mc:Choice>
-    <mc:Fallback>
+    <mc:Fallback xmlns="">
       <p:transition spd="med">
         <p:fade/>
       </p:transition>
@@ -25505,13 +25559,13 @@
   <p:clrMapOvr>
     <a:masterClrMapping/>
   </p:clrMapOvr>
-  <mc:AlternateContent xmlns:mc="http://schemas.openxmlformats.org/markup-compatibility/2006">
-    <mc:Choice xmlns:p14="http://schemas.microsoft.com/office/powerpoint/2010/main" Requires="p14">
+  <mc:AlternateContent xmlns:mc="http://schemas.openxmlformats.org/markup-compatibility/2006" xmlns:p14="http://schemas.microsoft.com/office/powerpoint/2010/main">
+    <mc:Choice Requires="p14">
       <p:transition spd="med" p14:dur="700">
         <p:fade/>
       </p:transition>
     </mc:Choice>
-    <mc:Fallback>
+    <mc:Fallback xmlns="">
       <p:transition spd="med">
         <p:fade/>
       </p:transition>
@@ -25526,12 +25580,17 @@
     <p:bg>
       <p:bgPr>
         <a:blipFill dpi="0" rotWithShape="1">
-          <a:blip r:embed="rId2">
+          <a:blip r:embed="rId2" cstate="hqprint">
             <a:lum/>
+            <a:extLst>
+              <a:ext uri="{28A0092B-C50C-407E-A947-70E740481C1C}">
+                <a14:useLocalDpi xmlns:a14="http://schemas.microsoft.com/office/drawing/2010/main"/>
+              </a:ext>
+            </a:extLst>
           </a:blip>
           <a:srcRect/>
           <a:stretch>
-            <a:fillRect t="-39000" b="-39000"/>
+            <a:fillRect/>
           </a:stretch>
         </a:blipFill>
         <a:effectLst/>
@@ -25599,7 +25658,7 @@
           <a:blip r:embed="rId3">
             <a:extLst>
               <a:ext uri="{28A0092B-C50C-407E-A947-70E740481C1C}">
-                <a14:useLocalDpi xmlns:a14="http://schemas.microsoft.com/office/drawing/2010/main" val="0"/>
+                <a14:useLocalDpi xmlns:a14="http://schemas.microsoft.com/office/drawing/2010/main"/>
               </a:ext>
               <a:ext uri="{96DAC541-7B7A-43D3-8B79-37D633B846F1}">
                 <asvg:svgBlip xmlns:asvg="http://schemas.microsoft.com/office/drawing/2016/SVG/main" r:embed="rId4"/>
@@ -25630,13 +25689,13 @@
   <p:clrMapOvr>
     <a:masterClrMapping/>
   </p:clrMapOvr>
-  <mc:AlternateContent xmlns:mc="http://schemas.openxmlformats.org/markup-compatibility/2006">
-    <mc:Choice xmlns:p14="http://schemas.microsoft.com/office/powerpoint/2010/main" Requires="p14">
+  <mc:AlternateContent xmlns:mc="http://schemas.openxmlformats.org/markup-compatibility/2006" xmlns:p14="http://schemas.microsoft.com/office/powerpoint/2010/main">
+    <mc:Choice Requires="p14">
       <p:transition spd="med" p14:dur="700">
         <p:fade/>
       </p:transition>
     </mc:Choice>
-    <mc:Fallback>
+    <mc:Fallback xmlns="">
       <p:transition spd="med">
         <p:fade/>
       </p:transition>
@@ -25739,13 +25798,13 @@
   <p:clrMapOvr>
     <a:masterClrMapping/>
   </p:clrMapOvr>
-  <mc:AlternateContent xmlns:mc="http://schemas.openxmlformats.org/markup-compatibility/2006">
-    <mc:Choice xmlns:p14="http://schemas.microsoft.com/office/powerpoint/2010/main" Requires="p14">
+  <mc:AlternateContent xmlns:mc="http://schemas.openxmlformats.org/markup-compatibility/2006" xmlns:p14="http://schemas.microsoft.com/office/powerpoint/2010/main">
+    <mc:Choice Requires="p14">
       <p:transition spd="med" p14:dur="700">
         <p:fade/>
       </p:transition>
     </mc:Choice>
-    <mc:Fallback>
+    <mc:Fallback xmlns="">
       <p:transition spd="med">
         <p:fade/>
       </p:transition>
@@ -25937,13 +25996,13 @@
   <p:clrMapOvr>
     <a:masterClrMapping/>
   </p:clrMapOvr>
-  <mc:AlternateContent xmlns:mc="http://schemas.openxmlformats.org/markup-compatibility/2006">
-    <mc:Choice xmlns:p14="http://schemas.microsoft.com/office/powerpoint/2010/main" Requires="p14">
+  <mc:AlternateContent xmlns:mc="http://schemas.openxmlformats.org/markup-compatibility/2006" xmlns:p14="http://schemas.microsoft.com/office/powerpoint/2010/main">
+    <mc:Choice Requires="p14">
       <p:transition spd="med" p14:dur="700">
         <p:fade/>
       </p:transition>
     </mc:Choice>
-    <mc:Fallback>
+    <mc:Fallback xmlns="">
       <p:transition spd="med">
         <p:fade/>
       </p:transition>
@@ -26025,13 +26084,13 @@
   <p:clrMapOvr>
     <a:masterClrMapping/>
   </p:clrMapOvr>
-  <mc:AlternateContent xmlns:mc="http://schemas.openxmlformats.org/markup-compatibility/2006">
-    <mc:Choice xmlns:p14="http://schemas.microsoft.com/office/powerpoint/2010/main" Requires="p14">
+  <mc:AlternateContent xmlns:mc="http://schemas.openxmlformats.org/markup-compatibility/2006" xmlns:p14="http://schemas.microsoft.com/office/powerpoint/2010/main">
+    <mc:Choice Requires="p14">
       <p:transition spd="med" p14:dur="700">
         <p:fade/>
       </p:transition>
     </mc:Choice>
-    <mc:Fallback>
+    <mc:Fallback xmlns="">
       <p:transition spd="med">
         <p:fade/>
       </p:transition>
@@ -27131,7 +27190,7 @@
             <a:blip r:embed="rId27">
               <a:extLst>
                 <a:ext uri="{28A0092B-C50C-407E-A947-70E740481C1C}">
-                  <a14:useLocalDpi xmlns:a14="http://schemas.microsoft.com/office/drawing/2010/main" val="0"/>
+                  <a14:useLocalDpi xmlns:a14="http://schemas.microsoft.com/office/drawing/2010/main"/>
                 </a:ext>
                 <a:ext uri="{96DAC541-7B7A-43D3-8B79-37D633B846F1}">
                   <asvg:svgBlip xmlns:asvg="http://schemas.microsoft.com/office/drawing/2016/SVG/main" r:embed="rId28"/>
@@ -28218,13 +28277,13 @@
     <p:sldLayoutId id="2147483715" r:id="rId38"/>
     <p:sldLayoutId id="2147483716" r:id="rId39"/>
   </p:sldLayoutIdLst>
-  <mc:AlternateContent xmlns:mc="http://schemas.openxmlformats.org/markup-compatibility/2006">
-    <mc:Choice xmlns:p14="http://schemas.microsoft.com/office/powerpoint/2010/main" Requires="p14">
+  <mc:AlternateContent xmlns:mc="http://schemas.openxmlformats.org/markup-compatibility/2006" xmlns:p14="http://schemas.microsoft.com/office/powerpoint/2010/main">
+    <mc:Choice Requires="p14">
       <p:transition spd="med" p14:dur="700">
         <p:fade/>
       </p:transition>
     </mc:Choice>
-    <mc:Fallback>
+    <mc:Fallback xmlns="">
       <p:transition spd="med">
         <p:fade/>
       </p:transition>
@@ -31855,8 +31914,14 @@
           <p:nvPr/>
         </p:nvPicPr>
         <p:blipFill rotWithShape="1">
-          <a:blip r:embed="rId12"/>
-          <a:srcRect l="41554"/>
+          <a:blip r:embed="rId12" cstate="hqprint">
+            <a:extLst>
+              <a:ext uri="{28A0092B-C50C-407E-A947-70E740481C1C}">
+                <a14:useLocalDpi xmlns:a14="http://schemas.microsoft.com/office/drawing/2010/main"/>
+              </a:ext>
+            </a:extLst>
+          </a:blip>
+          <a:srcRect/>
           <a:stretch/>
         </p:blipFill>
         <p:spPr>
@@ -32566,7 +32631,7 @@
             <a:blip r:embed="rId13">
               <a:extLst>
                 <a:ext uri="{28A0092B-C50C-407E-A947-70E740481C1C}">
-                  <a14:useLocalDpi xmlns:a14="http://schemas.microsoft.com/office/drawing/2010/main" val="0"/>
+                  <a14:useLocalDpi xmlns:a14="http://schemas.microsoft.com/office/drawing/2010/main"/>
                 </a:ext>
                 <a:ext uri="{96DAC541-7B7A-43D3-8B79-37D633B846F1}">
                   <asvg:svgBlip xmlns:asvg="http://schemas.microsoft.com/office/drawing/2016/SVG/main" r:embed="rId14"/>
@@ -32824,13 +32889,13 @@
   <p:clrMapOvr>
     <a:masterClrMapping/>
   </p:clrMapOvr>
-  <mc:AlternateContent xmlns:mc="http://schemas.openxmlformats.org/markup-compatibility/2006">
-    <mc:Choice xmlns:p14="http://schemas.microsoft.com/office/powerpoint/2010/main" Requires="p14">
+  <mc:AlternateContent xmlns:mc="http://schemas.openxmlformats.org/markup-compatibility/2006" xmlns:p14="http://schemas.microsoft.com/office/powerpoint/2010/main">
+    <mc:Choice Requires="p14">
       <p:transition spd="med" p14:dur="700">
         <p:fade/>
       </p:transition>
     </mc:Choice>
-    <mc:Fallback>
+    <mc:Fallback xmlns="">
       <p:transition spd="med">
         <p:fade/>
       </p:transition>
@@ -34038,47 +34103,9 @@
           <a:bodyPr/>
           <a:lstStyle/>
           <a:p>
-            <a:r>
-              <a:rPr lang="en-US" dirty="0"/>
-              <a:t>You are in a unique position as (currently) only you can build the Torment Nexus</a:t>
-            </a:r>
-          </a:p>
-          <a:p>
             <a:endParaRPr lang="en-US" dirty="0"/>
           </a:p>
           <a:p>
-            <a:r>
-              <a:rPr lang="en-US" dirty="0"/>
-              <a:t>You don’t have to outright say ‘no’, your boss might go to the next person – but lots of ammunition out there on the business risks of implementing LLMs in production!</a:t>
-            </a:r>
-          </a:p>
-          <a:p>
-            <a:endParaRPr lang="en-US" dirty="0"/>
-          </a:p>
-          <a:p>
-            <a:r>
-              <a:rPr lang="en-US" dirty="0"/>
-              <a:t>E.g., Build a demo, plaster your company logo all over it, make the GPT model say the most problematic thing possible, screenshot, send to boss</a:t>
-            </a:r>
-            <a:r>
-              <a:rPr lang="en-US" dirty="0">
-                <a:sym typeface="Wingdings" panose="05000000000000000000" pitchFamily="2" charset="2"/>
-              </a:rPr>
-              <a:t>. They will see that answer next to the company logo.</a:t>
-            </a:r>
-          </a:p>
-          <a:p>
-            <a:endParaRPr lang="en-US" dirty="0">
-              <a:sym typeface="Wingdings" panose="05000000000000000000" pitchFamily="2" charset="2"/>
-            </a:endParaRPr>
-          </a:p>
-          <a:p>
-            <a:r>
-              <a:rPr lang="en-US" dirty="0">
-                <a:sym typeface="Wingdings" panose="05000000000000000000" pitchFamily="2" charset="2"/>
-              </a:rPr>
-              <a:t>Hopefully you will trigger a shift in thinking!</a:t>
-            </a:r>
             <a:endParaRPr lang="en-US" dirty="0"/>
           </a:p>
         </p:txBody>
@@ -34178,6 +34205,88 @@
               <a:t>Footer</a:t>
             </a:r>
             <a:endParaRPr lang="en-US" dirty="0"/>
+          </a:p>
+        </p:txBody>
+      </p:sp>
+      <p:pic>
+        <p:nvPicPr>
+          <p:cNvPr id="1026" name="Picture 2" descr="Alex Blechman @AlexBlechman Sci-Fi Author: In my book I invented the Torment Nexus as a cautionary tale Tech Company: At long last, we have created the Torment Nexus from classic sci-fi novel Don't Create The Torment Nexus 5:49 PM Nov 8, 2021. Twitter Web App">
+            <a:extLst>
+              <a:ext uri="{FF2B5EF4-FFF2-40B4-BE49-F238E27FC236}">
+                <a16:creationId xmlns:a16="http://schemas.microsoft.com/office/drawing/2014/main" id="{8AD83AEF-D79C-31B4-42BC-95521827571C}"/>
+              </a:ext>
+            </a:extLst>
+          </p:cNvPr>
+          <p:cNvPicPr>
+            <a:picLocks noChangeAspect="1" noChangeArrowheads="1"/>
+          </p:cNvPicPr>
+          <p:nvPr/>
+        </p:nvPicPr>
+        <p:blipFill>
+          <a:blip r:embed="rId2">
+            <a:extLst>
+              <a:ext uri="{28A0092B-C50C-407E-A947-70E740481C1C}">
+                <a14:useLocalDpi xmlns:a14="http://schemas.microsoft.com/office/drawing/2010/main"/>
+              </a:ext>
+            </a:extLst>
+          </a:blip>
+          <a:srcRect/>
+          <a:stretch>
+            <a:fillRect/>
+          </a:stretch>
+        </p:blipFill>
+        <p:spPr bwMode="auto">
+          <a:xfrm>
+            <a:off x="3540642" y="1909012"/>
+            <a:ext cx="4464788" cy="3250103"/>
+          </a:xfrm>
+          <a:prstGeom prst="rect">
+            <a:avLst/>
+          </a:prstGeom>
+          <a:noFill/>
+          <a:extLst>
+            <a:ext uri="{909E8E84-426E-40DD-AFC4-6F175D3DCCD1}">
+              <a14:hiddenFill xmlns:a14="http://schemas.microsoft.com/office/drawing/2010/main">
+                <a:solidFill>
+                  <a:srgbClr val="FFFFFF"/>
+                </a:solidFill>
+              </a14:hiddenFill>
+            </a:ext>
+          </a:extLst>
+        </p:spPr>
+      </p:pic>
+      <p:sp>
+        <p:nvSpPr>
+          <p:cNvPr id="5" name="TextBox 4">
+            <a:extLst>
+              <a:ext uri="{FF2B5EF4-FFF2-40B4-BE49-F238E27FC236}">
+                <a16:creationId xmlns:a16="http://schemas.microsoft.com/office/drawing/2014/main" id="{9EDCC85D-1D15-C249-0935-48BA92CFD7C6}"/>
+              </a:ext>
+            </a:extLst>
+          </p:cNvPr>
+          <p:cNvSpPr txBox="1"/>
+          <p:nvPr/>
+        </p:nvSpPr>
+        <p:spPr>
+          <a:xfrm>
+            <a:off x="627321" y="5369099"/>
+            <a:ext cx="10164726" cy="461665"/>
+          </a:xfrm>
+          <a:prstGeom prst="rect">
+            <a:avLst/>
+          </a:prstGeom>
+          <a:noFill/>
+        </p:spPr>
+        <p:txBody>
+          <a:bodyPr wrap="square">
+            <a:spAutoFit/>
+          </a:bodyPr>
+          <a:lstStyle/>
+          <a:p>
+            <a:r>
+              <a:rPr lang="en-US" sz="2400" dirty="0"/>
+              <a:t>You are in a unique position as (currently) only you can build the Torment Nexus</a:t>
+            </a:r>
           </a:p>
         </p:txBody>
       </p:sp>
@@ -34191,235 +34300,6 @@
   <p:clrMapOvr>
     <a:masterClrMapping/>
   </p:clrMapOvr>
-  <p:timing>
-    <p:tnLst>
-      <p:par>
-        <p:cTn id="1" dur="indefinite" restart="never" nodeType="tmRoot">
-          <p:childTnLst>
-            <p:seq concurrent="1" nextAc="seek">
-              <p:cTn id="2" dur="indefinite" nodeType="mainSeq">
-                <p:childTnLst>
-                  <p:par>
-                    <p:cTn id="3" fill="hold">
-                      <p:stCondLst>
-                        <p:cond delay="indefinite"/>
-                      </p:stCondLst>
-                      <p:childTnLst>
-                        <p:par>
-                          <p:cTn id="4" fill="hold">
-                            <p:stCondLst>
-                              <p:cond delay="0"/>
-                            </p:stCondLst>
-                            <p:childTnLst>
-                              <p:par>
-                                <p:cTn id="5" presetID="1" presetClass="entr" presetSubtype="0" fill="hold" grpId="0" nodeType="clickEffect">
-                                  <p:stCondLst>
-                                    <p:cond delay="0"/>
-                                  </p:stCondLst>
-                                  <p:childTnLst>
-                                    <p:set>
-                                      <p:cBhvr>
-                                        <p:cTn id="6" dur="1" fill="hold">
-                                          <p:stCondLst>
-                                            <p:cond delay="0"/>
-                                          </p:stCondLst>
-                                        </p:cTn>
-                                        <p:tgtEl>
-                                          <p:spTgt spid="8">
-                                            <p:txEl>
-                                              <p:pRg st="0" end="0"/>
-                                            </p:txEl>
-                                          </p:spTgt>
-                                        </p:tgtEl>
-                                        <p:attrNameLst>
-                                          <p:attrName>style.visibility</p:attrName>
-                                        </p:attrNameLst>
-                                      </p:cBhvr>
-                                      <p:to>
-                                        <p:strVal val="visible"/>
-                                      </p:to>
-                                    </p:set>
-                                  </p:childTnLst>
-                                </p:cTn>
-                              </p:par>
-                            </p:childTnLst>
-                          </p:cTn>
-                        </p:par>
-                      </p:childTnLst>
-                    </p:cTn>
-                  </p:par>
-                  <p:par>
-                    <p:cTn id="7" fill="hold">
-                      <p:stCondLst>
-                        <p:cond delay="indefinite"/>
-                      </p:stCondLst>
-                      <p:childTnLst>
-                        <p:par>
-                          <p:cTn id="8" fill="hold">
-                            <p:stCondLst>
-                              <p:cond delay="0"/>
-                            </p:stCondLst>
-                            <p:childTnLst>
-                              <p:par>
-                                <p:cTn id="9" presetID="1" presetClass="entr" presetSubtype="0" fill="hold" grpId="0" nodeType="clickEffect">
-                                  <p:stCondLst>
-                                    <p:cond delay="0"/>
-                                  </p:stCondLst>
-                                  <p:childTnLst>
-                                    <p:set>
-                                      <p:cBhvr>
-                                        <p:cTn id="10" dur="1" fill="hold">
-                                          <p:stCondLst>
-                                            <p:cond delay="0"/>
-                                          </p:stCondLst>
-                                        </p:cTn>
-                                        <p:tgtEl>
-                                          <p:spTgt spid="8">
-                                            <p:txEl>
-                                              <p:pRg st="2" end="2"/>
-                                            </p:txEl>
-                                          </p:spTgt>
-                                        </p:tgtEl>
-                                        <p:attrNameLst>
-                                          <p:attrName>style.visibility</p:attrName>
-                                        </p:attrNameLst>
-                                      </p:cBhvr>
-                                      <p:to>
-                                        <p:strVal val="visible"/>
-                                      </p:to>
-                                    </p:set>
-                                  </p:childTnLst>
-                                </p:cTn>
-                              </p:par>
-                            </p:childTnLst>
-                          </p:cTn>
-                        </p:par>
-                      </p:childTnLst>
-                    </p:cTn>
-                  </p:par>
-                  <p:par>
-                    <p:cTn id="11" fill="hold">
-                      <p:stCondLst>
-                        <p:cond delay="indefinite"/>
-                      </p:stCondLst>
-                      <p:childTnLst>
-                        <p:par>
-                          <p:cTn id="12" fill="hold">
-                            <p:stCondLst>
-                              <p:cond delay="0"/>
-                            </p:stCondLst>
-                            <p:childTnLst>
-                              <p:par>
-                                <p:cTn id="13" presetID="1" presetClass="entr" presetSubtype="0" fill="hold" grpId="0" nodeType="clickEffect">
-                                  <p:stCondLst>
-                                    <p:cond delay="0"/>
-                                  </p:stCondLst>
-                                  <p:childTnLst>
-                                    <p:set>
-                                      <p:cBhvr>
-                                        <p:cTn id="14" dur="1" fill="hold">
-                                          <p:stCondLst>
-                                            <p:cond delay="0"/>
-                                          </p:stCondLst>
-                                        </p:cTn>
-                                        <p:tgtEl>
-                                          <p:spTgt spid="8">
-                                            <p:txEl>
-                                              <p:pRg st="4" end="4"/>
-                                            </p:txEl>
-                                          </p:spTgt>
-                                        </p:tgtEl>
-                                        <p:attrNameLst>
-                                          <p:attrName>style.visibility</p:attrName>
-                                        </p:attrNameLst>
-                                      </p:cBhvr>
-                                      <p:to>
-                                        <p:strVal val="visible"/>
-                                      </p:to>
-                                    </p:set>
-                                  </p:childTnLst>
-                                </p:cTn>
-                              </p:par>
-                            </p:childTnLst>
-                          </p:cTn>
-                        </p:par>
-                      </p:childTnLst>
-                    </p:cTn>
-                  </p:par>
-                  <p:par>
-                    <p:cTn id="15" fill="hold">
-                      <p:stCondLst>
-                        <p:cond delay="indefinite"/>
-                      </p:stCondLst>
-                      <p:childTnLst>
-                        <p:par>
-                          <p:cTn id="16" fill="hold">
-                            <p:stCondLst>
-                              <p:cond delay="0"/>
-                            </p:stCondLst>
-                            <p:childTnLst>
-                              <p:par>
-                                <p:cTn id="17" presetID="1" presetClass="entr" presetSubtype="0" fill="hold" grpId="0" nodeType="clickEffect">
-                                  <p:stCondLst>
-                                    <p:cond delay="0"/>
-                                  </p:stCondLst>
-                                  <p:childTnLst>
-                                    <p:set>
-                                      <p:cBhvr>
-                                        <p:cTn id="18" dur="1" fill="hold">
-                                          <p:stCondLst>
-                                            <p:cond delay="0"/>
-                                          </p:stCondLst>
-                                        </p:cTn>
-                                        <p:tgtEl>
-                                          <p:spTgt spid="8">
-                                            <p:txEl>
-                                              <p:pRg st="6" end="6"/>
-                                            </p:txEl>
-                                          </p:spTgt>
-                                        </p:tgtEl>
-                                        <p:attrNameLst>
-                                          <p:attrName>style.visibility</p:attrName>
-                                        </p:attrNameLst>
-                                      </p:cBhvr>
-                                      <p:to>
-                                        <p:strVal val="visible"/>
-                                      </p:to>
-                                    </p:set>
-                                  </p:childTnLst>
-                                </p:cTn>
-                              </p:par>
-                            </p:childTnLst>
-                          </p:cTn>
-                        </p:par>
-                      </p:childTnLst>
-                    </p:cTn>
-                  </p:par>
-                </p:childTnLst>
-              </p:cTn>
-              <p:prevCondLst>
-                <p:cond evt="onPrev" delay="0">
-                  <p:tgtEl>
-                    <p:sldTgt/>
-                  </p:tgtEl>
-                </p:cond>
-              </p:prevCondLst>
-              <p:nextCondLst>
-                <p:cond evt="onNext" delay="0">
-                  <p:tgtEl>
-                    <p:sldTgt/>
-                  </p:tgtEl>
-                </p:cond>
-              </p:nextCondLst>
-            </p:seq>
-          </p:childTnLst>
-        </p:cTn>
-      </p:par>
-    </p:tnLst>
-    <p:bldLst>
-      <p:bldP spid="8" grpId="0" build="p"/>
-    </p:bldLst>
-  </p:timing>
 </p:sld>
 </file>
 
@@ -35852,8 +35732,14 @@
           <p:nvPr/>
         </p:nvPicPr>
         <p:blipFill rotWithShape="1">
-          <a:blip r:embed="rId2"/>
-          <a:srcRect l="-765" t="5778" r="1" b="45037"/>
+          <a:blip r:embed="rId2" cstate="hqprint">
+            <a:extLst>
+              <a:ext uri="{28A0092B-C50C-407E-A947-70E740481C1C}">
+                <a14:useLocalDpi xmlns:a14="http://schemas.microsoft.com/office/drawing/2010/main"/>
+              </a:ext>
+            </a:extLst>
+          </a:blip>
+          <a:srcRect l="-765"/>
           <a:stretch/>
         </p:blipFill>
         <p:spPr>
@@ -36922,14 +36808,14 @@
           <p:nvPr/>
         </p:nvPicPr>
         <p:blipFill rotWithShape="1">
-          <a:blip r:embed="rId2">
+          <a:blip r:embed="rId2" cstate="hqprint">
             <a:extLst>
               <a:ext uri="{28A0092B-C50C-407E-A947-70E740481C1C}">
-                <a14:useLocalDpi xmlns:a14="http://schemas.microsoft.com/office/drawing/2010/main" val="0"/>
+                <a14:useLocalDpi xmlns:a14="http://schemas.microsoft.com/office/drawing/2010/main"/>
               </a:ext>
             </a:extLst>
           </a:blip>
-          <a:srcRect t="64522"/>
+          <a:srcRect/>
           <a:stretch/>
         </p:blipFill>
         <p:spPr bwMode="auto">
@@ -37035,7 +36921,15 @@
             </a:br>
             <a:r>
               <a:rPr lang="en-US" dirty="0"/>
-              <a:t>Don’t have example screenshots, but the text would read something like:</a:t>
+              <a:t>Don’t have example screenshots, but the </a:t>
+            </a:r>
+            <a:r>
+              <a:rPr lang="en-US"/>
+              <a:t>text often read </a:t>
+            </a:r>
+            <a:r>
+              <a:rPr lang="en-US" dirty="0"/>
+              <a:t>something like:</a:t>
             </a:r>
           </a:p>
           <a:p>
@@ -39145,7 +39039,22 @@
 </file>
 
 <file path=customXml/itemProps2.xml><?xml version="1.0" encoding="utf-8"?>
-<ds:datastoreItem xmlns:ds="http://schemas.openxmlformats.org/officeDocument/2006/customXml" ds:itemID="{B5B596C8-1159-469B-AA3E-BA8D32107128}"/>
+<ds:datastoreItem xmlns:ds="http://schemas.openxmlformats.org/officeDocument/2006/customXml" ds:itemID="{B5B596C8-1159-469B-AA3E-BA8D32107128}">
+  <ds:schemaRefs>
+    <ds:schemaRef ds:uri="http://schemas.microsoft.com/office/2006/metadata/contentType"/>
+    <ds:schemaRef ds:uri="http://schemas.microsoft.com/office/2006/metadata/properties/metaAttributes"/>
+    <ds:schemaRef ds:uri="http://www.w3.org/2001/XMLSchema"/>
+    <ds:schemaRef ds:uri="http://schemas.microsoft.com/office/2006/metadata/properties"/>
+    <ds:schemaRef ds:uri="f3afbf2d-beef-446a-8758-84a7ca43c063"/>
+    <ds:schemaRef ds:uri="9fd4432a-144b-407a-b5c0-3f4ed8389bd1"/>
+    <ds:schemaRef ds:uri="http://schemas.microsoft.com/office/2006/documentManagement/types"/>
+    <ds:schemaRef ds:uri="http://schemas.microsoft.com/office/infopath/2007/PartnerControls"/>
+    <ds:schemaRef ds:uri="http://schemas.openxmlformats.org/package/2006/metadata/core-properties"/>
+    <ds:schemaRef ds:uri="http://purl.org/dc/elements/1.1/"/>
+    <ds:schemaRef ds:uri="http://purl.org/dc/terms/"/>
+    <ds:schemaRef ds:uri="http://schemas.microsoft.com/internal/obd"/>
+  </ds:schemaRefs>
+</ds:datastoreItem>
 </file>
 
 <file path=customXml/itemProps3.xml><?xml version="1.0" encoding="utf-8"?>
@@ -39159,11 +39068,16 @@
 <file path=customXml/itemProps4.xml><?xml version="1.0" encoding="utf-8"?>
 <ds:datastoreItem xmlns:ds="http://schemas.openxmlformats.org/officeDocument/2006/customXml" ds:itemID="{5424892E-6F5B-4B3D-A0B2-C94E0E70757D}">
   <ds:schemaRefs>
+    <ds:schemaRef ds:uri="http://purl.org/dc/terms/"/>
+    <ds:schemaRef ds:uri="http://schemas.microsoft.com/office/2006/documentManagement/types"/>
+    <ds:schemaRef ds:uri="http://www.w3.org/XML/1998/namespace"/>
+    <ds:schemaRef ds:uri="http://purl.org/dc/elements/1.1/"/>
+    <ds:schemaRef ds:uri="http://schemas.openxmlformats.org/package/2006/metadata/core-properties"/>
+    <ds:schemaRef ds:uri="http://schemas.microsoft.com/office/infopath/2007/PartnerControls"/>
+    <ds:schemaRef ds:uri="http://purl.org/dc/dcmitype/"/>
+    <ds:schemaRef ds:uri="9fd4432a-144b-407a-b5c0-3f4ed8389bd1"/>
+    <ds:schemaRef ds:uri="f3afbf2d-beef-446a-8758-84a7ca43c063"/>
     <ds:schemaRef ds:uri="http://schemas.microsoft.com/office/2006/metadata/properties"/>
-    <ds:schemaRef ds:uri="http://schemas.microsoft.com/office/infopath/2007/PartnerControls"/>
-    <ds:schemaRef ds:uri="36db7593-11e2-4df2-bb2d-93a15c2677c1"/>
-    <ds:schemaRef ds:uri="4dfdbeff-a6c2-46f1-841b-e2fa795391a2"/>
-    <ds:schemaRef ds:uri="f3afbf2d-beef-446a-8758-84a7ca43c063"/>
   </ds:schemaRefs>
 </ds:datastoreItem>
 </file>

</xml_diff>

<commit_message>
final final final changes (2) _ FINAL_FINAL.docx
</commit_message>
<xml_diff>
--- a/PMLG talk.pptx
+++ b/PMLG talk.pptx
@@ -6,10 +6,10 @@
     <p:sldMasterId id="2147483677" r:id="rId7"/>
   </p:sldMasterIdLst>
   <p:notesMasterIdLst>
-    <p:notesMasterId r:id="rId38"/>
+    <p:notesMasterId r:id="rId39"/>
   </p:notesMasterIdLst>
   <p:handoutMasterIdLst>
-    <p:handoutMasterId r:id="rId39"/>
+    <p:handoutMasterId r:id="rId40"/>
   </p:handoutMasterIdLst>
   <p:sldIdLst>
     <p:sldId id="256" r:id="rId8"/>
@@ -33,15 +33,16 @@
     <p:sldId id="302" r:id="rId26"/>
     <p:sldId id="300" r:id="rId27"/>
     <p:sldId id="8413" r:id="rId28"/>
-    <p:sldId id="280" r:id="rId29"/>
-    <p:sldId id="281" r:id="rId30"/>
-    <p:sldId id="286" r:id="rId31"/>
-    <p:sldId id="287" r:id="rId32"/>
-    <p:sldId id="8417" r:id="rId33"/>
+    <p:sldId id="286" r:id="rId29"/>
+    <p:sldId id="287" r:id="rId30"/>
+    <p:sldId id="8418" r:id="rId31"/>
+    <p:sldId id="8417" r:id="rId32"/>
+    <p:sldId id="280" r:id="rId33"/>
     <p:sldId id="288" r:id="rId34"/>
     <p:sldId id="292" r:id="rId35"/>
-    <p:sldId id="291" r:id="rId36"/>
-    <p:sldId id="270" r:id="rId37"/>
+    <p:sldId id="281" r:id="rId36"/>
+    <p:sldId id="291" r:id="rId37"/>
+    <p:sldId id="270" r:id="rId38"/>
   </p:sldIdLst>
   <p:sldSz cx="12192000" cy="6858000"/>
   <p:notesSz cx="6858000" cy="9144000"/>
@@ -153,6 +154,7 @@
 
 <file path=ppt/authors.xml><?xml version="1.0" encoding="utf-8"?>
 <p188:authorLst xmlns:a="http://schemas.openxmlformats.org/drawingml/2006/main" xmlns:r="http://schemas.openxmlformats.org/officeDocument/2006/relationships" xmlns:p188="http://schemas.microsoft.com/office/powerpoint/2018/8/main">
+  <p188:author id="{97D45F0E-F99F-27EA-07EB-ECB7B23D1D6F}" name="Sebastian Rauschert" initials="SR" userId="S::srauschert@minderoo.com.au::ba9a0adb-e6ad-4fdb-bf10-cdee82226ada" providerId="AD"/>
   <p188:author id="{19456257-B2D9-FACB-7E18-0602EF713BE5}" name="Philipp Bayer" initials="PB" userId="S::pbayer@minderoo.com.au::f1ce6f2d-d6ba-4d38-8b9a-d25f69ad1513" providerId="AD"/>
   <p188:author id="{FB2D24CD-8E41-1C60-FC79-EDE9669CB6EA}" name="Jemma Rowe" initials="JR" userId="S::jrowe@minderoo.com.au::6da1feea-1c1e-4a8e-8dcc-9c74511df25d" providerId="AD"/>
 </p188:authorLst>
@@ -161,7 +163,8 @@
 <file path=ppt/revisionInfo.xml><?xml version="1.0" encoding="utf-8"?>
 <p1510:revInfo xmlns:a="http://schemas.openxmlformats.org/drawingml/2006/main" xmlns:r="http://schemas.openxmlformats.org/officeDocument/2006/relationships" xmlns:p1510="http://schemas.microsoft.com/office/powerpoint/2015/10/main">
   <p1510:revLst>
-    <p1510:client id="{80D561A8-B16A-4DB0-ADD0-1D4EA6CA7967}" v="1042" dt="2023-06-18T13:21:36.488"/>
+    <p1510:client id="{292EE10E-3F08-0641-B982-B0567F30FFDF}" v="23" dt="2023-06-19T04:11:05.307"/>
+    <p1510:client id="{80D561A8-B16A-4DB0-ADD0-1D4EA6CA7967}" v="1637" dt="2023-06-19T05:29:47.892"/>
   </p1510:revLst>
 </p1510:revInfo>
 </file>
@@ -169,9 +172,82 @@
 <file path=ppt/changesInfos/changesInfo1.xml><?xml version="1.0" encoding="utf-8"?>
 <pc:chgInfo xmlns:a="http://schemas.openxmlformats.org/drawingml/2006/main" xmlns:r="http://schemas.openxmlformats.org/officeDocument/2006/relationships" xmlns:ac="http://schemas.microsoft.com/office/drawing/2013/main/command" xmlns:pc="http://schemas.microsoft.com/office/powerpoint/2013/main/command">
   <pc:docChgLst>
+    <pc:chgData name="Sebastian Rauschert" userId="ba9a0adb-e6ad-4fdb-bf10-cdee82226ada" providerId="ADAL" clId="{292EE10E-3F08-0641-B982-B0567F30FFDF}"/>
+    <pc:docChg chg="undo custSel modSld">
+      <pc:chgData name="Sebastian Rauschert" userId="ba9a0adb-e6ad-4fdb-bf10-cdee82226ada" providerId="ADAL" clId="{292EE10E-3F08-0641-B982-B0567F30FFDF}" dt="2023-06-19T04:11:05.307" v="18"/>
+      <pc:docMkLst>
+        <pc:docMk/>
+      </pc:docMkLst>
+      <pc:sldChg chg="modSp">
+        <pc:chgData name="Sebastian Rauschert" userId="ba9a0adb-e6ad-4fdb-bf10-cdee82226ada" providerId="ADAL" clId="{292EE10E-3F08-0641-B982-B0567F30FFDF}" dt="2023-06-18T23:27:49.653" v="13" actId="207"/>
+        <pc:sldMkLst>
+          <pc:docMk/>
+          <pc:sldMk cId="3853566486" sldId="283"/>
+        </pc:sldMkLst>
+        <pc:spChg chg="mod">
+          <ac:chgData name="Sebastian Rauschert" userId="ba9a0adb-e6ad-4fdb-bf10-cdee82226ada" providerId="ADAL" clId="{292EE10E-3F08-0641-B982-B0567F30FFDF}" dt="2023-06-18T23:27:49.653" v="13" actId="207"/>
+          <ac:spMkLst>
+            <pc:docMk/>
+            <pc:sldMk cId="3853566486" sldId="283"/>
+            <ac:spMk id="8" creationId="{11B93F59-E86F-BB9B-E9F0-9F9F97DAAF6D}"/>
+          </ac:spMkLst>
+        </pc:spChg>
+      </pc:sldChg>
+      <pc:sldChg chg="modSp">
+        <pc:chgData name="Sebastian Rauschert" userId="ba9a0adb-e6ad-4fdb-bf10-cdee82226ada" providerId="ADAL" clId="{292EE10E-3F08-0641-B982-B0567F30FFDF}" dt="2023-06-18T23:28:20.610" v="15" actId="12"/>
+        <pc:sldMkLst>
+          <pc:docMk/>
+          <pc:sldMk cId="938062088" sldId="284"/>
+        </pc:sldMkLst>
+        <pc:spChg chg="mod">
+          <ac:chgData name="Sebastian Rauschert" userId="ba9a0adb-e6ad-4fdb-bf10-cdee82226ada" providerId="ADAL" clId="{292EE10E-3F08-0641-B982-B0567F30FFDF}" dt="2023-06-18T23:28:20.610" v="15" actId="12"/>
+          <ac:spMkLst>
+            <pc:docMk/>
+            <pc:sldMk cId="938062088" sldId="284"/>
+            <ac:spMk id="8" creationId="{11B93F59-E86F-BB9B-E9F0-9F9F97DAAF6D}"/>
+          </ac:spMkLst>
+        </pc:spChg>
+      </pc:sldChg>
+      <pc:sldChg chg="modSp mod addCm">
+        <pc:chgData name="Sebastian Rauschert" userId="ba9a0adb-e6ad-4fdb-bf10-cdee82226ada" providerId="ADAL" clId="{292EE10E-3F08-0641-B982-B0567F30FFDF}" dt="2023-06-19T04:11:05.307" v="18"/>
+        <pc:sldMkLst>
+          <pc:docMk/>
+          <pc:sldMk cId="3589355139" sldId="287"/>
+        </pc:sldMkLst>
+        <pc:spChg chg="mod">
+          <ac:chgData name="Sebastian Rauschert" userId="ba9a0adb-e6ad-4fdb-bf10-cdee82226ada" providerId="ADAL" clId="{292EE10E-3F08-0641-B982-B0567F30FFDF}" dt="2023-06-19T04:09:44.355" v="17" actId="1076"/>
+          <ac:spMkLst>
+            <pc:docMk/>
+            <pc:sldMk cId="3589355139" sldId="287"/>
+            <ac:spMk id="8" creationId="{11B93F59-E86F-BB9B-E9F0-9F9F97DAAF6D}"/>
+          </ac:spMkLst>
+        </pc:spChg>
+        <pc:extLst>
+          <p:ext xmlns:p="http://schemas.openxmlformats.org/presentationml/2006/main" uri="{D6D511B9-2390-475A-947B-AFAB55BFBCF1}">
+            <pc226:cmChg xmlns:pc226="http://schemas.microsoft.com/office/powerpoint/2022/06/main/command" chg="add">
+              <pc226:chgData name="Sebastian Rauschert" userId="ba9a0adb-e6ad-4fdb-bf10-cdee82226ada" providerId="ADAL" clId="{292EE10E-3F08-0641-B982-B0567F30FFDF}" dt="2023-06-19T04:11:05.307" v="18"/>
+              <pc2:cmMkLst xmlns:pc2="http://schemas.microsoft.com/office/powerpoint/2019/9/main/command">
+                <pc:docMk/>
+                <pc:sldMk cId="3589355139" sldId="287"/>
+                <pc2:cmMk id="{E00F391E-22F1-6A45-9E7C-B3A6D24FECC2}"/>
+              </pc2:cmMkLst>
+            </pc226:cmChg>
+          </p:ext>
+        </pc:extLst>
+      </pc:sldChg>
+      <pc:sldChg chg="setBg">
+        <pc:chgData name="Sebastian Rauschert" userId="ba9a0adb-e6ad-4fdb-bf10-cdee82226ada" providerId="ADAL" clId="{292EE10E-3F08-0641-B982-B0567F30FFDF}" dt="2023-06-18T23:26:12.743" v="0"/>
+        <pc:sldMkLst>
+          <pc:docMk/>
+          <pc:sldMk cId="4285664106" sldId="8412"/>
+        </pc:sldMkLst>
+      </pc:sldChg>
+    </pc:docChg>
+  </pc:docChgLst>
+  <pc:docChgLst>
     <pc:chgData name="Philipp Bayer" userId="f1ce6f2d-d6ba-4d38-8b9a-d25f69ad1513" providerId="ADAL" clId="{80D561A8-B16A-4DB0-ADD0-1D4EA6CA7967}"/>
     <pc:docChg chg="undo custSel addSld delSld modSld modMainMaster">
-      <pc:chgData name="Philipp Bayer" userId="f1ce6f2d-d6ba-4d38-8b9a-d25f69ad1513" providerId="ADAL" clId="{80D561A8-B16A-4DB0-ADD0-1D4EA6CA7967}" dt="2023-06-18T13:21:56.121" v="1456" actId="6549"/>
+      <pc:chgData name="Philipp Bayer" userId="f1ce6f2d-d6ba-4d38-8b9a-d25f69ad1513" providerId="ADAL" clId="{80D561A8-B16A-4DB0-ADD0-1D4EA6CA7967}" dt="2023-06-19T05:30:35.673" v="2230" actId="20577"/>
       <pc:docMkLst>
         <pc:docMk/>
       </pc:docMkLst>
@@ -190,8 +266,8 @@
           </ac:spMkLst>
         </pc:spChg>
       </pc:sldChg>
-      <pc:sldChg chg="modSp">
-        <pc:chgData name="Philipp Bayer" userId="f1ce6f2d-d6ba-4d38-8b9a-d25f69ad1513" providerId="ADAL" clId="{80D561A8-B16A-4DB0-ADD0-1D4EA6CA7967}" dt="2023-06-18T13:17:46.816" v="1204"/>
+      <pc:sldChg chg="modSp del addCm">
+        <pc:chgData name="Philipp Bayer" userId="f1ce6f2d-d6ba-4d38-8b9a-d25f69ad1513" providerId="ADAL" clId="{80D561A8-B16A-4DB0-ADD0-1D4EA6CA7967}" dt="2023-06-19T05:12:23.147" v="1459" actId="2696"/>
         <pc:sldMkLst>
           <pc:docMk/>
           <pc:sldMk cId="640865080" sldId="280"/>
@@ -212,9 +288,55 @@
             <ac:spMk id="8" creationId="{11B93F59-E86F-BB9B-E9F0-9F9F97DAAF6D}"/>
           </ac:spMkLst>
         </pc:spChg>
+        <pc:extLst>
+          <p:ext xmlns:p="http://schemas.openxmlformats.org/presentationml/2006/main" uri="{D6D511B9-2390-475A-947B-AFAB55BFBCF1}">
+            <pc226:cmChg xmlns:pc226="http://schemas.microsoft.com/office/powerpoint/2022/06/main/command" chg="add">
+              <pc226:chgData name="Philipp Bayer" userId="f1ce6f2d-d6ba-4d38-8b9a-d25f69ad1513" providerId="ADAL" clId="{80D561A8-B16A-4DB0-ADD0-1D4EA6CA7967}" dt="2023-06-19T03:17:18.400" v="1457"/>
+              <pc2:cmMkLst xmlns:pc2="http://schemas.microsoft.com/office/powerpoint/2019/9/main/command">
+                <pc:docMk/>
+                <pc:sldMk cId="640865080" sldId="280"/>
+                <pc2:cmMk id="{F49DC665-80BB-43A8-8952-A27B1EBEBF19}"/>
+              </pc2:cmMkLst>
+            </pc226:cmChg>
+          </p:ext>
+        </pc:extLst>
       </pc:sldChg>
-      <pc:sldChg chg="addSp delSp modSp mod modAnim">
-        <pc:chgData name="Philipp Bayer" userId="f1ce6f2d-d6ba-4d38-8b9a-d25f69ad1513" providerId="ADAL" clId="{80D561A8-B16A-4DB0-ADD0-1D4EA6CA7967}" dt="2023-06-18T13:17:46.816" v="1204"/>
+      <pc:sldChg chg="modSp add mod modAnim delCm modNotesTx">
+        <pc:chgData name="Philipp Bayer" userId="f1ce6f2d-d6ba-4d38-8b9a-d25f69ad1513" providerId="ADAL" clId="{80D561A8-B16A-4DB0-ADD0-1D4EA6CA7967}" dt="2023-06-19T05:27:22.825" v="2096" actId="20577"/>
+        <pc:sldMkLst>
+          <pc:docMk/>
+          <pc:sldMk cId="2968494867" sldId="280"/>
+        </pc:sldMkLst>
+        <pc:spChg chg="mod">
+          <ac:chgData name="Philipp Bayer" userId="f1ce6f2d-d6ba-4d38-8b9a-d25f69ad1513" providerId="ADAL" clId="{80D561A8-B16A-4DB0-ADD0-1D4EA6CA7967}" dt="2023-06-19T05:27:22.825" v="2096" actId="20577"/>
+          <ac:spMkLst>
+            <pc:docMk/>
+            <pc:sldMk cId="2968494867" sldId="280"/>
+            <ac:spMk id="8" creationId="{11B93F59-E86F-BB9B-E9F0-9F9F97DAAF6D}"/>
+          </ac:spMkLst>
+        </pc:spChg>
+        <pc:extLst>
+          <p:ext xmlns:p="http://schemas.openxmlformats.org/presentationml/2006/main" uri="{D6D511B9-2390-475A-947B-AFAB55BFBCF1}">
+            <pc226:cmChg xmlns:pc226="http://schemas.microsoft.com/office/powerpoint/2022/06/main/command" chg="del">
+              <pc226:chgData name="Philipp Bayer" userId="f1ce6f2d-d6ba-4d38-8b9a-d25f69ad1513" providerId="ADAL" clId="{80D561A8-B16A-4DB0-ADD0-1D4EA6CA7967}" dt="2023-06-19T05:12:49.497" v="1463"/>
+              <pc2:cmMkLst xmlns:pc2="http://schemas.microsoft.com/office/powerpoint/2019/9/main/command">
+                <pc:docMk/>
+                <pc:sldMk cId="2968494867" sldId="280"/>
+                <pc2:cmMk id="{DC69FD0D-98CD-4DAE-9982-69023EF515BC}"/>
+              </pc2:cmMkLst>
+            </pc226:cmChg>
+          </p:ext>
+        </pc:extLst>
+      </pc:sldChg>
+      <pc:sldChg chg="add del">
+        <pc:chgData name="Philipp Bayer" userId="f1ce6f2d-d6ba-4d38-8b9a-d25f69ad1513" providerId="ADAL" clId="{80D561A8-B16A-4DB0-ADD0-1D4EA6CA7967}" dt="2023-06-19T05:12:39.774" v="1461" actId="2696"/>
+        <pc:sldMkLst>
+          <pc:docMk/>
+          <pc:sldMk cId="1459274908" sldId="281"/>
+        </pc:sldMkLst>
+      </pc:sldChg>
+      <pc:sldChg chg="addSp delSp modSp del mod modAnim">
+        <pc:chgData name="Philipp Bayer" userId="f1ce6f2d-d6ba-4d38-8b9a-d25f69ad1513" providerId="ADAL" clId="{80D561A8-B16A-4DB0-ADD0-1D4EA6CA7967}" dt="2023-06-19T05:12:23.147" v="1459" actId="2696"/>
         <pc:sldMkLst>
           <pc:docMk/>
           <pc:sldMk cId="2404152885" sldId="281"/>
@@ -248,6 +370,37 @@
           <ac:picMkLst>
             <pc:docMk/>
             <pc:sldMk cId="2404152885" sldId="281"/>
+            <ac:picMk id="1026" creationId="{8AD83AEF-D79C-31B4-42BC-95521827571C}"/>
+          </ac:picMkLst>
+        </pc:picChg>
+      </pc:sldChg>
+      <pc:sldChg chg="delSp modSp add mod modNotesTx">
+        <pc:chgData name="Philipp Bayer" userId="f1ce6f2d-d6ba-4d38-8b9a-d25f69ad1513" providerId="ADAL" clId="{80D561A8-B16A-4DB0-ADD0-1D4EA6CA7967}" dt="2023-06-19T05:27:53.421" v="2163" actId="20577"/>
+        <pc:sldMkLst>
+          <pc:docMk/>
+          <pc:sldMk cId="3984467307" sldId="281"/>
+        </pc:sldMkLst>
+        <pc:spChg chg="del mod">
+          <ac:chgData name="Philipp Bayer" userId="f1ce6f2d-d6ba-4d38-8b9a-d25f69ad1513" providerId="ADAL" clId="{80D561A8-B16A-4DB0-ADD0-1D4EA6CA7967}" dt="2023-06-19T05:13:41.974" v="1471"/>
+          <ac:spMkLst>
+            <pc:docMk/>
+            <pc:sldMk cId="3984467307" sldId="281"/>
+            <ac:spMk id="5" creationId="{9EDCC85D-1D15-C249-0935-48BA92CFD7C6}"/>
+          </ac:spMkLst>
+        </pc:spChg>
+        <pc:spChg chg="mod">
+          <ac:chgData name="Philipp Bayer" userId="f1ce6f2d-d6ba-4d38-8b9a-d25f69ad1513" providerId="ADAL" clId="{80D561A8-B16A-4DB0-ADD0-1D4EA6CA7967}" dt="2023-06-19T05:27:41.191" v="2112" actId="20577"/>
+          <ac:spMkLst>
+            <pc:docMk/>
+            <pc:sldMk cId="3984467307" sldId="281"/>
+            <ac:spMk id="12" creationId="{EF66C240-066A-6114-6051-A52BBF168323}"/>
+          </ac:spMkLst>
+        </pc:spChg>
+        <pc:picChg chg="mod">
+          <ac:chgData name="Philipp Bayer" userId="f1ce6f2d-d6ba-4d38-8b9a-d25f69ad1513" providerId="ADAL" clId="{80D561A8-B16A-4DB0-ADD0-1D4EA6CA7967}" dt="2023-06-19T05:22:35.080" v="1939" actId="1076"/>
+          <ac:picMkLst>
+            <pc:docMk/>
+            <pc:sldMk cId="3984467307" sldId="281"/>
             <ac:picMk id="1026" creationId="{8AD83AEF-D79C-31B4-42BC-95521827571C}"/>
           </ac:picMkLst>
         </pc:picChg>
@@ -312,8 +465,8 @@
           <pc:sldMk cId="3045680284" sldId="285"/>
         </pc:sldMkLst>
       </pc:sldChg>
-      <pc:sldChg chg="modSp">
-        <pc:chgData name="Philipp Bayer" userId="f1ce6f2d-d6ba-4d38-8b9a-d25f69ad1513" providerId="ADAL" clId="{80D561A8-B16A-4DB0-ADD0-1D4EA6CA7967}" dt="2023-06-18T13:17:46.816" v="1204"/>
+      <pc:sldChg chg="modSp mod modAnim modNotesTx">
+        <pc:chgData name="Philipp Bayer" userId="f1ce6f2d-d6ba-4d38-8b9a-d25f69ad1513" providerId="ADAL" clId="{80D561A8-B16A-4DB0-ADD0-1D4EA6CA7967}" dt="2023-06-19T05:28:45.664" v="2188" actId="207"/>
         <pc:sldMkLst>
           <pc:docMk/>
           <pc:sldMk cId="3013363526" sldId="286"/>
@@ -326,9 +479,17 @@
             <ac:spMk id="3" creationId="{D3B2DAC0-8F08-7376-11CC-10386AEADBD5}"/>
           </ac:spMkLst>
         </pc:spChg>
+        <pc:spChg chg="mod">
+          <ac:chgData name="Philipp Bayer" userId="f1ce6f2d-d6ba-4d38-8b9a-d25f69ad1513" providerId="ADAL" clId="{80D561A8-B16A-4DB0-ADD0-1D4EA6CA7967}" dt="2023-06-19T05:28:45.664" v="2188" actId="207"/>
+          <ac:spMkLst>
+            <pc:docMk/>
+            <pc:sldMk cId="3013363526" sldId="286"/>
+            <ac:spMk id="8" creationId="{11B93F59-E86F-BB9B-E9F0-9F9F97DAAF6D}"/>
+          </ac:spMkLst>
+        </pc:spChg>
       </pc:sldChg>
-      <pc:sldChg chg="modSp">
-        <pc:chgData name="Philipp Bayer" userId="f1ce6f2d-d6ba-4d38-8b9a-d25f69ad1513" providerId="ADAL" clId="{80D561A8-B16A-4DB0-ADD0-1D4EA6CA7967}" dt="2023-06-18T13:17:46.816" v="1204"/>
+      <pc:sldChg chg="modSp delCm">
+        <pc:chgData name="Philipp Bayer" userId="f1ce6f2d-d6ba-4d38-8b9a-d25f69ad1513" providerId="ADAL" clId="{80D561A8-B16A-4DB0-ADD0-1D4EA6CA7967}" dt="2023-06-19T05:26:40.788" v="2089" actId="207"/>
         <pc:sldMkLst>
           <pc:docMk/>
           <pc:sldMk cId="3589355139" sldId="287"/>
@@ -342,16 +503,28 @@
           </ac:spMkLst>
         </pc:spChg>
         <pc:spChg chg="mod">
-          <ac:chgData name="Philipp Bayer" userId="f1ce6f2d-d6ba-4d38-8b9a-d25f69ad1513" providerId="ADAL" clId="{80D561A8-B16A-4DB0-ADD0-1D4EA6CA7967}" dt="2023-06-18T12:57:15.297" v="814" actId="20577"/>
+          <ac:chgData name="Philipp Bayer" userId="f1ce6f2d-d6ba-4d38-8b9a-d25f69ad1513" providerId="ADAL" clId="{80D561A8-B16A-4DB0-ADD0-1D4EA6CA7967}" dt="2023-06-19T05:26:40.788" v="2089" actId="207"/>
           <ac:spMkLst>
             <pc:docMk/>
             <pc:sldMk cId="3589355139" sldId="287"/>
             <ac:spMk id="8" creationId="{11B93F59-E86F-BB9B-E9F0-9F9F97DAAF6D}"/>
           </ac:spMkLst>
         </pc:spChg>
+        <pc:extLst>
+          <p:ext xmlns:p="http://schemas.openxmlformats.org/presentationml/2006/main" uri="{D6D511B9-2390-475A-947B-AFAB55BFBCF1}">
+            <pc226:cmChg xmlns:pc226="http://schemas.microsoft.com/office/powerpoint/2022/06/main/command" chg="del">
+              <pc226:chgData name="Philipp Bayer" userId="f1ce6f2d-d6ba-4d38-8b9a-d25f69ad1513" providerId="ADAL" clId="{80D561A8-B16A-4DB0-ADD0-1D4EA6CA7967}" dt="2023-06-19T05:19:52.117" v="1900"/>
+              <pc2:cmMkLst xmlns:pc2="http://schemas.microsoft.com/office/powerpoint/2019/9/main/command">
+                <pc:docMk/>
+                <pc:sldMk cId="3589355139" sldId="287"/>
+                <pc2:cmMk id="{E00F391E-22F1-6A45-9E7C-B3A6D24FECC2}"/>
+              </pc2:cmMkLst>
+            </pc226:cmChg>
+          </p:ext>
+        </pc:extLst>
       </pc:sldChg>
-      <pc:sldChg chg="modSp">
-        <pc:chgData name="Philipp Bayer" userId="f1ce6f2d-d6ba-4d38-8b9a-d25f69ad1513" providerId="ADAL" clId="{80D561A8-B16A-4DB0-ADD0-1D4EA6CA7967}" dt="2023-06-18T13:20:00.019" v="1265" actId="20577"/>
+      <pc:sldChg chg="modSp mod modAnim modNotesTx">
+        <pc:chgData name="Philipp Bayer" userId="f1ce6f2d-d6ba-4d38-8b9a-d25f69ad1513" providerId="ADAL" clId="{80D561A8-B16A-4DB0-ADD0-1D4EA6CA7967}" dt="2023-06-19T05:22:24.180" v="1936" actId="20577"/>
         <pc:sldMkLst>
           <pc:docMk/>
           <pc:sldMk cId="1077690869" sldId="288"/>
@@ -365,7 +538,7 @@
           </ac:spMkLst>
         </pc:spChg>
         <pc:spChg chg="mod">
-          <ac:chgData name="Philipp Bayer" userId="f1ce6f2d-d6ba-4d38-8b9a-d25f69ad1513" providerId="ADAL" clId="{80D561A8-B16A-4DB0-ADD0-1D4EA6CA7967}" dt="2023-06-18T13:20:00.019" v="1265" actId="20577"/>
+          <ac:chgData name="Philipp Bayer" userId="f1ce6f2d-d6ba-4d38-8b9a-d25f69ad1513" providerId="ADAL" clId="{80D561A8-B16A-4DB0-ADD0-1D4EA6CA7967}" dt="2023-06-19T05:22:20.847" v="1930" actId="21"/>
           <ac:spMkLst>
             <pc:docMk/>
             <pc:sldMk cId="1077690869" sldId="288"/>
@@ -373,8 +546,8 @@
           </ac:spMkLst>
         </pc:spChg>
       </pc:sldChg>
-      <pc:sldChg chg="modSp">
-        <pc:chgData name="Philipp Bayer" userId="f1ce6f2d-d6ba-4d38-8b9a-d25f69ad1513" providerId="ADAL" clId="{80D561A8-B16A-4DB0-ADD0-1D4EA6CA7967}" dt="2023-06-18T13:17:46.816" v="1204"/>
+      <pc:sldChg chg="modSp mod">
+        <pc:chgData name="Philipp Bayer" userId="f1ce6f2d-d6ba-4d38-8b9a-d25f69ad1513" providerId="ADAL" clId="{80D561A8-B16A-4DB0-ADD0-1D4EA6CA7967}" dt="2023-06-19T05:29:05.929" v="2189" actId="207"/>
         <pc:sldMkLst>
           <pc:docMk/>
           <pc:sldMk cId="1539780967" sldId="289"/>
@@ -385,6 +558,14 @@
             <pc:docMk/>
             <pc:sldMk cId="1539780967" sldId="289"/>
             <ac:spMk id="3" creationId="{D3B2DAC0-8F08-7376-11CC-10386AEADBD5}"/>
+          </ac:spMkLst>
+        </pc:spChg>
+        <pc:spChg chg="mod">
+          <ac:chgData name="Philipp Bayer" userId="f1ce6f2d-d6ba-4d38-8b9a-d25f69ad1513" providerId="ADAL" clId="{80D561A8-B16A-4DB0-ADD0-1D4EA6CA7967}" dt="2023-06-19T05:29:05.929" v="2189" actId="207"/>
+          <ac:spMkLst>
+            <pc:docMk/>
+            <pc:sldMk cId="1539780967" sldId="289"/>
+            <ac:spMk id="9" creationId="{33007CAD-BD52-4D7F-F527-99F17C48DD81}"/>
           </ac:spMkLst>
         </pc:spChg>
       </pc:sldChg>
@@ -427,8 +608,8 @@
           </ac:picMkLst>
         </pc:picChg>
       </pc:sldChg>
-      <pc:sldChg chg="modSp">
-        <pc:chgData name="Philipp Bayer" userId="f1ce6f2d-d6ba-4d38-8b9a-d25f69ad1513" providerId="ADAL" clId="{80D561A8-B16A-4DB0-ADD0-1D4EA6CA7967}" dt="2023-06-18T13:17:46.816" v="1204"/>
+      <pc:sldChg chg="modSp modNotesTx">
+        <pc:chgData name="Philipp Bayer" userId="f1ce6f2d-d6ba-4d38-8b9a-d25f69ad1513" providerId="ADAL" clId="{80D561A8-B16A-4DB0-ADD0-1D4EA6CA7967}" dt="2023-06-19T05:22:40.819" v="1963" actId="20577"/>
         <pc:sldMkLst>
           <pc:docMk/>
           <pc:sldMk cId="1172856531" sldId="291"/>
@@ -457,8 +638,8 @@
           </ac:spMkLst>
         </pc:spChg>
       </pc:sldChg>
-      <pc:sldChg chg="modSp add">
-        <pc:chgData name="Philipp Bayer" userId="f1ce6f2d-d6ba-4d38-8b9a-d25f69ad1513" providerId="ADAL" clId="{80D561A8-B16A-4DB0-ADD0-1D4EA6CA7967}" dt="2023-06-18T13:17:46.816" v="1204"/>
+      <pc:sldChg chg="modSp add modNotesTx">
+        <pc:chgData name="Philipp Bayer" userId="f1ce6f2d-d6ba-4d38-8b9a-d25f69ad1513" providerId="ADAL" clId="{80D561A8-B16A-4DB0-ADD0-1D4EA6CA7967}" dt="2023-06-19T05:30:35.673" v="2230" actId="20577"/>
         <pc:sldMkLst>
           <pc:docMk/>
           <pc:sldMk cId="305937973" sldId="293"/>
@@ -510,7 +691,7 @@
         </pc:spChg>
       </pc:sldChg>
       <pc:sldChg chg="modSp">
-        <pc:chgData name="Philipp Bayer" userId="f1ce6f2d-d6ba-4d38-8b9a-d25f69ad1513" providerId="ADAL" clId="{80D561A8-B16A-4DB0-ADD0-1D4EA6CA7967}" dt="2023-06-18T13:17:46.816" v="1204"/>
+        <pc:chgData name="Philipp Bayer" userId="f1ce6f2d-d6ba-4d38-8b9a-d25f69ad1513" providerId="ADAL" clId="{80D561A8-B16A-4DB0-ADD0-1D4EA6CA7967}" dt="2023-06-19T05:25:16.481" v="2006" actId="207"/>
         <pc:sldMkLst>
           <pc:docMk/>
           <pc:sldMk cId="995497802" sldId="296"/>
@@ -521,6 +702,14 @@
             <pc:docMk/>
             <pc:sldMk cId="995497802" sldId="296"/>
             <ac:spMk id="3" creationId="{D3B2DAC0-8F08-7376-11CC-10386AEADBD5}"/>
+          </ac:spMkLst>
+        </pc:spChg>
+        <pc:spChg chg="mod">
+          <ac:chgData name="Philipp Bayer" userId="f1ce6f2d-d6ba-4d38-8b9a-d25f69ad1513" providerId="ADAL" clId="{80D561A8-B16A-4DB0-ADD0-1D4EA6CA7967}" dt="2023-06-19T05:25:16.481" v="2006" actId="207"/>
+          <ac:spMkLst>
+            <pc:docMk/>
+            <pc:sldMk cId="995497802" sldId="296"/>
+            <ac:spMk id="9" creationId="{33007CAD-BD52-4D7F-F527-99F17C48DD81}"/>
           </ac:spMkLst>
         </pc:spChg>
       </pc:sldChg>
@@ -540,11 +729,19 @@
         </pc:spChg>
       </pc:sldChg>
       <pc:sldChg chg="modSp modAnim">
-        <pc:chgData name="Philipp Bayer" userId="f1ce6f2d-d6ba-4d38-8b9a-d25f69ad1513" providerId="ADAL" clId="{80D561A8-B16A-4DB0-ADD0-1D4EA6CA7967}" dt="2023-06-18T13:17:46.816" v="1204"/>
+        <pc:chgData name="Philipp Bayer" userId="f1ce6f2d-d6ba-4d38-8b9a-d25f69ad1513" providerId="ADAL" clId="{80D561A8-B16A-4DB0-ADD0-1D4EA6CA7967}" dt="2023-06-19T05:25:37.440" v="2026" actId="20577"/>
         <pc:sldMkLst>
           <pc:docMk/>
           <pc:sldMk cId="3691662970" sldId="299"/>
         </pc:sldMkLst>
+        <pc:spChg chg="mod">
+          <ac:chgData name="Philipp Bayer" userId="f1ce6f2d-d6ba-4d38-8b9a-d25f69ad1513" providerId="ADAL" clId="{80D561A8-B16A-4DB0-ADD0-1D4EA6CA7967}" dt="2023-06-19T05:25:37.440" v="2026" actId="20577"/>
+          <ac:spMkLst>
+            <pc:docMk/>
+            <pc:sldMk cId="3691662970" sldId="299"/>
+            <ac:spMk id="2" creationId="{7059CDAB-77FA-4B0B-E390-09CC83431227}"/>
+          </ac:spMkLst>
+        </pc:spChg>
         <pc:spChg chg="mod">
           <ac:chgData name="Philipp Bayer" userId="f1ce6f2d-d6ba-4d38-8b9a-d25f69ad1513" providerId="ADAL" clId="{80D561A8-B16A-4DB0-ADD0-1D4EA6CA7967}" dt="2023-06-18T13:17:46.816" v="1204"/>
           <ac:spMkLst>
@@ -554,14 +751,14 @@
           </ac:spMkLst>
         </pc:spChg>
       </pc:sldChg>
-      <pc:sldChg chg="modSp">
-        <pc:chgData name="Philipp Bayer" userId="f1ce6f2d-d6ba-4d38-8b9a-d25f69ad1513" providerId="ADAL" clId="{80D561A8-B16A-4DB0-ADD0-1D4EA6CA7967}" dt="2023-06-18T13:17:46.816" v="1204"/>
+      <pc:sldChg chg="modSp modAnim">
+        <pc:chgData name="Philipp Bayer" userId="f1ce6f2d-d6ba-4d38-8b9a-d25f69ad1513" providerId="ADAL" clId="{80D561A8-B16A-4DB0-ADD0-1D4EA6CA7967}" dt="2023-06-19T05:26:18.436" v="2085" actId="207"/>
         <pc:sldMkLst>
           <pc:docMk/>
           <pc:sldMk cId="2430384741" sldId="300"/>
         </pc:sldMkLst>
         <pc:spChg chg="mod">
-          <ac:chgData name="Philipp Bayer" userId="f1ce6f2d-d6ba-4d38-8b9a-d25f69ad1513" providerId="ADAL" clId="{80D561A8-B16A-4DB0-ADD0-1D4EA6CA7967}" dt="2023-06-18T13:13:18.801" v="1176" actId="20577"/>
+          <ac:chgData name="Philipp Bayer" userId="f1ce6f2d-d6ba-4d38-8b9a-d25f69ad1513" providerId="ADAL" clId="{80D561A8-B16A-4DB0-ADD0-1D4EA6CA7967}" dt="2023-06-19T05:26:18.436" v="2085" actId="207"/>
           <ac:spMkLst>
             <pc:docMk/>
             <pc:sldMk cId="2430384741" sldId="300"/>
@@ -608,13 +805,13 @@
         </pc:spChg>
       </pc:sldChg>
       <pc:sldChg chg="modSp mod modAnim">
-        <pc:chgData name="Philipp Bayer" userId="f1ce6f2d-d6ba-4d38-8b9a-d25f69ad1513" providerId="ADAL" clId="{80D561A8-B16A-4DB0-ADD0-1D4EA6CA7967}" dt="2023-06-18T13:17:46.816" v="1204"/>
+        <pc:chgData name="Philipp Bayer" userId="f1ce6f2d-d6ba-4d38-8b9a-d25f69ad1513" providerId="ADAL" clId="{80D561A8-B16A-4DB0-ADD0-1D4EA6CA7967}" dt="2023-06-19T05:28:36.240" v="2187" actId="207"/>
         <pc:sldMkLst>
           <pc:docMk/>
           <pc:sldMk cId="294369318" sldId="8413"/>
         </pc:sldMkLst>
         <pc:spChg chg="mod">
-          <ac:chgData name="Philipp Bayer" userId="f1ce6f2d-d6ba-4d38-8b9a-d25f69ad1513" providerId="ADAL" clId="{80D561A8-B16A-4DB0-ADD0-1D4EA6CA7967}" dt="2023-06-18T13:13:41.047" v="1201" actId="20577"/>
+          <ac:chgData name="Philipp Bayer" userId="f1ce6f2d-d6ba-4d38-8b9a-d25f69ad1513" providerId="ADAL" clId="{80D561A8-B16A-4DB0-ADD0-1D4EA6CA7967}" dt="2023-06-19T05:28:36.240" v="2187" actId="207"/>
           <ac:spMkLst>
             <pc:docMk/>
             <pc:sldMk cId="294369318" sldId="8413"/>
@@ -639,7 +836,7 @@
         </pc:spChg>
       </pc:sldChg>
       <pc:sldChg chg="modSp mod modAnim">
-        <pc:chgData name="Philipp Bayer" userId="f1ce6f2d-d6ba-4d38-8b9a-d25f69ad1513" providerId="ADAL" clId="{80D561A8-B16A-4DB0-ADD0-1D4EA6CA7967}" dt="2023-06-18T13:17:46.816" v="1204"/>
+        <pc:chgData name="Philipp Bayer" userId="f1ce6f2d-d6ba-4d38-8b9a-d25f69ad1513" providerId="ADAL" clId="{80D561A8-B16A-4DB0-ADD0-1D4EA6CA7967}" dt="2023-06-19T05:29:47.891" v="2207" actId="20577"/>
         <pc:sldMkLst>
           <pc:docMk/>
           <pc:sldMk cId="3654797181" sldId="8414"/>
@@ -653,7 +850,7 @@
           </ac:spMkLst>
         </pc:spChg>
         <pc:spChg chg="mod">
-          <ac:chgData name="Philipp Bayer" userId="f1ce6f2d-d6ba-4d38-8b9a-d25f69ad1513" providerId="ADAL" clId="{80D561A8-B16A-4DB0-ADD0-1D4EA6CA7967}" dt="2023-06-18T12:45:54.643" v="767" actId="20577"/>
+          <ac:chgData name="Philipp Bayer" userId="f1ce6f2d-d6ba-4d38-8b9a-d25f69ad1513" providerId="ADAL" clId="{80D561A8-B16A-4DB0-ADD0-1D4EA6CA7967}" dt="2023-06-19T05:29:47.891" v="2207" actId="20577"/>
           <ac:spMkLst>
             <pc:docMk/>
             <pc:sldMk cId="3654797181" sldId="8414"/>
@@ -724,7 +921,7 @@
         </pc:spChg>
       </pc:sldChg>
       <pc:sldChg chg="modSp add modAnim">
-        <pc:chgData name="Philipp Bayer" userId="f1ce6f2d-d6ba-4d38-8b9a-d25f69ad1513" providerId="ADAL" clId="{80D561A8-B16A-4DB0-ADD0-1D4EA6CA7967}" dt="2023-06-18T13:21:36.487" v="1428" actId="20577"/>
+        <pc:chgData name="Philipp Bayer" userId="f1ce6f2d-d6ba-4d38-8b9a-d25f69ad1513" providerId="ADAL" clId="{80D561A8-B16A-4DB0-ADD0-1D4EA6CA7967}" dt="2023-06-19T05:27:12.736" v="2094" actId="207"/>
         <pc:sldMkLst>
           <pc:docMk/>
           <pc:sldMk cId="22732068" sldId="8417"/>
@@ -738,13 +935,64 @@
           </ac:spMkLst>
         </pc:spChg>
         <pc:spChg chg="mod">
-          <ac:chgData name="Philipp Bayer" userId="f1ce6f2d-d6ba-4d38-8b9a-d25f69ad1513" providerId="ADAL" clId="{80D561A8-B16A-4DB0-ADD0-1D4EA6CA7967}" dt="2023-06-18T13:21:36.487" v="1428" actId="20577"/>
+          <ac:chgData name="Philipp Bayer" userId="f1ce6f2d-d6ba-4d38-8b9a-d25f69ad1513" providerId="ADAL" clId="{80D561A8-B16A-4DB0-ADD0-1D4EA6CA7967}" dt="2023-06-19T05:27:12.736" v="2094" actId="207"/>
           <ac:spMkLst>
             <pc:docMk/>
             <pc:sldMk cId="22732068" sldId="8417"/>
             <ac:spMk id="8" creationId="{11B93F59-E86F-BB9B-E9F0-9F9F97DAAF6D}"/>
           </ac:spMkLst>
         </pc:spChg>
+      </pc:sldChg>
+      <pc:sldChg chg="addSp delSp modSp add mod modAnim delCm">
+        <pc:chgData name="Philipp Bayer" userId="f1ce6f2d-d6ba-4d38-8b9a-d25f69ad1513" providerId="ADAL" clId="{80D561A8-B16A-4DB0-ADD0-1D4EA6CA7967}" dt="2023-06-19T05:26:55.350" v="2090" actId="207"/>
+        <pc:sldMkLst>
+          <pc:docMk/>
+          <pc:sldMk cId="2284759453" sldId="8418"/>
+        </pc:sldMkLst>
+        <pc:spChg chg="add del">
+          <ac:chgData name="Philipp Bayer" userId="f1ce6f2d-d6ba-4d38-8b9a-d25f69ad1513" providerId="ADAL" clId="{80D561A8-B16A-4DB0-ADD0-1D4EA6CA7967}" dt="2023-06-19T05:21:35.429" v="1904"/>
+          <ac:spMkLst>
+            <pc:docMk/>
+            <pc:sldMk cId="2284759453" sldId="8418"/>
+            <ac:spMk id="2" creationId="{8156B650-E701-C031-713A-B2640D4FF9FD}"/>
+          </ac:spMkLst>
+        </pc:spChg>
+        <pc:spChg chg="mod">
+          <ac:chgData name="Philipp Bayer" userId="f1ce6f2d-d6ba-4d38-8b9a-d25f69ad1513" providerId="ADAL" clId="{80D561A8-B16A-4DB0-ADD0-1D4EA6CA7967}" dt="2023-06-19T05:26:55.350" v="2090" actId="207"/>
+          <ac:spMkLst>
+            <pc:docMk/>
+            <pc:sldMk cId="2284759453" sldId="8418"/>
+            <ac:spMk id="8" creationId="{11B93F59-E86F-BB9B-E9F0-9F9F97DAAF6D}"/>
+          </ac:spMkLst>
+        </pc:spChg>
+        <pc:spChg chg="mod">
+          <ac:chgData name="Philipp Bayer" userId="f1ce6f2d-d6ba-4d38-8b9a-d25f69ad1513" providerId="ADAL" clId="{80D561A8-B16A-4DB0-ADD0-1D4EA6CA7967}" dt="2023-06-19T05:14:55.389" v="1536" actId="20577"/>
+          <ac:spMkLst>
+            <pc:docMk/>
+            <pc:sldMk cId="2284759453" sldId="8418"/>
+            <ac:spMk id="12" creationId="{EF66C240-066A-6114-6051-A52BBF168323}"/>
+          </ac:spMkLst>
+        </pc:spChg>
+        <pc:picChg chg="del mod">
+          <ac:chgData name="Philipp Bayer" userId="f1ce6f2d-d6ba-4d38-8b9a-d25f69ad1513" providerId="ADAL" clId="{80D561A8-B16A-4DB0-ADD0-1D4EA6CA7967}" dt="2023-06-19T05:21:45.845" v="1911"/>
+          <ac:picMkLst>
+            <pc:docMk/>
+            <pc:sldMk cId="2284759453" sldId="8418"/>
+            <ac:picMk id="5" creationId="{8A2980E9-F97D-D8F8-D718-FF516D9D0439}"/>
+          </ac:picMkLst>
+        </pc:picChg>
+        <pc:extLst>
+          <p:ext xmlns:p="http://schemas.openxmlformats.org/presentationml/2006/main" uri="{D6D511B9-2390-475A-947B-AFAB55BFBCF1}">
+            <pc226:cmChg xmlns:pc226="http://schemas.microsoft.com/office/powerpoint/2022/06/main/command" chg="del">
+              <pc226:chgData name="Philipp Bayer" userId="f1ce6f2d-d6ba-4d38-8b9a-d25f69ad1513" providerId="ADAL" clId="{80D561A8-B16A-4DB0-ADD0-1D4EA6CA7967}" dt="2023-06-19T05:19:48.930" v="1899"/>
+              <pc2:cmMkLst xmlns:pc2="http://schemas.microsoft.com/office/powerpoint/2019/9/main/command">
+                <pc:docMk/>
+                <pc:sldMk cId="2284759453" sldId="8418"/>
+                <pc2:cmMk id="{90AD781C-B02C-405D-AABF-10D8D8FBDFD4}"/>
+              </pc2:cmMkLst>
+            </pc226:cmChg>
+          </p:ext>
+        </pc:extLst>
       </pc:sldChg>
       <pc:sldMasterChg chg="modSp modSldLayout">
         <pc:chgData name="Philipp Bayer" userId="f1ce6f2d-d6ba-4d38-8b9a-d25f69ad1513" providerId="ADAL" clId="{80D561A8-B16A-4DB0-ADD0-1D4EA6CA7967}" dt="2023-06-18T13:17:46.816" v="1204"/>
@@ -1200,7 +1448,7 @@
           <a:p>
             <a:fld id="{48F0A80C-92E7-DB49-AE63-B2F956E951EE}" type="datetimeFigureOut">
               <a:rPr lang="en-US" smtClean="0"/>
-              <a:t>6/18/2023</a:t>
+              <a:t>6/19/2023</a:t>
             </a:fld>
             <a:endParaRPr lang="en-US"/>
           </a:p>
@@ -1393,7 +1641,7 @@
           <a:p>
             <a:fld id="{A7440A9C-2DCF-4342-81E6-FCA45242C801}" type="datetimeFigureOut">
               <a:rPr lang="en-US" smtClean="0"/>
-              <a:t>6/18/2023</a:t>
+              <a:t>6/19/2023</a:t>
             </a:fld>
             <a:endParaRPr lang="en-US"/>
           </a:p>
@@ -1869,8 +2117,13 @@
             </a:r>
             <a:r>
               <a:rPr lang="en-AU" dirty="0"/>
-              <a:t> based on transcript.</a:t>
-            </a:r>
+              <a:t> based on the transcript of </a:t>
+            </a:r>
+            <a:r>
+              <a:rPr lang="en-AU"/>
+              <a:t>the recording.</a:t>
+            </a:r>
+            <a:endParaRPr lang="en-AU" dirty="0"/>
           </a:p>
         </p:txBody>
       </p:sp>
@@ -2133,18 +2386,30 @@
           <a:bodyPr/>
           <a:lstStyle/>
           <a:p>
-            <a:r>
-              <a:rPr lang="en-AU" dirty="0"/>
-              <a:t>At this point you might guess that </a:t>
-            </a:r>
-            <a:r>
-              <a:rPr lang="en-AU" dirty="0" err="1"/>
-              <a:t>i</a:t>
-            </a:r>
-            <a:r>
-              <a:rPr lang="en-AU" dirty="0"/>
-              <a:t> don’t think these things are as powerful as usually said</a:t>
-            </a:r>
+            <a:pPr marL="0" marR="0" lvl="0" indent="0" algn="l" defTabSz="914400" rtl="0" eaLnBrk="1" fontAlgn="auto" latinLnBrk="0" hangingPunct="1">
+              <a:lnSpc>
+                <a:spcPct val="100000"/>
+              </a:lnSpc>
+              <a:spcBef>
+                <a:spcPts val="0"/>
+              </a:spcBef>
+              <a:spcAft>
+                <a:spcPts val="0"/>
+              </a:spcAft>
+              <a:buClrTx/>
+              <a:buSzTx/>
+              <a:buFontTx/>
+              <a:buNone/>
+              <a:tabLst/>
+              <a:defRPr/>
+            </a:pPr>
+            <a:r>
+              <a:rPr lang="en-US" dirty="0"/>
+              <a:t>It’s unlikely that I trigger department closure, for example, or send someone to prison.</a:t>
+            </a:r>
+          </a:p>
+          <a:p>
+            <a:endParaRPr lang="en-AU" dirty="0"/>
           </a:p>
         </p:txBody>
       </p:sp>
@@ -2165,6 +2430,249 @@
           <a:p>
             <a:fld id="{D8E8D854-9761-4F43-8252-6E1F8D9CE6EE}" type="slidenum">
               <a:rPr lang="en-US" smtClean="0"/>
+              <a:t>23</a:t>
+            </a:fld>
+            <a:endParaRPr lang="en-US"/>
+          </a:p>
+        </p:txBody>
+      </p:sp>
+    </p:spTree>
+    <p:extLst>
+      <p:ext uri="{BB962C8B-B14F-4D97-AF65-F5344CB8AC3E}">
+        <p14:creationId xmlns:p14="http://schemas.microsoft.com/office/powerpoint/2010/main" val="1907561194"/>
+      </p:ext>
+    </p:extLst>
+  </p:cSld>
+  <p:clrMapOvr>
+    <a:masterClrMapping/>
+  </p:clrMapOvr>
+</p:notes>
+</file>
+
+<file path=ppt/notesSlides/notesSlide6.xml><?xml version="1.0" encoding="utf-8"?>
+<p:notes xmlns:a="http://schemas.openxmlformats.org/drawingml/2006/main" xmlns:r="http://schemas.openxmlformats.org/officeDocument/2006/relationships" xmlns:p="http://schemas.openxmlformats.org/presentationml/2006/main">
+  <p:cSld>
+    <p:spTree>
+      <p:nvGrpSpPr>
+        <p:cNvPr id="1" name=""/>
+        <p:cNvGrpSpPr/>
+        <p:nvPr/>
+      </p:nvGrpSpPr>
+      <p:grpSpPr>
+        <a:xfrm>
+          <a:off x="0" y="0"/>
+          <a:ext cx="0" cy="0"/>
+          <a:chOff x="0" y="0"/>
+          <a:chExt cx="0" cy="0"/>
+        </a:xfrm>
+      </p:grpSpPr>
+      <p:sp>
+        <p:nvSpPr>
+          <p:cNvPr id="2" name="Slide Image Placeholder 1"/>
+          <p:cNvSpPr>
+            <a:spLocks noGrp="1" noRot="1" noChangeAspect="1"/>
+          </p:cNvSpPr>
+          <p:nvPr>
+            <p:ph type="sldImg"/>
+          </p:nvPr>
+        </p:nvSpPr>
+        <p:spPr/>
+      </p:sp>
+      <p:sp>
+        <p:nvSpPr>
+          <p:cNvPr id="3" name="Notes Placeholder 2"/>
+          <p:cNvSpPr>
+            <a:spLocks noGrp="1"/>
+          </p:cNvSpPr>
+          <p:nvPr>
+            <p:ph type="body" idx="1"/>
+          </p:nvPr>
+        </p:nvSpPr>
+        <p:spPr/>
+        <p:txBody>
+          <a:bodyPr/>
+          <a:lstStyle/>
+          <a:p>
+            <a:r>
+              <a:rPr lang="en-US" dirty="0" err="1"/>
+              <a:t>Doordash</a:t>
+            </a:r>
+            <a:r>
+              <a:rPr lang="en-US" dirty="0"/>
+              <a:t>: not understanding </a:t>
+            </a:r>
+            <a:r>
+              <a:rPr lang="en-US" dirty="0" err="1"/>
+              <a:t>yeeted</a:t>
+            </a:r>
+            <a:r>
+              <a:rPr lang="en-US" dirty="0"/>
+              <a:t> food!</a:t>
+            </a:r>
+            <a:endParaRPr lang="en-AU" dirty="0"/>
+          </a:p>
+        </p:txBody>
+      </p:sp>
+      <p:sp>
+        <p:nvSpPr>
+          <p:cNvPr id="4" name="Slide Number Placeholder 3"/>
+          <p:cNvSpPr>
+            <a:spLocks noGrp="1"/>
+          </p:cNvSpPr>
+          <p:nvPr>
+            <p:ph type="sldNum" sz="quarter" idx="5"/>
+          </p:nvPr>
+        </p:nvSpPr>
+        <p:spPr/>
+        <p:txBody>
+          <a:bodyPr/>
+          <a:lstStyle/>
+          <a:p>
+            <a:fld id="{D8E8D854-9761-4F43-8252-6E1F8D9CE6EE}" type="slidenum">
+              <a:rPr lang="en-US" smtClean="0"/>
+              <a:t>27</a:t>
+            </a:fld>
+            <a:endParaRPr lang="en-US"/>
+          </a:p>
+        </p:txBody>
+      </p:sp>
+    </p:spTree>
+    <p:extLst>
+      <p:ext uri="{BB962C8B-B14F-4D97-AF65-F5344CB8AC3E}">
+        <p14:creationId xmlns:p14="http://schemas.microsoft.com/office/powerpoint/2010/main" val="4214418787"/>
+      </p:ext>
+    </p:extLst>
+  </p:cSld>
+  <p:clrMapOvr>
+    <a:masterClrMapping/>
+  </p:clrMapOvr>
+</p:notes>
+</file>
+
+<file path=ppt/notesSlides/notesSlide7.xml><?xml version="1.0" encoding="utf-8"?>
+<p:notes xmlns:a="http://schemas.openxmlformats.org/drawingml/2006/main" xmlns:r="http://schemas.openxmlformats.org/officeDocument/2006/relationships" xmlns:p="http://schemas.openxmlformats.org/presentationml/2006/main">
+  <p:cSld>
+    <p:spTree>
+      <p:nvGrpSpPr>
+        <p:cNvPr id="1" name=""/>
+        <p:cNvGrpSpPr/>
+        <p:nvPr/>
+      </p:nvGrpSpPr>
+      <p:grpSpPr>
+        <a:xfrm>
+          <a:off x="0" y="0"/>
+          <a:ext cx="0" cy="0"/>
+          <a:chOff x="0" y="0"/>
+          <a:chExt cx="0" cy="0"/>
+        </a:xfrm>
+      </p:grpSpPr>
+      <p:sp>
+        <p:nvSpPr>
+          <p:cNvPr id="2" name="Slide Image Placeholder 1"/>
+          <p:cNvSpPr>
+            <a:spLocks noGrp="1" noRot="1" noChangeAspect="1"/>
+          </p:cNvSpPr>
+          <p:nvPr>
+            <p:ph type="sldImg"/>
+          </p:nvPr>
+        </p:nvSpPr>
+        <p:spPr/>
+      </p:sp>
+      <p:sp>
+        <p:nvSpPr>
+          <p:cNvPr id="3" name="Notes Placeholder 2"/>
+          <p:cNvSpPr>
+            <a:spLocks noGrp="1"/>
+          </p:cNvSpPr>
+          <p:nvPr>
+            <p:ph type="body" idx="1"/>
+          </p:nvPr>
+        </p:nvSpPr>
+        <p:spPr/>
+        <p:txBody>
+          <a:bodyPr/>
+          <a:lstStyle/>
+          <a:p>
+            <a:r>
+              <a:rPr lang="en-US" dirty="0"/>
+              <a:t>. Take gigabytes of free-form text, chunk into pieces, send to </a:t>
+            </a:r>
+            <a:r>
+              <a:rPr lang="en-US" dirty="0" err="1"/>
+              <a:t>ChatGPT</a:t>
+            </a:r>
+            <a:r>
+              <a:rPr lang="en-US" dirty="0"/>
+              <a:t> with prompt, get JSON structure back. We’re drowning in piles of unstructured </a:t>
+            </a:r>
+            <a:r>
+              <a:rPr lang="en-US" b="1" dirty="0"/>
+              <a:t>valuable</a:t>
+            </a:r>
+            <a:r>
+              <a:rPr lang="en-US" dirty="0"/>
+              <a:t> data nobody can evaluate at scale. (-&gt; earlier </a:t>
+            </a:r>
+            <a:r>
+              <a:rPr lang="en-US" dirty="0" err="1"/>
+              <a:t>Braggoscope</a:t>
+            </a:r>
+            <a:r>
+              <a:rPr lang="en-US" dirty="0"/>
+              <a:t> example!)</a:t>
+            </a:r>
+          </a:p>
+          <a:p>
+            <a:endParaRPr lang="en-US" dirty="0"/>
+          </a:p>
+          <a:p>
+            <a:pPr marL="0" marR="0" lvl="0" indent="0" algn="l" defTabSz="914400" rtl="0" eaLnBrk="1" fontAlgn="auto" latinLnBrk="0" hangingPunct="1">
+              <a:lnSpc>
+                <a:spcPct val="100000"/>
+              </a:lnSpc>
+              <a:spcBef>
+                <a:spcPts val="0"/>
+              </a:spcBef>
+              <a:spcAft>
+                <a:spcPts val="0"/>
+              </a:spcAft>
+              <a:buClrTx/>
+              <a:buSzTx/>
+              <a:buFontTx/>
+              <a:buNone/>
+              <a:tabLst/>
+              <a:defRPr/>
+            </a:pPr>
+            <a:r>
+              <a:rPr lang="en-US" dirty="0">
+                <a:sym typeface="Wingdings" panose="05000000000000000000" pitchFamily="2" charset="2"/>
+              </a:rPr>
+              <a:t>3) Not enough doom. Good, because boring progress. I don’t see any AGI.</a:t>
+            </a:r>
+            <a:endParaRPr lang="en-US" dirty="0"/>
+          </a:p>
+          <a:p>
+            <a:endParaRPr lang="en-AU" dirty="0"/>
+          </a:p>
+        </p:txBody>
+      </p:sp>
+      <p:sp>
+        <p:nvSpPr>
+          <p:cNvPr id="4" name="Slide Number Placeholder 3"/>
+          <p:cNvSpPr>
+            <a:spLocks noGrp="1"/>
+          </p:cNvSpPr>
+          <p:nvPr>
+            <p:ph type="sldNum" sz="quarter" idx="5"/>
+          </p:nvPr>
+        </p:nvSpPr>
+        <p:spPr/>
+        <p:txBody>
+          <a:bodyPr/>
+          <a:lstStyle/>
+          <a:p>
+            <a:fld id="{D8E8D854-9761-4F43-8252-6E1F8D9CE6EE}" type="slidenum">
+              <a:rPr lang="en-US" smtClean="0"/>
               <a:t>28</a:t>
             </a:fld>
             <a:endParaRPr lang="en-US"/>
@@ -2175,6 +2683,200 @@
     <p:extLst>
       <p:ext uri="{BB962C8B-B14F-4D97-AF65-F5344CB8AC3E}">
         <p14:creationId xmlns:p14="http://schemas.microsoft.com/office/powerpoint/2010/main" val="1738148239"/>
+      </p:ext>
+    </p:extLst>
+  </p:cSld>
+  <p:clrMapOvr>
+    <a:masterClrMapping/>
+  </p:clrMapOvr>
+</p:notes>
+</file>
+
+<file path=ppt/notesSlides/notesSlide8.xml><?xml version="1.0" encoding="utf-8"?>
+<p:notes xmlns:a="http://schemas.openxmlformats.org/drawingml/2006/main" xmlns:r="http://schemas.openxmlformats.org/officeDocument/2006/relationships" xmlns:p="http://schemas.openxmlformats.org/presentationml/2006/main">
+  <p:cSld>
+    <p:spTree>
+      <p:nvGrpSpPr>
+        <p:cNvPr id="1" name=""/>
+        <p:cNvGrpSpPr/>
+        <p:nvPr/>
+      </p:nvGrpSpPr>
+      <p:grpSpPr>
+        <a:xfrm>
+          <a:off x="0" y="0"/>
+          <a:ext cx="0" cy="0"/>
+          <a:chOff x="0" y="0"/>
+          <a:chExt cx="0" cy="0"/>
+        </a:xfrm>
+      </p:grpSpPr>
+      <p:sp>
+        <p:nvSpPr>
+          <p:cNvPr id="2" name="Slide Image Placeholder 1"/>
+          <p:cNvSpPr>
+            <a:spLocks noGrp="1" noRot="1" noChangeAspect="1"/>
+          </p:cNvSpPr>
+          <p:nvPr>
+            <p:ph type="sldImg"/>
+          </p:nvPr>
+        </p:nvSpPr>
+        <p:spPr/>
+      </p:sp>
+      <p:sp>
+        <p:nvSpPr>
+          <p:cNvPr id="3" name="Notes Placeholder 2"/>
+          <p:cNvSpPr>
+            <a:spLocks noGrp="1"/>
+          </p:cNvSpPr>
+          <p:nvPr>
+            <p:ph type="body" idx="1"/>
+          </p:nvPr>
+        </p:nvSpPr>
+        <p:spPr/>
+        <p:txBody>
+          <a:bodyPr/>
+          <a:lstStyle/>
+          <a:p>
+            <a:pPr marL="0" marR="0" lvl="0" indent="0" algn="l" defTabSz="914400" rtl="0" eaLnBrk="1" fontAlgn="auto" latinLnBrk="0" hangingPunct="1">
+              <a:lnSpc>
+                <a:spcPct val="100000"/>
+              </a:lnSpc>
+              <a:spcBef>
+                <a:spcPts val="0"/>
+              </a:spcBef>
+              <a:spcAft>
+                <a:spcPts val="0"/>
+              </a:spcAft>
+              <a:buClrTx/>
+              <a:buSzTx/>
+              <a:buFontTx/>
+              <a:buNone/>
+              <a:tabLst/>
+              <a:defRPr/>
+            </a:pPr>
+            <a:r>
+              <a:rPr lang="en-US" sz="1200" dirty="0"/>
+              <a:t>You are in a unique position as (currently) only you can build the Torment Nexus. Only YOU can prevent things going worse.</a:t>
+            </a:r>
+          </a:p>
+          <a:p>
+            <a:endParaRPr lang="en-AU" dirty="0"/>
+          </a:p>
+        </p:txBody>
+      </p:sp>
+      <p:sp>
+        <p:nvSpPr>
+          <p:cNvPr id="4" name="Slide Number Placeholder 3"/>
+          <p:cNvSpPr>
+            <a:spLocks noGrp="1"/>
+          </p:cNvSpPr>
+          <p:nvPr>
+            <p:ph type="sldNum" sz="quarter" idx="5"/>
+          </p:nvPr>
+        </p:nvSpPr>
+        <p:spPr/>
+        <p:txBody>
+          <a:bodyPr/>
+          <a:lstStyle/>
+          <a:p>
+            <a:fld id="{D8E8D854-9761-4F43-8252-6E1F8D9CE6EE}" type="slidenum">
+              <a:rPr lang="en-US" smtClean="0"/>
+              <a:t>30</a:t>
+            </a:fld>
+            <a:endParaRPr lang="en-US"/>
+          </a:p>
+        </p:txBody>
+      </p:sp>
+    </p:spTree>
+    <p:extLst>
+      <p:ext uri="{BB962C8B-B14F-4D97-AF65-F5344CB8AC3E}">
+        <p14:creationId xmlns:p14="http://schemas.microsoft.com/office/powerpoint/2010/main" val="1162879555"/>
+      </p:ext>
+    </p:extLst>
+  </p:cSld>
+  <p:clrMapOvr>
+    <a:masterClrMapping/>
+  </p:clrMapOvr>
+</p:notes>
+</file>
+
+<file path=ppt/notesSlides/notesSlide9.xml><?xml version="1.0" encoding="utf-8"?>
+<p:notes xmlns:a="http://schemas.openxmlformats.org/drawingml/2006/main" xmlns:r="http://schemas.openxmlformats.org/officeDocument/2006/relationships" xmlns:p="http://schemas.openxmlformats.org/presentationml/2006/main">
+  <p:cSld>
+    <p:spTree>
+      <p:nvGrpSpPr>
+        <p:cNvPr id="1" name=""/>
+        <p:cNvGrpSpPr/>
+        <p:nvPr/>
+      </p:nvGrpSpPr>
+      <p:grpSpPr>
+        <a:xfrm>
+          <a:off x="0" y="0"/>
+          <a:ext cx="0" cy="0"/>
+          <a:chOff x="0" y="0"/>
+          <a:chExt cx="0" cy="0"/>
+        </a:xfrm>
+      </p:grpSpPr>
+      <p:sp>
+        <p:nvSpPr>
+          <p:cNvPr id="2" name="Slide Image Placeholder 1"/>
+          <p:cNvSpPr>
+            <a:spLocks noGrp="1" noRot="1" noChangeAspect="1"/>
+          </p:cNvSpPr>
+          <p:nvPr>
+            <p:ph type="sldImg"/>
+          </p:nvPr>
+        </p:nvSpPr>
+        <p:spPr/>
+      </p:sp>
+      <p:sp>
+        <p:nvSpPr>
+          <p:cNvPr id="3" name="Notes Placeholder 2"/>
+          <p:cNvSpPr>
+            <a:spLocks noGrp="1"/>
+          </p:cNvSpPr>
+          <p:nvPr>
+            <p:ph type="body" idx="1"/>
+          </p:nvPr>
+        </p:nvSpPr>
+        <p:spPr/>
+        <p:txBody>
+          <a:bodyPr/>
+          <a:lstStyle/>
+          <a:p>
+            <a:r>
+              <a:rPr lang="en-AU" dirty="0"/>
+              <a:t>IBM training notes, 1975</a:t>
+            </a:r>
+          </a:p>
+        </p:txBody>
+      </p:sp>
+      <p:sp>
+        <p:nvSpPr>
+          <p:cNvPr id="4" name="Slide Number Placeholder 3"/>
+          <p:cNvSpPr>
+            <a:spLocks noGrp="1"/>
+          </p:cNvSpPr>
+          <p:nvPr>
+            <p:ph type="sldNum" sz="quarter" idx="5"/>
+          </p:nvPr>
+        </p:nvSpPr>
+        <p:spPr/>
+        <p:txBody>
+          <a:bodyPr/>
+          <a:lstStyle/>
+          <a:p>
+            <a:fld id="{D8E8D854-9761-4F43-8252-6E1F8D9CE6EE}" type="slidenum">
+              <a:rPr lang="en-US" smtClean="0"/>
+              <a:t>31</a:t>
+            </a:fld>
+            <a:endParaRPr lang="en-US"/>
+          </a:p>
+        </p:txBody>
+      </p:sp>
+    </p:spTree>
+    <p:extLst>
+      <p:ext uri="{BB962C8B-B14F-4D97-AF65-F5344CB8AC3E}">
+        <p14:creationId xmlns:p14="http://schemas.microsoft.com/office/powerpoint/2010/main" val="3042507498"/>
       </p:ext>
     </p:extLst>
   </p:cSld>
@@ -29806,31 +30508,59 @@
               <a:t>Example: </a:t>
             </a:r>
             <a:r>
-              <a:rPr lang="en-AU" i="1" dirty="0" err="1"/>
+              <a:rPr lang="en-AU" i="1" dirty="0" err="1">
+                <a:solidFill>
+                  <a:schemeClr val="accent1"/>
+                </a:solidFill>
+              </a:rPr>
               <a:t>Planiliza</a:t>
             </a:r>
             <a:r>
-              <a:rPr lang="en-AU" i="1" dirty="0"/>
+              <a:rPr lang="en-AU" i="1" dirty="0">
+                <a:solidFill>
+                  <a:schemeClr val="accent1"/>
+                </a:solidFill>
+              </a:rPr>
               <a:t> </a:t>
             </a:r>
             <a:r>
-              <a:rPr lang="en-AU" i="1" dirty="0" err="1"/>
+              <a:rPr lang="en-AU" i="1" dirty="0" err="1">
+                <a:solidFill>
+                  <a:schemeClr val="accent1"/>
+                </a:solidFill>
+              </a:rPr>
               <a:t>alata</a:t>
             </a:r>
             <a:r>
-              <a:rPr lang="en-AU" i="1" dirty="0"/>
+              <a:rPr lang="en-AU" i="1" dirty="0">
+                <a:solidFill>
+                  <a:schemeClr val="accent1"/>
+                </a:solidFill>
+              </a:rPr>
               <a:t> </a:t>
             </a:r>
             <a:r>
-              <a:rPr lang="en-AU" dirty="0"/>
+              <a:rPr lang="en-AU" dirty="0">
+                <a:solidFill>
+                  <a:schemeClr val="accent1"/>
+                </a:solidFill>
+              </a:rPr>
               <a:t>was observed in sample 15 on the 24</a:t>
             </a:r>
             <a:r>
-              <a:rPr lang="en-AU" baseline="30000" dirty="0"/>
+              <a:rPr lang="en-AU" baseline="30000" dirty="0">
+                <a:solidFill>
+                  <a:schemeClr val="accent1"/>
+                </a:solidFill>
+              </a:rPr>
               <a:t>th</a:t>
             </a:r>
             <a:r>
-              <a:rPr lang="en-AU" dirty="0"/>
+              <a:rPr lang="en-AU" dirty="0">
+                <a:solidFill>
+                  <a:schemeClr val="accent1"/>
+                </a:solidFill>
+              </a:rPr>
               <a:t> of September, 2022, at latitude X and longitude Y.</a:t>
             </a:r>
           </a:p>
@@ -31359,15 +32089,35 @@
           <a:p>
             <a:r>
               <a:rPr lang="en-AU" dirty="0"/>
-              <a:t>So I added Chain of Thought (</a:t>
-            </a:r>
-            <a:r>
-              <a:rPr lang="en-AU" dirty="0" err="1"/>
+              <a:t>So I added </a:t>
+            </a:r>
+            <a:r>
+              <a:rPr lang="en-AU" dirty="0">
+                <a:solidFill>
+                  <a:schemeClr val="accent1"/>
+                </a:solidFill>
+              </a:rPr>
+              <a:t>Chain of Thought (</a:t>
+            </a:r>
+            <a:r>
+              <a:rPr lang="en-AU" dirty="0" err="1">
+                <a:solidFill>
+                  <a:schemeClr val="accent1"/>
+                </a:solidFill>
+              </a:rPr>
               <a:t>CoT</a:t>
             </a:r>
             <a:r>
+              <a:rPr lang="en-AU" dirty="0">
+                <a:solidFill>
+                  <a:schemeClr val="accent1"/>
+                </a:solidFill>
+              </a:rPr>
+              <a:t>)</a:t>
+            </a:r>
+            <a:r>
               <a:rPr lang="en-AU" dirty="0"/>
-              <a:t>) (again via </a:t>
+              <a:t> (again via </a:t>
             </a:r>
             <a:r>
               <a:rPr lang="en-AU" dirty="0" err="1"/>
@@ -31375,7 +32125,7 @@
             </a:r>
             <a:r>
               <a:rPr lang="en-AU" dirty="0"/>
-              <a:t>)</a:t>
+              <a:t>) (Wei et al., 2022)</a:t>
             </a:r>
           </a:p>
           <a:p>
@@ -32387,8 +33137,16 @@
               <a:buAutoNum type="arabicParenR"/>
             </a:pPr>
             <a:r>
+              <a:rPr lang="en-AU" sz="2400" dirty="0">
+                <a:solidFill>
+                  <a:schemeClr val="accent1"/>
+                </a:solidFill>
+              </a:rPr>
+              <a:t>Write (simple) Python code</a:t>
+            </a:r>
+            <a:r>
               <a:rPr lang="en-AU" sz="2400" dirty="0"/>
-              <a:t>Write (simple) Python code on our data results and calculate (mostly) correct results</a:t>
+              <a:t> on our data results and calculate (mostly) correct results</a:t>
             </a:r>
           </a:p>
           <a:p>
@@ -32414,7 +33172,19 @@
             </a:r>
             <a:r>
               <a:rPr lang="en-AU" sz="2400" dirty="0"/>
-              <a:t> style) to answer questions about PDFs of eDNA papers</a:t>
+              <a:t> style) to </a:t>
+            </a:r>
+            <a:r>
+              <a:rPr lang="en-AU" sz="2400" dirty="0">
+                <a:solidFill>
+                  <a:schemeClr val="accent1"/>
+                </a:solidFill>
+              </a:rPr>
+              <a:t>answer questions about PDFs </a:t>
+            </a:r>
+            <a:r>
+              <a:rPr lang="en-AU" sz="2400" dirty="0"/>
+              <a:t>of eDNA papers</a:t>
             </a:r>
           </a:p>
           <a:p>
@@ -32423,8 +33193,16 @@
               <a:buAutoNum type="arabicParenR"/>
             </a:pPr>
             <a:r>
+              <a:rPr lang="en-AU" sz="2400" dirty="0">
+                <a:solidFill>
+                  <a:schemeClr val="accent1"/>
+                </a:solidFill>
+              </a:rPr>
+              <a:t>Classify DNA </a:t>
+            </a:r>
+            <a:r>
               <a:rPr lang="en-AU" sz="2400" dirty="0"/>
-              <a:t>Run my taxonomic classifiers when a user enters DNA</a:t>
+              <a:t>when a user enters DNA (-&gt; species label)</a:t>
             </a:r>
           </a:p>
           <a:p>
@@ -32433,8 +33211,16 @@
               <a:buAutoNum type="arabicParenR"/>
             </a:pPr>
             <a:r>
+              <a:rPr lang="en-AU" sz="2400" dirty="0">
+                <a:solidFill>
+                  <a:schemeClr val="accent1"/>
+                </a:solidFill>
+              </a:rPr>
+              <a:t>Ask Google</a:t>
+            </a:r>
+            <a:r>
               <a:rPr lang="en-AU" sz="2400" dirty="0"/>
-              <a:t>Ask Google for ‘mostly correct’ answers via </a:t>
+              <a:t> for ‘mostly correct’ answers via </a:t>
             </a:r>
             <a:r>
               <a:rPr lang="en-AU" sz="2400" dirty="0" err="1"/>
@@ -32874,8 +33660,16 @@
               <a:buAutoNum type="arabicParenR"/>
             </a:pPr>
             <a:r>
+              <a:rPr lang="en-AU" sz="2400" dirty="0">
+                <a:solidFill>
+                  <a:schemeClr val="accent1"/>
+                </a:solidFill>
+              </a:rPr>
+              <a:t>Replace Python</a:t>
+            </a:r>
+            <a:r>
               <a:rPr lang="en-AU" sz="2400" dirty="0"/>
-              <a:t>Replace Python (pandas) agent by SQL agent.</a:t>
+              <a:t> (pandas) agent by SQL agent.</a:t>
             </a:r>
           </a:p>
           <a:p>
@@ -32885,8 +33679,16 @@
               <a:buAutoNum type="arabicParenR"/>
             </a:pPr>
             <a:r>
+              <a:rPr lang="en-AU" sz="2400" dirty="0">
+                <a:solidFill>
+                  <a:schemeClr val="accent1"/>
+                </a:solidFill>
+              </a:rPr>
+              <a:t>Tree of thought</a:t>
+            </a:r>
+            <a:r>
               <a:rPr lang="en-AU" sz="2400" dirty="0"/>
-              <a:t>Tree of thought (Yao et al 2023). Evaluates several answers, pulls out the best ‘way forward’. Not in </a:t>
+              <a:t> (Yao et al 2023). Evaluates several answers, pulls out the best ‘way forward’. Not in </a:t>
             </a:r>
             <a:r>
               <a:rPr lang="en-AU" sz="2400" dirty="0" err="1"/>
@@ -32905,7 +33707,19 @@
             </a:pPr>
             <a:r>
               <a:rPr lang="en-AU" sz="2400" dirty="0"/>
-              <a:t>Another LLM that evaluates security of code generated before running</a:t>
+              <a:t>A 2nd LLM </a:t>
+            </a:r>
+            <a:r>
+              <a:rPr lang="en-AU" sz="2400" dirty="0">
+                <a:solidFill>
+                  <a:schemeClr val="accent1"/>
+                </a:solidFill>
+              </a:rPr>
+              <a:t>evaluating security </a:t>
+            </a:r>
+            <a:r>
+              <a:rPr lang="en-AU" sz="2400" dirty="0"/>
+              <a:t>of code generated before running</a:t>
             </a:r>
           </a:p>
           <a:p>
@@ -32916,7 +33730,19 @@
             </a:pPr>
             <a:r>
               <a:rPr lang="en-AU" sz="2400" dirty="0"/>
-              <a:t>Some quality improvements; code that does more exciting things with the GPT output. Draw maps, link into other databases etc.</a:t>
+              <a:t>Some </a:t>
+            </a:r>
+            <a:r>
+              <a:rPr lang="en-AU" sz="2400" dirty="0">
+                <a:solidFill>
+                  <a:schemeClr val="accent1"/>
+                </a:solidFill>
+              </a:rPr>
+              <a:t>quality improvements</a:t>
+            </a:r>
+            <a:r>
+              <a:rPr lang="en-AU" sz="2400" dirty="0"/>
+              <a:t>; code that does more exciting things with the GPT output. Draw maps, link into other databases etc.</a:t>
             </a:r>
           </a:p>
           <a:p>
@@ -32926,8 +33752,16 @@
               <a:buAutoNum type="arabicParenR"/>
             </a:pPr>
             <a:r>
+              <a:rPr lang="en-AU" sz="2400" dirty="0">
+                <a:solidFill>
+                  <a:schemeClr val="accent1"/>
+                </a:solidFill>
+              </a:rPr>
+              <a:t>Locally run</a:t>
+            </a:r>
+            <a:r>
               <a:rPr lang="en-AU" sz="2400" dirty="0"/>
-              <a:t>Locally run open source LLMs (FALCON?). Finetune own GPTs.</a:t>
+              <a:t> open source LLMs (FALCON?). Finetune own GPTs.</a:t>
             </a:r>
           </a:p>
           <a:p>
@@ -32938,7 +33772,19 @@
             </a:pPr>
             <a:r>
               <a:rPr lang="en-AU" sz="2400" dirty="0"/>
-              <a:t>How to best deploy all this in a reasonably safe and cost-effective manner</a:t>
+              <a:t>How to </a:t>
+            </a:r>
+            <a:r>
+              <a:rPr lang="en-AU" sz="2400" dirty="0">
+                <a:solidFill>
+                  <a:schemeClr val="accent1"/>
+                </a:solidFill>
+              </a:rPr>
+              <a:t>best deploy </a:t>
+            </a:r>
+            <a:r>
+              <a:rPr lang="en-AU" sz="2400" dirty="0"/>
+              <a:t>all this in a reasonably safe and cost-effective manner</a:t>
             </a:r>
           </a:p>
         </p:txBody>
@@ -33401,7 +34247,7 @@
         </p:nvSpPr>
         <p:spPr>
           <a:xfrm>
-            <a:off x="550862" y="3173157"/>
+            <a:off x="550862" y="2199122"/>
             <a:ext cx="10948712" cy="2606792"/>
           </a:xfrm>
         </p:spPr>
@@ -33411,69 +34257,55 @@
           <a:p>
             <a:r>
               <a:rPr lang="en-US" dirty="0"/>
-              <a:t>Depends on how dodgy your bosses are! Biggest amount of ‘money saved by LLMs’ is in LLM-based customer support, but it’s a worse product.  (examples: eating disorder chat; </a:t>
+              <a:t>With the ocean data project, I don’t have as many ethical problems as a human-centric application. </a:t>
+            </a:r>
+          </a:p>
+          <a:p>
+            <a:endParaRPr lang="en-US" dirty="0"/>
+          </a:p>
+          <a:p>
+            <a:r>
+              <a:rPr lang="en-US" dirty="0"/>
+              <a:t>Currently the answers are best for the </a:t>
+            </a:r>
+            <a:r>
+              <a:rPr lang="en-US" dirty="0">
+                <a:solidFill>
+                  <a:schemeClr val="accent1"/>
+                </a:solidFill>
+              </a:rPr>
+              <a:t>‘vibe’</a:t>
+            </a:r>
+            <a:r>
+              <a:rPr lang="en-US" dirty="0"/>
+              <a:t>  (Vicki </a:t>
             </a:r>
             <a:r>
               <a:rPr lang="en-US" dirty="0" err="1"/>
-              <a:t>doordash</a:t>
+              <a:t>Boykis</a:t>
             </a:r>
             <a:r>
               <a:rPr lang="en-US" dirty="0"/>
-              <a:t> support not understanding </a:t>
-            </a:r>
-            <a:r>
-              <a:rPr lang="en-US" dirty="0" err="1"/>
-              <a:t>yeeted</a:t>
+              <a:t>), the model gives you the general direction you </a:t>
+            </a:r>
+            <a:r>
+              <a:rPr lang="en-US" i="1" dirty="0"/>
+              <a:t>yourself </a:t>
             </a:r>
             <a:r>
               <a:rPr lang="en-US" dirty="0"/>
-              <a:t> food) </a:t>
-            </a:r>
+              <a:t>can go into. But: do users agree? They might not proceed.</a:t>
+            </a:r>
+            <a:endParaRPr lang="en-US" i="1" dirty="0"/>
+          </a:p>
+          <a:p>
+            <a:endParaRPr lang="en-US" i="1" dirty="0"/>
           </a:p>
           <a:p>
             <a:r>
               <a:rPr lang="en-US" dirty="0"/>
-              <a:t>	-&gt; ‘</a:t>
-            </a:r>
-            <a:r>
-              <a:rPr lang="en-US" dirty="0" err="1"/>
-              <a:t>enshittification</a:t>
-            </a:r>
-            <a:r>
-              <a:rPr lang="en-US" dirty="0"/>
-              <a:t>’! LLMs are ‘great’ help.</a:t>
-            </a:r>
-          </a:p>
-          <a:p>
-            <a:endParaRPr lang="en-US" dirty="0"/>
-          </a:p>
-          <a:p>
-            <a:r>
-              <a:rPr lang="en-US" dirty="0"/>
-              <a:t>Are your bosses OK with an inferior product? Then yeah, your job is threatened, even if the LLM does an obviously worse job than you! It’s cheaper than you!</a:t>
-            </a:r>
-          </a:p>
-          <a:p>
-            <a:r>
-              <a:rPr lang="en-US" dirty="0"/>
-              <a:t>BUT: you ML people also have power: </a:t>
-            </a:r>
-            <a:r>
-              <a:rPr lang="en-US" b="1" dirty="0"/>
-              <a:t>you don’t have to build these systems!</a:t>
-            </a:r>
-          </a:p>
-          <a:p>
-            <a:endParaRPr lang="en-US" dirty="0"/>
-          </a:p>
-          <a:p>
-            <a:endParaRPr lang="en-US" dirty="0"/>
-          </a:p>
-          <a:p>
-            <a:endParaRPr lang="en-US" dirty="0"/>
-          </a:p>
-          <a:p>
-            <a:endParaRPr lang="en-US" dirty="0"/>
+              <a:t>It’s not deployed publicly (yet). Python agent terrifies me (unchecked code on my system!!), internal document pipelines ‘security’/’reputational’ risks </a:t>
+            </a:r>
           </a:p>
         </p:txBody>
       </p:sp>
@@ -33496,7 +34328,7 @@
         <p:spPr>
           <a:xfrm>
             <a:off x="550862" y="557213"/>
-            <a:ext cx="8314841" cy="1431925"/>
+            <a:ext cx="10153581" cy="1431925"/>
           </a:xfrm>
         </p:spPr>
         <p:txBody>
@@ -33505,35 +34337,7 @@
           <a:p>
             <a:r>
               <a:rPr lang="en-US" dirty="0"/>
-              <a:t>Will GPTs/LLMS PUT you out of a job?</a:t>
-            </a:r>
-          </a:p>
-        </p:txBody>
-      </p:sp>
-      <p:sp>
-        <p:nvSpPr>
-          <p:cNvPr id="2" name="Text Placeholder 1">
-            <a:extLst>
-              <a:ext uri="{FF2B5EF4-FFF2-40B4-BE49-F238E27FC236}">
-                <a16:creationId xmlns:a16="http://schemas.microsoft.com/office/drawing/2014/main" id="{A448208C-36BB-17A4-B457-0913C261F865}"/>
-              </a:ext>
-            </a:extLst>
-          </p:cNvPr>
-          <p:cNvSpPr>
-            <a:spLocks noGrp="1"/>
-          </p:cNvSpPr>
-          <p:nvPr>
-            <p:ph type="body" sz="quarter" idx="18"/>
-          </p:nvPr>
-        </p:nvSpPr>
-        <p:spPr/>
-        <p:txBody>
-          <a:bodyPr/>
-          <a:lstStyle/>
-          <a:p>
-            <a:r>
-              <a:rPr lang="en-US" dirty="0"/>
-              <a:t>I don’t know, maybe???</a:t>
+              <a:t>OCEANGPT, current status</a:t>
             </a:r>
           </a:p>
         </p:txBody>
@@ -33594,7 +34398,7 @@
     </p:spTree>
     <p:extLst>
       <p:ext uri="{BB962C8B-B14F-4D97-AF65-F5344CB8AC3E}">
-        <p14:creationId xmlns:p14="http://schemas.microsoft.com/office/powerpoint/2010/main" val="640865080"/>
+        <p14:creationId xmlns:p14="http://schemas.microsoft.com/office/powerpoint/2010/main" val="3013363526"/>
       </p:ext>
     </p:extLst>
   </p:cSld>
@@ -33635,7 +34439,7 @@
                                           </p:stCondLst>
                                         </p:cTn>
                                         <p:tgtEl>
-                                          <p:spTgt spid="2">
+                                          <p:spTgt spid="8">
                                             <p:txEl>
                                               <p:pRg st="0" end="0"/>
                                             </p:txEl>
@@ -33686,7 +34490,7 @@
                                         <p:tgtEl>
                                           <p:spTgt spid="8">
                                             <p:txEl>
-                                              <p:pRg st="0" end="0"/>
+                                              <p:pRg st="2" end="2"/>
                                             </p:txEl>
                                           </p:spTgt>
                                         </p:tgtEl>
@@ -33728,104 +34532,6 @@
                                     <p:set>
                                       <p:cBhvr>
                                         <p:cTn id="14" dur="1" fill="hold">
-                                          <p:stCondLst>
-                                            <p:cond delay="0"/>
-                                          </p:stCondLst>
-                                        </p:cTn>
-                                        <p:tgtEl>
-                                          <p:spTgt spid="8">
-                                            <p:txEl>
-                                              <p:pRg st="1" end="1"/>
-                                            </p:txEl>
-                                          </p:spTgt>
-                                        </p:tgtEl>
-                                        <p:attrNameLst>
-                                          <p:attrName>style.visibility</p:attrName>
-                                        </p:attrNameLst>
-                                      </p:cBhvr>
-                                      <p:to>
-                                        <p:strVal val="visible"/>
-                                      </p:to>
-                                    </p:set>
-                                  </p:childTnLst>
-                                </p:cTn>
-                              </p:par>
-                            </p:childTnLst>
-                          </p:cTn>
-                        </p:par>
-                      </p:childTnLst>
-                    </p:cTn>
-                  </p:par>
-                  <p:par>
-                    <p:cTn id="15" fill="hold">
-                      <p:stCondLst>
-                        <p:cond delay="indefinite"/>
-                      </p:stCondLst>
-                      <p:childTnLst>
-                        <p:par>
-                          <p:cTn id="16" fill="hold">
-                            <p:stCondLst>
-                              <p:cond delay="0"/>
-                            </p:stCondLst>
-                            <p:childTnLst>
-                              <p:par>
-                                <p:cTn id="17" presetID="1" presetClass="entr" presetSubtype="0" fill="hold" grpId="0" nodeType="clickEffect">
-                                  <p:stCondLst>
-                                    <p:cond delay="0"/>
-                                  </p:stCondLst>
-                                  <p:childTnLst>
-                                    <p:set>
-                                      <p:cBhvr>
-                                        <p:cTn id="18" dur="1" fill="hold">
-                                          <p:stCondLst>
-                                            <p:cond delay="0"/>
-                                          </p:stCondLst>
-                                        </p:cTn>
-                                        <p:tgtEl>
-                                          <p:spTgt spid="8">
-                                            <p:txEl>
-                                              <p:pRg st="3" end="3"/>
-                                            </p:txEl>
-                                          </p:spTgt>
-                                        </p:tgtEl>
-                                        <p:attrNameLst>
-                                          <p:attrName>style.visibility</p:attrName>
-                                        </p:attrNameLst>
-                                      </p:cBhvr>
-                                      <p:to>
-                                        <p:strVal val="visible"/>
-                                      </p:to>
-                                    </p:set>
-                                  </p:childTnLst>
-                                </p:cTn>
-                              </p:par>
-                            </p:childTnLst>
-                          </p:cTn>
-                        </p:par>
-                      </p:childTnLst>
-                    </p:cTn>
-                  </p:par>
-                  <p:par>
-                    <p:cTn id="19" fill="hold">
-                      <p:stCondLst>
-                        <p:cond delay="indefinite"/>
-                      </p:stCondLst>
-                      <p:childTnLst>
-                        <p:par>
-                          <p:cTn id="20" fill="hold">
-                            <p:stCondLst>
-                              <p:cond delay="0"/>
-                            </p:stCondLst>
-                            <p:childTnLst>
-                              <p:par>
-                                <p:cTn id="21" presetID="1" presetClass="entr" presetSubtype="0" fill="hold" grpId="0" nodeType="clickEffect">
-                                  <p:stCondLst>
-                                    <p:cond delay="0"/>
-                                  </p:stCondLst>
-                                  <p:childTnLst>
-                                    <p:set>
-                                      <p:cBhvr>
-                                        <p:cTn id="22" dur="1" fill="hold">
                                           <p:stCondLst>
                                             <p:cond delay="0"/>
                                           </p:stCondLst>
@@ -33877,7 +34583,6 @@
     </p:tnLst>
     <p:bldLst>
       <p:bldP spid="8" grpId="0" build="p"/>
-      <p:bldP spid="2" grpId="0" build="p"/>
     </p:bldLst>
   </p:timing>
 </p:sld>
@@ -33926,10 +34631,76 @@
           <a:bodyPr/>
           <a:lstStyle/>
           <a:p>
+            <a:r>
+              <a:rPr lang="en-US" dirty="0"/>
+              <a:t>BUT: what if a wrong </a:t>
+            </a:r>
+            <a:r>
+              <a:rPr lang="en-US" dirty="0" err="1"/>
+              <a:t>OceanGPT</a:t>
+            </a:r>
+            <a:r>
+              <a:rPr lang="en-US" dirty="0"/>
+              <a:t> answer leads to a proposed marine park NOT getting established, where it should’ve been established? </a:t>
+            </a:r>
+            <a:r>
+              <a:rPr lang="en-US" dirty="0">
+                <a:solidFill>
+                  <a:schemeClr val="accent1"/>
+                </a:solidFill>
+              </a:rPr>
+              <a:t>Who is responsible, who is accountable?</a:t>
+            </a:r>
+            <a:r>
+              <a:rPr lang="en-US" dirty="0"/>
+              <a:t> Would people even </a:t>
+            </a:r>
+            <a:r>
+              <a:rPr lang="en-US" dirty="0" err="1"/>
+              <a:t>realise</a:t>
+            </a:r>
+            <a:r>
+              <a:rPr lang="en-US" dirty="0"/>
+              <a:t> the error?</a:t>
+            </a:r>
+          </a:p>
+          <a:p>
             <a:endParaRPr lang="en-US" dirty="0"/>
           </a:p>
           <a:p>
+            <a:r>
+              <a:rPr lang="en-US" dirty="0"/>
+              <a:t>Even if a person says they’re not including </a:t>
+            </a:r>
+            <a:r>
+              <a:rPr lang="en-US" dirty="0" err="1"/>
+              <a:t>OceanGPT</a:t>
+            </a:r>
+            <a:r>
+              <a:rPr lang="en-US" dirty="0"/>
+              <a:t> answers, they might still get influenced by the answer! see ‘nudging’, ‘priming’ (controversial in themselves)</a:t>
+            </a:r>
+          </a:p>
+          <a:p>
             <a:endParaRPr lang="en-US" dirty="0"/>
+          </a:p>
+          <a:p>
+            <a:r>
+              <a:rPr lang="en-US" dirty="0"/>
+              <a:t>Marine park establishment is surprisingly political and emotional. What if a MPA opponent uses </a:t>
+            </a:r>
+            <a:r>
+              <a:rPr lang="en-US" dirty="0" err="1"/>
+              <a:t>OceanGPT</a:t>
+            </a:r>
+            <a:r>
+              <a:rPr lang="en-US" dirty="0"/>
+              <a:t> to embarrass the organization? Potential quote: </a:t>
+            </a:r>
+            <a:r>
+              <a:rPr lang="en-US" i="1" dirty="0"/>
+              <a:t>‘How can you trust their science if their tech lies to your face?’</a:t>
+            </a:r>
           </a:p>
         </p:txBody>
       </p:sp>
@@ -33961,15 +34732,7 @@
           <a:p>
             <a:r>
               <a:rPr lang="en-US" dirty="0"/>
-              <a:t>YOU </a:t>
-            </a:r>
-            <a:r>
-              <a:rPr lang="en-US" dirty="0" err="1"/>
-              <a:t>DON’t</a:t>
-            </a:r>
-            <a:r>
-              <a:rPr lang="en-US" dirty="0"/>
-              <a:t> HAVE TO BUILD THE TORMENT NEXUS</a:t>
+              <a:t>OCEANGPT, current status</a:t>
             </a:r>
           </a:p>
         </p:txBody>
@@ -34027,98 +34790,196 @@
           </a:p>
         </p:txBody>
       </p:sp>
-      <p:pic>
-        <p:nvPicPr>
-          <p:cNvPr id="1026" name="Picture 2" descr="Alex Blechman @AlexBlechman Sci-Fi Author: In my book I invented the Torment Nexus as a cautionary tale Tech Company: At long last, we have created the Torment Nexus from classic sci-fi novel Don't Create The Torment Nexus 5:49 PM Nov 8, 2021. Twitter Web App">
-            <a:extLst>
-              <a:ext uri="{FF2B5EF4-FFF2-40B4-BE49-F238E27FC236}">
-                <a16:creationId xmlns:a16="http://schemas.microsoft.com/office/drawing/2014/main" id="{8AD83AEF-D79C-31B4-42BC-95521827571C}"/>
-              </a:ext>
-            </a:extLst>
-          </p:cNvPr>
-          <p:cNvPicPr>
-            <a:picLocks noChangeAspect="1" noChangeArrowheads="1"/>
-          </p:cNvPicPr>
-          <p:nvPr/>
-        </p:nvPicPr>
-        <p:blipFill>
-          <a:blip r:embed="rId2">
-            <a:extLst>
-              <a:ext uri="{28A0092B-C50C-407E-A947-70E740481C1C}">
-                <a14:useLocalDpi xmlns:a14="http://schemas.microsoft.com/office/drawing/2010/main"/>
-              </a:ext>
-            </a:extLst>
-          </a:blip>
-          <a:srcRect/>
-          <a:stretch>
-            <a:fillRect/>
-          </a:stretch>
-        </p:blipFill>
-        <p:spPr bwMode="auto">
-          <a:xfrm>
-            <a:off x="3540642" y="1909012"/>
-            <a:ext cx="4464788" cy="3250103"/>
-          </a:xfrm>
-          <a:prstGeom prst="rect">
-            <a:avLst/>
-          </a:prstGeom>
-          <a:noFill/>
-          <a:extLst>
-            <a:ext uri="{909E8E84-426E-40DD-AFC4-6F175D3DCCD1}">
-              <a14:hiddenFill xmlns:a14="http://schemas.microsoft.com/office/drawing/2010/main">
-                <a:solidFill>
-                  <a:srgbClr val="FFFFFF"/>
-                </a:solidFill>
-              </a14:hiddenFill>
-            </a:ext>
-          </a:extLst>
-        </p:spPr>
-      </p:pic>
-      <p:sp>
-        <p:nvSpPr>
-          <p:cNvPr id="5" name="TextBox 4">
-            <a:extLst>
-              <a:ext uri="{FF2B5EF4-FFF2-40B4-BE49-F238E27FC236}">
-                <a16:creationId xmlns:a16="http://schemas.microsoft.com/office/drawing/2014/main" id="{9EDCC85D-1D15-C249-0935-48BA92CFD7C6}"/>
-              </a:ext>
-            </a:extLst>
-          </p:cNvPr>
-          <p:cNvSpPr txBox="1"/>
-          <p:nvPr/>
-        </p:nvSpPr>
-        <p:spPr>
-          <a:xfrm>
-            <a:off x="627321" y="5369099"/>
-            <a:ext cx="10164726" cy="461665"/>
-          </a:xfrm>
-          <a:prstGeom prst="rect">
-            <a:avLst/>
-          </a:prstGeom>
-          <a:noFill/>
-        </p:spPr>
-        <p:txBody>
-          <a:bodyPr wrap="square">
-            <a:spAutoFit/>
-          </a:bodyPr>
-          <a:lstStyle/>
-          <a:p>
-            <a:r>
-              <a:rPr lang="en-US" sz="2400" dirty="0"/>
-              <a:t>You are in a unique position as (currently) only you can build the Torment Nexus</a:t>
-            </a:r>
-          </a:p>
-        </p:txBody>
-      </p:sp>
     </p:spTree>
     <p:extLst>
       <p:ext uri="{BB962C8B-B14F-4D97-AF65-F5344CB8AC3E}">
-        <p14:creationId xmlns:p14="http://schemas.microsoft.com/office/powerpoint/2010/main" val="2404152885"/>
+        <p14:creationId xmlns:p14="http://schemas.microsoft.com/office/powerpoint/2010/main" val="3589355139"/>
       </p:ext>
     </p:extLst>
   </p:cSld>
   <p:clrMapOvr>
     <a:masterClrMapping/>
   </p:clrMapOvr>
+  <p:timing>
+    <p:tnLst>
+      <p:par>
+        <p:cTn id="1" dur="indefinite" restart="never" nodeType="tmRoot">
+          <p:childTnLst>
+            <p:seq concurrent="1" nextAc="seek">
+              <p:cTn id="2" dur="indefinite" nodeType="mainSeq">
+                <p:childTnLst>
+                  <p:par>
+                    <p:cTn id="3" fill="hold">
+                      <p:stCondLst>
+                        <p:cond delay="indefinite"/>
+                      </p:stCondLst>
+                      <p:childTnLst>
+                        <p:par>
+                          <p:cTn id="4" fill="hold">
+                            <p:stCondLst>
+                              <p:cond delay="0"/>
+                            </p:stCondLst>
+                            <p:childTnLst>
+                              <p:par>
+                                <p:cTn id="5" presetID="1" presetClass="entr" presetSubtype="0" fill="hold" grpId="0" nodeType="clickEffect">
+                                  <p:stCondLst>
+                                    <p:cond delay="0"/>
+                                  </p:stCondLst>
+                                  <p:childTnLst>
+                                    <p:set>
+                                      <p:cBhvr>
+                                        <p:cTn id="6" dur="1" fill="hold">
+                                          <p:stCondLst>
+                                            <p:cond delay="0"/>
+                                          </p:stCondLst>
+                                        </p:cTn>
+                                        <p:tgtEl>
+                                          <p:spTgt spid="8">
+                                            <p:txEl>
+                                              <p:pRg st="0" end="0"/>
+                                            </p:txEl>
+                                          </p:spTgt>
+                                        </p:tgtEl>
+                                        <p:attrNameLst>
+                                          <p:attrName>style.visibility</p:attrName>
+                                        </p:attrNameLst>
+                                      </p:cBhvr>
+                                      <p:to>
+                                        <p:strVal val="visible"/>
+                                      </p:to>
+                                    </p:set>
+                                  </p:childTnLst>
+                                </p:cTn>
+                              </p:par>
+                            </p:childTnLst>
+                          </p:cTn>
+                        </p:par>
+                      </p:childTnLst>
+                    </p:cTn>
+                  </p:par>
+                  <p:par>
+                    <p:cTn id="7" fill="hold">
+                      <p:stCondLst>
+                        <p:cond delay="indefinite"/>
+                      </p:stCondLst>
+                      <p:childTnLst>
+                        <p:par>
+                          <p:cTn id="8" fill="hold">
+                            <p:stCondLst>
+                              <p:cond delay="0"/>
+                            </p:stCondLst>
+                            <p:childTnLst>
+                              <p:par>
+                                <p:cTn id="9" presetID="1" presetClass="entr" presetSubtype="0" fill="hold" grpId="0" nodeType="clickEffect">
+                                  <p:stCondLst>
+                                    <p:cond delay="0"/>
+                                  </p:stCondLst>
+                                  <p:childTnLst>
+                                    <p:set>
+                                      <p:cBhvr>
+                                        <p:cTn id="10" dur="1" fill="hold">
+                                          <p:stCondLst>
+                                            <p:cond delay="0"/>
+                                          </p:stCondLst>
+                                        </p:cTn>
+                                        <p:tgtEl>
+                                          <p:spTgt spid="8">
+                                            <p:txEl>
+                                              <p:pRg st="2" end="2"/>
+                                            </p:txEl>
+                                          </p:spTgt>
+                                        </p:tgtEl>
+                                        <p:attrNameLst>
+                                          <p:attrName>style.visibility</p:attrName>
+                                        </p:attrNameLst>
+                                      </p:cBhvr>
+                                      <p:to>
+                                        <p:strVal val="visible"/>
+                                      </p:to>
+                                    </p:set>
+                                  </p:childTnLst>
+                                </p:cTn>
+                              </p:par>
+                            </p:childTnLst>
+                          </p:cTn>
+                        </p:par>
+                      </p:childTnLst>
+                    </p:cTn>
+                  </p:par>
+                  <p:par>
+                    <p:cTn id="11" fill="hold">
+                      <p:stCondLst>
+                        <p:cond delay="indefinite"/>
+                      </p:stCondLst>
+                      <p:childTnLst>
+                        <p:par>
+                          <p:cTn id="12" fill="hold">
+                            <p:stCondLst>
+                              <p:cond delay="0"/>
+                            </p:stCondLst>
+                            <p:childTnLst>
+                              <p:par>
+                                <p:cTn id="13" presetID="1" presetClass="entr" presetSubtype="0" fill="hold" grpId="0" nodeType="clickEffect">
+                                  <p:stCondLst>
+                                    <p:cond delay="0"/>
+                                  </p:stCondLst>
+                                  <p:childTnLst>
+                                    <p:set>
+                                      <p:cBhvr>
+                                        <p:cTn id="14" dur="1" fill="hold">
+                                          <p:stCondLst>
+                                            <p:cond delay="0"/>
+                                          </p:stCondLst>
+                                        </p:cTn>
+                                        <p:tgtEl>
+                                          <p:spTgt spid="8">
+                                            <p:txEl>
+                                              <p:pRg st="4" end="4"/>
+                                            </p:txEl>
+                                          </p:spTgt>
+                                        </p:tgtEl>
+                                        <p:attrNameLst>
+                                          <p:attrName>style.visibility</p:attrName>
+                                        </p:attrNameLst>
+                                      </p:cBhvr>
+                                      <p:to>
+                                        <p:strVal val="visible"/>
+                                      </p:to>
+                                    </p:set>
+                                  </p:childTnLst>
+                                </p:cTn>
+                              </p:par>
+                            </p:childTnLst>
+                          </p:cTn>
+                        </p:par>
+                      </p:childTnLst>
+                    </p:cTn>
+                  </p:par>
+                </p:childTnLst>
+              </p:cTn>
+              <p:prevCondLst>
+                <p:cond evt="onPrev" delay="0">
+                  <p:tgtEl>
+                    <p:sldTgt/>
+                  </p:tgtEl>
+                </p:cond>
+              </p:prevCondLst>
+              <p:nextCondLst>
+                <p:cond evt="onNext" delay="0">
+                  <p:tgtEl>
+                    <p:sldTgt/>
+                  </p:tgtEl>
+                </p:cond>
+              </p:nextCondLst>
+            </p:seq>
+          </p:childTnLst>
+        </p:cTn>
+      </p:par>
+    </p:tnLst>
+    <p:bldLst>
+      <p:bldP spid="8" grpId="0" build="p"/>
+    </p:bldLst>
+  </p:timing>
 </p:sld>
 </file>
 
@@ -34167,7 +35028,7 @@
           <a:p>
             <a:r>
               <a:rPr lang="en-US" dirty="0"/>
-              <a:t>With the ocean data project, I don’t have as many ethical problems as a human-centric application. It’s unlikely that I trigger department closure, for example</a:t>
+              <a:t>Malicious actors:</a:t>
             </a:r>
           </a:p>
           <a:p>
@@ -34175,34 +35036,21 @@
           </a:p>
           <a:p>
             <a:r>
+              <a:rPr lang="en-US" i="1" dirty="0"/>
+              <a:t>	</a:t>
+            </a:r>
+            <a:r>
               <a:rPr lang="en-US" dirty="0"/>
-              <a:t>Currently the answers are best for the ‘vibe’  (Vicki </a:t>
-            </a:r>
-            <a:r>
-              <a:rPr lang="en-US" dirty="0" err="1"/>
-              <a:t>Boykis</a:t>
-            </a:r>
+              <a:t>Could use the tech to track endangered or highly valuable fish</a:t>
+            </a:r>
+          </a:p>
+          <a:p>
+            <a:endParaRPr lang="en-US" dirty="0"/>
+          </a:p>
+          <a:p>
             <a:r>
               <a:rPr lang="en-US" dirty="0"/>
-              <a:t>), the model gives you the general direction you </a:t>
-            </a:r>
-            <a:r>
-              <a:rPr lang="en-US" i="1" dirty="0"/>
-              <a:t>yourself </a:t>
-            </a:r>
-            <a:r>
-              <a:rPr lang="en-US" dirty="0"/>
-              <a:t>can go into (which papers to read, which code to write etc.). But: do users agree? They might not proceed.</a:t>
-            </a:r>
-            <a:endParaRPr lang="en-US" i="1" dirty="0"/>
-          </a:p>
-          <a:p>
-            <a:endParaRPr lang="en-US" i="1" dirty="0"/>
-          </a:p>
-          <a:p>
-            <a:r>
-              <a:rPr lang="en-US" dirty="0"/>
-              <a:t>It’s not deployed publicly (yet). Python agent terrifies me (unchecked code on my system!! Replace by SQL?), internal document pipelines ‘security’/’reputational’ risks </a:t>
+              <a:t>	Malicious prompting could get used to have GPT produce opposing 	messages with no data support (‘don’t establish this marine protected area!’)</a:t>
             </a:r>
           </a:p>
         </p:txBody>
@@ -34235,7 +35083,7 @@
           <a:p>
             <a:r>
               <a:rPr lang="en-US" dirty="0"/>
-              <a:t>OCEANGPT, current status</a:t>
+              <a:t>OCEANGPT, other threats</a:t>
             </a:r>
           </a:p>
         </p:txBody>
@@ -34296,7 +35144,7 @@
     </p:spTree>
     <p:extLst>
       <p:ext uri="{BB962C8B-B14F-4D97-AF65-F5344CB8AC3E}">
-        <p14:creationId xmlns:p14="http://schemas.microsoft.com/office/powerpoint/2010/main" val="3013363526"/>
+        <p14:creationId xmlns:p14="http://schemas.microsoft.com/office/powerpoint/2010/main" val="2284759453"/>
       </p:ext>
     </p:extLst>
   </p:cSld>
@@ -34531,390 +35379,16 @@
           <a:p>
             <a:r>
               <a:rPr lang="en-US" dirty="0"/>
-              <a:t>BUT: what if a wrong </a:t>
-            </a:r>
-            <a:r>
-              <a:rPr lang="en-US" dirty="0" err="1"/>
-              <a:t>OceanGPT</a:t>
-            </a:r>
-            <a:r>
-              <a:rPr lang="en-US" dirty="0"/>
-              <a:t> answer leads to a proposed marine park NOT getting established, where it should’ve been established? Who is responsible, who is accountable? Would people even </a:t>
-            </a:r>
-            <a:r>
-              <a:rPr lang="en-US" dirty="0" err="1"/>
-              <a:t>realise</a:t>
-            </a:r>
-            <a:r>
-              <a:rPr lang="en-US" dirty="0"/>
-              <a:t> the error?</a:t>
-            </a:r>
-          </a:p>
-          <a:p>
-            <a:endParaRPr lang="en-US" dirty="0"/>
-          </a:p>
-          <a:p>
-            <a:r>
-              <a:rPr lang="en-US" dirty="0"/>
-              <a:t>Even if a person says they’re not including </a:t>
-            </a:r>
-            <a:r>
-              <a:rPr lang="en-US" dirty="0" err="1"/>
-              <a:t>OceanGPT</a:t>
-            </a:r>
-            <a:r>
-              <a:rPr lang="en-US" dirty="0"/>
-              <a:t> answers, they might still get influenced by the answer! see ‘nudging’, ‘priming’ (controversial in themselves)</a:t>
-            </a:r>
-          </a:p>
-          <a:p>
-            <a:endParaRPr lang="en-US" dirty="0"/>
-          </a:p>
-          <a:p>
-            <a:r>
-              <a:rPr lang="en-US" dirty="0"/>
-              <a:t>Marine park establishment is surprisingly political and emotional. What if a MPA opponent uses </a:t>
-            </a:r>
-            <a:r>
-              <a:rPr lang="en-US" dirty="0" err="1"/>
-              <a:t>OceanGPT</a:t>
-            </a:r>
-            <a:r>
-              <a:rPr lang="en-US" dirty="0"/>
-              <a:t> to embarrass the organization? Potential quote: </a:t>
-            </a:r>
+              <a:t>The biggest problem remains:</a:t>
+            </a:r>
+          </a:p>
+          <a:p>
+            <a:endParaRPr lang="en-US" i="1" dirty="0"/>
+          </a:p>
+          <a:p>
             <a:r>
               <a:rPr lang="en-US" i="1" dirty="0"/>
-              <a:t>‘How can you trust their science if their tech lies to your face?’</a:t>
-            </a:r>
-          </a:p>
-        </p:txBody>
-      </p:sp>
-      <p:sp>
-        <p:nvSpPr>
-          <p:cNvPr id="12" name="Text Placeholder 11">
-            <a:extLst>
-              <a:ext uri="{FF2B5EF4-FFF2-40B4-BE49-F238E27FC236}">
-                <a16:creationId xmlns:a16="http://schemas.microsoft.com/office/drawing/2014/main" id="{EF66C240-066A-6114-6051-A52BBF168323}"/>
-              </a:ext>
-            </a:extLst>
-          </p:cNvPr>
-          <p:cNvSpPr>
-            <a:spLocks noGrp="1"/>
-          </p:cNvSpPr>
-          <p:nvPr>
-            <p:ph type="body" sz="quarter" idx="15"/>
-          </p:nvPr>
-        </p:nvSpPr>
-        <p:spPr>
-          <a:xfrm>
-            <a:off x="550862" y="557213"/>
-            <a:ext cx="10153581" cy="1431925"/>
-          </a:xfrm>
-        </p:spPr>
-        <p:txBody>
-          <a:bodyPr/>
-          <a:lstStyle/>
-          <a:p>
-            <a:r>
-              <a:rPr lang="en-US" dirty="0"/>
-              <a:t>OCEANGPT, current status</a:t>
-            </a:r>
-          </a:p>
-        </p:txBody>
-      </p:sp>
-      <p:sp>
-        <p:nvSpPr>
-          <p:cNvPr id="4" name="Text Placeholder 3">
-            <a:extLst>
-              <a:ext uri="{FF2B5EF4-FFF2-40B4-BE49-F238E27FC236}">
-                <a16:creationId xmlns:a16="http://schemas.microsoft.com/office/drawing/2014/main" id="{0758297B-DBEE-77FB-D44E-24DF4EBDA1CC}"/>
-              </a:ext>
-            </a:extLst>
-          </p:cNvPr>
-          <p:cNvSpPr>
-            <a:spLocks noGrp="1"/>
-          </p:cNvSpPr>
-          <p:nvPr>
-            <p:ph type="body" sz="quarter" idx="19"/>
-          </p:nvPr>
-        </p:nvSpPr>
-        <p:spPr/>
-        <p:txBody>
-          <a:bodyPr/>
-          <a:lstStyle/>
-          <a:p>
-            <a:r>
-              <a:rPr lang="en-US" dirty="0"/>
-              <a:t>OceanOmics</a:t>
-            </a:r>
-          </a:p>
-        </p:txBody>
-      </p:sp>
-      <p:sp>
-        <p:nvSpPr>
-          <p:cNvPr id="3" name="Footer Placeholder 2">
-            <a:extLst>
-              <a:ext uri="{FF2B5EF4-FFF2-40B4-BE49-F238E27FC236}">
-                <a16:creationId xmlns:a16="http://schemas.microsoft.com/office/drawing/2014/main" id="{D3B2DAC0-8F08-7376-11CC-10386AEADBD5}"/>
-              </a:ext>
-            </a:extLst>
-          </p:cNvPr>
-          <p:cNvSpPr>
-            <a:spLocks noGrp="1"/>
-          </p:cNvSpPr>
-          <p:nvPr>
-            <p:ph type="ftr" sz="quarter" idx="3"/>
-          </p:nvPr>
-        </p:nvSpPr>
-        <p:spPr/>
-        <p:txBody>
-          <a:bodyPr/>
-          <a:lstStyle/>
-          <a:p>
-            <a:endParaRPr lang="en-US" dirty="0"/>
-          </a:p>
-        </p:txBody>
-      </p:sp>
-    </p:spTree>
-    <p:extLst>
-      <p:ext uri="{BB962C8B-B14F-4D97-AF65-F5344CB8AC3E}">
-        <p14:creationId xmlns:p14="http://schemas.microsoft.com/office/powerpoint/2010/main" val="3589355139"/>
-      </p:ext>
-    </p:extLst>
-  </p:cSld>
-  <p:clrMapOvr>
-    <a:masterClrMapping/>
-  </p:clrMapOvr>
-  <p:timing>
-    <p:tnLst>
-      <p:par>
-        <p:cTn id="1" dur="indefinite" restart="never" nodeType="tmRoot">
-          <p:childTnLst>
-            <p:seq concurrent="1" nextAc="seek">
-              <p:cTn id="2" dur="indefinite" nodeType="mainSeq">
-                <p:childTnLst>
-                  <p:par>
-                    <p:cTn id="3" fill="hold">
-                      <p:stCondLst>
-                        <p:cond delay="indefinite"/>
-                      </p:stCondLst>
-                      <p:childTnLst>
-                        <p:par>
-                          <p:cTn id="4" fill="hold">
-                            <p:stCondLst>
-                              <p:cond delay="0"/>
-                            </p:stCondLst>
-                            <p:childTnLst>
-                              <p:par>
-                                <p:cTn id="5" presetID="1" presetClass="entr" presetSubtype="0" fill="hold" grpId="0" nodeType="clickEffect">
-                                  <p:stCondLst>
-                                    <p:cond delay="0"/>
-                                  </p:stCondLst>
-                                  <p:childTnLst>
-                                    <p:set>
-                                      <p:cBhvr>
-                                        <p:cTn id="6" dur="1" fill="hold">
-                                          <p:stCondLst>
-                                            <p:cond delay="0"/>
-                                          </p:stCondLst>
-                                        </p:cTn>
-                                        <p:tgtEl>
-                                          <p:spTgt spid="8">
-                                            <p:txEl>
-                                              <p:pRg st="0" end="0"/>
-                                            </p:txEl>
-                                          </p:spTgt>
-                                        </p:tgtEl>
-                                        <p:attrNameLst>
-                                          <p:attrName>style.visibility</p:attrName>
-                                        </p:attrNameLst>
-                                      </p:cBhvr>
-                                      <p:to>
-                                        <p:strVal val="visible"/>
-                                      </p:to>
-                                    </p:set>
-                                  </p:childTnLst>
-                                </p:cTn>
-                              </p:par>
-                            </p:childTnLst>
-                          </p:cTn>
-                        </p:par>
-                      </p:childTnLst>
-                    </p:cTn>
-                  </p:par>
-                  <p:par>
-                    <p:cTn id="7" fill="hold">
-                      <p:stCondLst>
-                        <p:cond delay="indefinite"/>
-                      </p:stCondLst>
-                      <p:childTnLst>
-                        <p:par>
-                          <p:cTn id="8" fill="hold">
-                            <p:stCondLst>
-                              <p:cond delay="0"/>
-                            </p:stCondLst>
-                            <p:childTnLst>
-                              <p:par>
-                                <p:cTn id="9" presetID="1" presetClass="entr" presetSubtype="0" fill="hold" grpId="0" nodeType="clickEffect">
-                                  <p:stCondLst>
-                                    <p:cond delay="0"/>
-                                  </p:stCondLst>
-                                  <p:childTnLst>
-                                    <p:set>
-                                      <p:cBhvr>
-                                        <p:cTn id="10" dur="1" fill="hold">
-                                          <p:stCondLst>
-                                            <p:cond delay="0"/>
-                                          </p:stCondLst>
-                                        </p:cTn>
-                                        <p:tgtEl>
-                                          <p:spTgt spid="8">
-                                            <p:txEl>
-                                              <p:pRg st="2" end="2"/>
-                                            </p:txEl>
-                                          </p:spTgt>
-                                        </p:tgtEl>
-                                        <p:attrNameLst>
-                                          <p:attrName>style.visibility</p:attrName>
-                                        </p:attrNameLst>
-                                      </p:cBhvr>
-                                      <p:to>
-                                        <p:strVal val="visible"/>
-                                      </p:to>
-                                    </p:set>
-                                  </p:childTnLst>
-                                </p:cTn>
-                              </p:par>
-                            </p:childTnLst>
-                          </p:cTn>
-                        </p:par>
-                      </p:childTnLst>
-                    </p:cTn>
-                  </p:par>
-                  <p:par>
-                    <p:cTn id="11" fill="hold">
-                      <p:stCondLst>
-                        <p:cond delay="indefinite"/>
-                      </p:stCondLst>
-                      <p:childTnLst>
-                        <p:par>
-                          <p:cTn id="12" fill="hold">
-                            <p:stCondLst>
-                              <p:cond delay="0"/>
-                            </p:stCondLst>
-                            <p:childTnLst>
-                              <p:par>
-                                <p:cTn id="13" presetID="1" presetClass="entr" presetSubtype="0" fill="hold" grpId="0" nodeType="clickEffect">
-                                  <p:stCondLst>
-                                    <p:cond delay="0"/>
-                                  </p:stCondLst>
-                                  <p:childTnLst>
-                                    <p:set>
-                                      <p:cBhvr>
-                                        <p:cTn id="14" dur="1" fill="hold">
-                                          <p:stCondLst>
-                                            <p:cond delay="0"/>
-                                          </p:stCondLst>
-                                        </p:cTn>
-                                        <p:tgtEl>
-                                          <p:spTgt spid="8">
-                                            <p:txEl>
-                                              <p:pRg st="4" end="4"/>
-                                            </p:txEl>
-                                          </p:spTgt>
-                                        </p:tgtEl>
-                                        <p:attrNameLst>
-                                          <p:attrName>style.visibility</p:attrName>
-                                        </p:attrNameLst>
-                                      </p:cBhvr>
-                                      <p:to>
-                                        <p:strVal val="visible"/>
-                                      </p:to>
-                                    </p:set>
-                                  </p:childTnLst>
-                                </p:cTn>
-                              </p:par>
-                            </p:childTnLst>
-                          </p:cTn>
-                        </p:par>
-                      </p:childTnLst>
-                    </p:cTn>
-                  </p:par>
-                </p:childTnLst>
-              </p:cTn>
-              <p:prevCondLst>
-                <p:cond evt="onPrev" delay="0">
-                  <p:tgtEl>
-                    <p:sldTgt/>
-                  </p:tgtEl>
-                </p:cond>
-              </p:prevCondLst>
-              <p:nextCondLst>
-                <p:cond evt="onNext" delay="0">
-                  <p:tgtEl>
-                    <p:sldTgt/>
-                  </p:tgtEl>
-                </p:cond>
-              </p:nextCondLst>
-            </p:seq>
-          </p:childTnLst>
-        </p:cTn>
-      </p:par>
-    </p:tnLst>
-    <p:bldLst>
-      <p:bldP spid="8" grpId="0" build="p"/>
-    </p:bldLst>
-  </p:timing>
-</p:sld>
-</file>
-
-<file path=ppt/slides/slide26.xml><?xml version="1.0" encoding="utf-8"?>
-<p:sld xmlns:a="http://schemas.openxmlformats.org/drawingml/2006/main" xmlns:r="http://schemas.openxmlformats.org/officeDocument/2006/relationships" xmlns:p="http://schemas.openxmlformats.org/presentationml/2006/main">
-  <p:cSld>
-    <p:spTree>
-      <p:nvGrpSpPr>
-        <p:cNvPr id="1" name=""/>
-        <p:cNvGrpSpPr/>
-        <p:nvPr/>
-      </p:nvGrpSpPr>
-      <p:grpSpPr>
-        <a:xfrm>
-          <a:off x="0" y="0"/>
-          <a:ext cx="0" cy="0"/>
-          <a:chOff x="0" y="0"/>
-          <a:chExt cx="0" cy="0"/>
-        </a:xfrm>
-      </p:grpSpPr>
-      <p:sp>
-        <p:nvSpPr>
-          <p:cNvPr id="8" name="Text Placeholder 7">
-            <a:extLst>
-              <a:ext uri="{FF2B5EF4-FFF2-40B4-BE49-F238E27FC236}">
-                <a16:creationId xmlns:a16="http://schemas.microsoft.com/office/drawing/2014/main" id="{11B93F59-E86F-BB9B-E9F0-9F9F97DAAF6D}"/>
-              </a:ext>
-            </a:extLst>
-          </p:cNvPr>
-          <p:cNvSpPr>
-            <a:spLocks noGrp="1"/>
-          </p:cNvSpPr>
-          <p:nvPr>
-            <p:ph type="body" sz="quarter" idx="14"/>
-          </p:nvPr>
-        </p:nvSpPr>
-        <p:spPr>
-          <a:xfrm>
-            <a:off x="550862" y="2199122"/>
-            <a:ext cx="10948712" cy="2606792"/>
-          </a:xfrm>
-        </p:spPr>
-        <p:txBody>
-          <a:bodyPr/>
-          <a:lstStyle/>
-          <a:p>
-            <a:r>
-              <a:rPr lang="en-US" dirty="0"/>
-              <a:t>The biggest problem remains:</a:t>
+              <a:t>I cannot trust the output 100 percent.</a:t>
             </a:r>
           </a:p>
           <a:p>
@@ -34923,22 +35397,21 @@
           <a:p>
             <a:r>
               <a:rPr lang="en-US" i="1" dirty="0"/>
-              <a:t>I cannot trust the output 100 percent</a:t>
-            </a:r>
-          </a:p>
-          <a:p>
-            <a:endParaRPr lang="en-US" i="1" dirty="0"/>
-          </a:p>
-          <a:p>
-            <a:r>
-              <a:rPr lang="en-US" i="1" dirty="0"/>
-              <a:t>The way GPTs/LLMs are trained right now means we will never get to 100%.</a:t>
+              <a:t>The way GPTs/LLMs are currently trained means we will never get to 100%.</a:t>
             </a:r>
             <a:br>
               <a:rPr lang="en-US" i="1" dirty="0"/>
             </a:br>
             <a:r>
               <a:rPr lang="en-US" i="1" dirty="0"/>
+              <a:t>				</a:t>
+            </a:r>
+            <a:r>
+              <a:rPr lang="en-US" b="1" i="1" dirty="0">
+                <a:solidFill>
+                  <a:schemeClr val="accent1"/>
+                </a:solidFill>
+              </a:rPr>
               <a:t>Truth is not an objective.</a:t>
             </a:r>
           </a:p>
@@ -34951,7 +35424,11 @@
               <a:t>Not possible to predict </a:t>
             </a:r>
             <a:r>
-              <a:rPr lang="en-US" b="1" i="1" dirty="0"/>
+              <a:rPr lang="en-US" b="1" i="1" dirty="0">
+                <a:solidFill>
+                  <a:schemeClr val="accent1"/>
+                </a:solidFill>
+              </a:rPr>
               <a:t>when</a:t>
             </a:r>
             <a:r>
@@ -35289,6 +35766,453 @@
 </p:sld>
 </file>
 
+<file path=ppt/slides/slide26.xml><?xml version="1.0" encoding="utf-8"?>
+<p:sld xmlns:a="http://schemas.openxmlformats.org/drawingml/2006/main" xmlns:r="http://schemas.openxmlformats.org/officeDocument/2006/relationships" xmlns:p="http://schemas.openxmlformats.org/presentationml/2006/main">
+  <p:cSld>
+    <p:spTree>
+      <p:nvGrpSpPr>
+        <p:cNvPr id="1" name=""/>
+        <p:cNvGrpSpPr/>
+        <p:nvPr/>
+      </p:nvGrpSpPr>
+      <p:grpSpPr>
+        <a:xfrm>
+          <a:off x="0" y="0"/>
+          <a:ext cx="0" cy="0"/>
+          <a:chOff x="0" y="0"/>
+          <a:chExt cx="0" cy="0"/>
+        </a:xfrm>
+      </p:grpSpPr>
+      <p:sp>
+        <p:nvSpPr>
+          <p:cNvPr id="8" name="Text Placeholder 7">
+            <a:extLst>
+              <a:ext uri="{FF2B5EF4-FFF2-40B4-BE49-F238E27FC236}">
+                <a16:creationId xmlns:a16="http://schemas.microsoft.com/office/drawing/2014/main" id="{11B93F59-E86F-BB9B-E9F0-9F9F97DAAF6D}"/>
+              </a:ext>
+            </a:extLst>
+          </p:cNvPr>
+          <p:cNvSpPr>
+            <a:spLocks noGrp="1"/>
+          </p:cNvSpPr>
+          <p:nvPr>
+            <p:ph type="body" sz="quarter" idx="14"/>
+          </p:nvPr>
+        </p:nvSpPr>
+        <p:spPr>
+          <a:xfrm>
+            <a:off x="550862" y="3173157"/>
+            <a:ext cx="10948712" cy="2606792"/>
+          </a:xfrm>
+        </p:spPr>
+        <p:txBody>
+          <a:bodyPr/>
+          <a:lstStyle/>
+          <a:p>
+            <a:r>
+              <a:rPr lang="en-US" dirty="0"/>
+              <a:t>Depends on how dodgy your bosses are! Biggest amount of ‘money saved by LLMs’ is in LLM-based customer support, but it’s a worse product.  (examples: eating disorder chat; </a:t>
+            </a:r>
+            <a:r>
+              <a:rPr lang="en-US" dirty="0" err="1"/>
+              <a:t>doordash</a:t>
+            </a:r>
+            <a:r>
+              <a:rPr lang="en-US" dirty="0"/>
+              <a:t> support)</a:t>
+            </a:r>
+          </a:p>
+          <a:p>
+            <a:r>
+              <a:rPr lang="en-US" dirty="0"/>
+              <a:t>	-&gt; Doctorow’s ‘</a:t>
+            </a:r>
+            <a:r>
+              <a:rPr lang="en-US" dirty="0" err="1"/>
+              <a:t>enshittification</a:t>
+            </a:r>
+            <a:r>
+              <a:rPr lang="en-US" dirty="0"/>
+              <a:t>’!</a:t>
+            </a:r>
+          </a:p>
+          <a:p>
+            <a:endParaRPr lang="en-US" dirty="0"/>
+          </a:p>
+          <a:p>
+            <a:r>
+              <a:rPr lang="en-US" dirty="0"/>
+              <a:t>Are your bosses OK with an inferior product? Then yeah, your job is threatened, even if the LLM does an obviously worse job than you! It’s cheaper than you!</a:t>
+            </a:r>
+          </a:p>
+          <a:p>
+            <a:endParaRPr lang="en-US" dirty="0"/>
+          </a:p>
+          <a:p>
+            <a:endParaRPr lang="en-US" dirty="0"/>
+          </a:p>
+          <a:p>
+            <a:endParaRPr lang="en-US" dirty="0"/>
+          </a:p>
+        </p:txBody>
+      </p:sp>
+      <p:sp>
+        <p:nvSpPr>
+          <p:cNvPr id="12" name="Text Placeholder 11">
+            <a:extLst>
+              <a:ext uri="{FF2B5EF4-FFF2-40B4-BE49-F238E27FC236}">
+                <a16:creationId xmlns:a16="http://schemas.microsoft.com/office/drawing/2014/main" id="{EF66C240-066A-6114-6051-A52BBF168323}"/>
+              </a:ext>
+            </a:extLst>
+          </p:cNvPr>
+          <p:cNvSpPr>
+            <a:spLocks noGrp="1"/>
+          </p:cNvSpPr>
+          <p:nvPr>
+            <p:ph type="body" sz="quarter" idx="15"/>
+          </p:nvPr>
+        </p:nvSpPr>
+        <p:spPr>
+          <a:xfrm>
+            <a:off x="550862" y="557213"/>
+            <a:ext cx="8314841" cy="1431925"/>
+          </a:xfrm>
+        </p:spPr>
+        <p:txBody>
+          <a:bodyPr/>
+          <a:lstStyle/>
+          <a:p>
+            <a:r>
+              <a:rPr lang="en-US" dirty="0"/>
+              <a:t>Will GPTs/LLMS PUT you out of a job?</a:t>
+            </a:r>
+          </a:p>
+        </p:txBody>
+      </p:sp>
+      <p:sp>
+        <p:nvSpPr>
+          <p:cNvPr id="2" name="Text Placeholder 1">
+            <a:extLst>
+              <a:ext uri="{FF2B5EF4-FFF2-40B4-BE49-F238E27FC236}">
+                <a16:creationId xmlns:a16="http://schemas.microsoft.com/office/drawing/2014/main" id="{A448208C-36BB-17A4-B457-0913C261F865}"/>
+              </a:ext>
+            </a:extLst>
+          </p:cNvPr>
+          <p:cNvSpPr>
+            <a:spLocks noGrp="1"/>
+          </p:cNvSpPr>
+          <p:nvPr>
+            <p:ph type="body" sz="quarter" idx="18"/>
+          </p:nvPr>
+        </p:nvSpPr>
+        <p:spPr/>
+        <p:txBody>
+          <a:bodyPr/>
+          <a:lstStyle/>
+          <a:p>
+            <a:r>
+              <a:rPr lang="en-US" dirty="0"/>
+              <a:t>I don’t know, maybe???</a:t>
+            </a:r>
+          </a:p>
+        </p:txBody>
+      </p:sp>
+      <p:sp>
+        <p:nvSpPr>
+          <p:cNvPr id="4" name="Text Placeholder 3">
+            <a:extLst>
+              <a:ext uri="{FF2B5EF4-FFF2-40B4-BE49-F238E27FC236}">
+                <a16:creationId xmlns:a16="http://schemas.microsoft.com/office/drawing/2014/main" id="{0758297B-DBEE-77FB-D44E-24DF4EBDA1CC}"/>
+              </a:ext>
+            </a:extLst>
+          </p:cNvPr>
+          <p:cNvSpPr>
+            <a:spLocks noGrp="1"/>
+          </p:cNvSpPr>
+          <p:nvPr>
+            <p:ph type="body" sz="quarter" idx="19"/>
+          </p:nvPr>
+        </p:nvSpPr>
+        <p:spPr/>
+        <p:txBody>
+          <a:bodyPr/>
+          <a:lstStyle/>
+          <a:p>
+            <a:r>
+              <a:rPr lang="en-US" dirty="0"/>
+              <a:t>OceanOmics</a:t>
+            </a:r>
+          </a:p>
+        </p:txBody>
+      </p:sp>
+      <p:sp>
+        <p:nvSpPr>
+          <p:cNvPr id="3" name="Footer Placeholder 2">
+            <a:extLst>
+              <a:ext uri="{FF2B5EF4-FFF2-40B4-BE49-F238E27FC236}">
+                <a16:creationId xmlns:a16="http://schemas.microsoft.com/office/drawing/2014/main" id="{D3B2DAC0-8F08-7376-11CC-10386AEADBD5}"/>
+              </a:ext>
+            </a:extLst>
+          </p:cNvPr>
+          <p:cNvSpPr>
+            <a:spLocks noGrp="1"/>
+          </p:cNvSpPr>
+          <p:nvPr>
+            <p:ph type="ftr" sz="quarter" idx="3"/>
+          </p:nvPr>
+        </p:nvSpPr>
+        <p:spPr/>
+        <p:txBody>
+          <a:bodyPr/>
+          <a:lstStyle/>
+          <a:p>
+            <a:endParaRPr lang="en-US" dirty="0"/>
+          </a:p>
+        </p:txBody>
+      </p:sp>
+    </p:spTree>
+    <p:extLst>
+      <p:ext uri="{BB962C8B-B14F-4D97-AF65-F5344CB8AC3E}">
+        <p14:creationId xmlns:p14="http://schemas.microsoft.com/office/powerpoint/2010/main" val="2968494867"/>
+      </p:ext>
+    </p:extLst>
+  </p:cSld>
+  <p:clrMapOvr>
+    <a:masterClrMapping/>
+  </p:clrMapOvr>
+  <p:timing>
+    <p:tnLst>
+      <p:par>
+        <p:cTn id="1" dur="indefinite" restart="never" nodeType="tmRoot">
+          <p:childTnLst>
+            <p:seq concurrent="1" nextAc="seek">
+              <p:cTn id="2" dur="indefinite" nodeType="mainSeq">
+                <p:childTnLst>
+                  <p:par>
+                    <p:cTn id="3" fill="hold">
+                      <p:stCondLst>
+                        <p:cond delay="indefinite"/>
+                      </p:stCondLst>
+                      <p:childTnLst>
+                        <p:par>
+                          <p:cTn id="4" fill="hold">
+                            <p:stCondLst>
+                              <p:cond delay="0"/>
+                            </p:stCondLst>
+                            <p:childTnLst>
+                              <p:par>
+                                <p:cTn id="5" presetID="1" presetClass="entr" presetSubtype="0" fill="hold" grpId="0" nodeType="clickEffect">
+                                  <p:stCondLst>
+                                    <p:cond delay="0"/>
+                                  </p:stCondLst>
+                                  <p:childTnLst>
+                                    <p:set>
+                                      <p:cBhvr>
+                                        <p:cTn id="6" dur="1" fill="hold">
+                                          <p:stCondLst>
+                                            <p:cond delay="0"/>
+                                          </p:stCondLst>
+                                        </p:cTn>
+                                        <p:tgtEl>
+                                          <p:spTgt spid="2">
+                                            <p:txEl>
+                                              <p:pRg st="0" end="0"/>
+                                            </p:txEl>
+                                          </p:spTgt>
+                                        </p:tgtEl>
+                                        <p:attrNameLst>
+                                          <p:attrName>style.visibility</p:attrName>
+                                        </p:attrNameLst>
+                                      </p:cBhvr>
+                                      <p:to>
+                                        <p:strVal val="visible"/>
+                                      </p:to>
+                                    </p:set>
+                                  </p:childTnLst>
+                                </p:cTn>
+                              </p:par>
+                            </p:childTnLst>
+                          </p:cTn>
+                        </p:par>
+                      </p:childTnLst>
+                    </p:cTn>
+                  </p:par>
+                  <p:par>
+                    <p:cTn id="7" fill="hold">
+                      <p:stCondLst>
+                        <p:cond delay="indefinite"/>
+                      </p:stCondLst>
+                      <p:childTnLst>
+                        <p:par>
+                          <p:cTn id="8" fill="hold">
+                            <p:stCondLst>
+                              <p:cond delay="0"/>
+                            </p:stCondLst>
+                            <p:childTnLst>
+                              <p:par>
+                                <p:cTn id="9" presetID="1" presetClass="entr" presetSubtype="0" fill="hold" grpId="0" nodeType="clickEffect">
+                                  <p:stCondLst>
+                                    <p:cond delay="0"/>
+                                  </p:stCondLst>
+                                  <p:childTnLst>
+                                    <p:set>
+                                      <p:cBhvr>
+                                        <p:cTn id="10" dur="1" fill="hold">
+                                          <p:stCondLst>
+                                            <p:cond delay="0"/>
+                                          </p:stCondLst>
+                                        </p:cTn>
+                                        <p:tgtEl>
+                                          <p:spTgt spid="8">
+                                            <p:txEl>
+                                              <p:pRg st="0" end="0"/>
+                                            </p:txEl>
+                                          </p:spTgt>
+                                        </p:tgtEl>
+                                        <p:attrNameLst>
+                                          <p:attrName>style.visibility</p:attrName>
+                                        </p:attrNameLst>
+                                      </p:cBhvr>
+                                      <p:to>
+                                        <p:strVal val="visible"/>
+                                      </p:to>
+                                    </p:set>
+                                  </p:childTnLst>
+                                </p:cTn>
+                              </p:par>
+                            </p:childTnLst>
+                          </p:cTn>
+                        </p:par>
+                      </p:childTnLst>
+                    </p:cTn>
+                  </p:par>
+                  <p:par>
+                    <p:cTn id="11" fill="hold">
+                      <p:stCondLst>
+                        <p:cond delay="indefinite"/>
+                      </p:stCondLst>
+                      <p:childTnLst>
+                        <p:par>
+                          <p:cTn id="12" fill="hold">
+                            <p:stCondLst>
+                              <p:cond delay="0"/>
+                            </p:stCondLst>
+                            <p:childTnLst>
+                              <p:par>
+                                <p:cTn id="13" presetID="1" presetClass="entr" presetSubtype="0" fill="hold" grpId="0" nodeType="clickEffect">
+                                  <p:stCondLst>
+                                    <p:cond delay="0"/>
+                                  </p:stCondLst>
+                                  <p:childTnLst>
+                                    <p:set>
+                                      <p:cBhvr>
+                                        <p:cTn id="14" dur="1" fill="hold">
+                                          <p:stCondLst>
+                                            <p:cond delay="0"/>
+                                          </p:stCondLst>
+                                        </p:cTn>
+                                        <p:tgtEl>
+                                          <p:spTgt spid="8">
+                                            <p:txEl>
+                                              <p:pRg st="1" end="1"/>
+                                            </p:txEl>
+                                          </p:spTgt>
+                                        </p:tgtEl>
+                                        <p:attrNameLst>
+                                          <p:attrName>style.visibility</p:attrName>
+                                        </p:attrNameLst>
+                                      </p:cBhvr>
+                                      <p:to>
+                                        <p:strVal val="visible"/>
+                                      </p:to>
+                                    </p:set>
+                                  </p:childTnLst>
+                                </p:cTn>
+                              </p:par>
+                            </p:childTnLst>
+                          </p:cTn>
+                        </p:par>
+                      </p:childTnLst>
+                    </p:cTn>
+                  </p:par>
+                  <p:par>
+                    <p:cTn id="15" fill="hold">
+                      <p:stCondLst>
+                        <p:cond delay="indefinite"/>
+                      </p:stCondLst>
+                      <p:childTnLst>
+                        <p:par>
+                          <p:cTn id="16" fill="hold">
+                            <p:stCondLst>
+                              <p:cond delay="0"/>
+                            </p:stCondLst>
+                            <p:childTnLst>
+                              <p:par>
+                                <p:cTn id="17" presetID="1" presetClass="entr" presetSubtype="0" fill="hold" grpId="0" nodeType="clickEffect">
+                                  <p:stCondLst>
+                                    <p:cond delay="0"/>
+                                  </p:stCondLst>
+                                  <p:childTnLst>
+                                    <p:set>
+                                      <p:cBhvr>
+                                        <p:cTn id="18" dur="1" fill="hold">
+                                          <p:stCondLst>
+                                            <p:cond delay="0"/>
+                                          </p:stCondLst>
+                                        </p:cTn>
+                                        <p:tgtEl>
+                                          <p:spTgt spid="8">
+                                            <p:txEl>
+                                              <p:pRg st="3" end="3"/>
+                                            </p:txEl>
+                                          </p:spTgt>
+                                        </p:tgtEl>
+                                        <p:attrNameLst>
+                                          <p:attrName>style.visibility</p:attrName>
+                                        </p:attrNameLst>
+                                      </p:cBhvr>
+                                      <p:to>
+                                        <p:strVal val="visible"/>
+                                      </p:to>
+                                    </p:set>
+                                  </p:childTnLst>
+                                </p:cTn>
+                              </p:par>
+                            </p:childTnLst>
+                          </p:cTn>
+                        </p:par>
+                      </p:childTnLst>
+                    </p:cTn>
+                  </p:par>
+                </p:childTnLst>
+              </p:cTn>
+              <p:prevCondLst>
+                <p:cond evt="onPrev" delay="0">
+                  <p:tgtEl>
+                    <p:sldTgt/>
+                  </p:tgtEl>
+                </p:cond>
+              </p:prevCondLst>
+              <p:nextCondLst>
+                <p:cond evt="onNext" delay="0">
+                  <p:tgtEl>
+                    <p:sldTgt/>
+                  </p:tgtEl>
+                </p:cond>
+              </p:nextCondLst>
+            </p:seq>
+          </p:childTnLst>
+        </p:cTn>
+      </p:par>
+    </p:tnLst>
+    <p:bldLst>
+      <p:bldP spid="8" grpId="0" build="p"/>
+      <p:bldP spid="2" grpId="0" build="p"/>
+    </p:bldLst>
+  </p:timing>
+</p:sld>
+</file>
+
 <file path=ppt/slides/slide27.xml><?xml version="1.0" encoding="utf-8"?>
 <p:sld xmlns:a="http://schemas.openxmlformats.org/drawingml/2006/main" xmlns:r="http://schemas.openxmlformats.org/officeDocument/2006/relationships" xmlns:p="http://schemas.openxmlformats.org/presentationml/2006/main">
   <p:cSld>
@@ -35354,32 +36278,11 @@
             </a:r>
             <a:r>
               <a:rPr lang="en-US" dirty="0"/>
-              <a:t>. YMMV. Take gigabytes of free-form text, chunk into pieces, send to </a:t>
-            </a:r>
-            <a:r>
-              <a:rPr lang="en-US" dirty="0" err="1"/>
-              <a:t>ChatGPT</a:t>
-            </a:r>
-            <a:r>
-              <a:rPr lang="en-US" dirty="0"/>
-              <a:t> with prompt, get JSON structure back. We’re drowning in piles of unstructured </a:t>
-            </a:r>
-            <a:r>
-              <a:rPr lang="en-US" b="1" dirty="0"/>
-              <a:t>valuable</a:t>
-            </a:r>
-            <a:r>
-              <a:rPr lang="en-US" dirty="0"/>
-              <a:t> data nobody can evaluate at scale. (-&gt; earlier </a:t>
-            </a:r>
-            <a:r>
-              <a:rPr lang="en-US" dirty="0" err="1"/>
-              <a:t>Braggoscope</a:t>
-            </a:r>
-            <a:r>
-              <a:rPr lang="en-US" dirty="0"/>
-              <a:t> example!)</a:t>
-            </a:r>
+              <a:t>.</a:t>
+            </a:r>
+          </a:p>
+          <a:p>
+            <a:endParaRPr lang="en-US" dirty="0"/>
           </a:p>
           <a:p>
             <a:r>
@@ -35397,15 +36300,6 @@
                 <a:sym typeface="Wingdings" panose="05000000000000000000" pitchFamily="2" charset="2"/>
               </a:rPr>
             </a:br>
-            <a:r>
-              <a:rPr lang="en-US" dirty="0">
-                <a:sym typeface="Wingdings" panose="05000000000000000000" pitchFamily="2" charset="2"/>
-              </a:rPr>
-              <a:t>Not enough doom. Good, because boring progress. I don’t see any AGI.</a:t>
-            </a:r>
-            <a:endParaRPr lang="en-US" dirty="0"/>
-          </a:p>
-          <a:p>
             <a:endParaRPr lang="en-US" dirty="0"/>
           </a:p>
           <a:p>
@@ -35643,7 +36537,7 @@
                                         <p:tgtEl>
                                           <p:spTgt spid="8">
                                             <p:txEl>
-                                              <p:pRg st="3" end="3"/>
+                                              <p:pRg st="4" end="4"/>
                                             </p:txEl>
                                           </p:spTgt>
                                         </p:tgtEl>
@@ -36027,6 +36921,87 @@
       </p:grpSpPr>
       <p:sp>
         <p:nvSpPr>
+          <p:cNvPr id="8" name="Text Placeholder 7">
+            <a:extLst>
+              <a:ext uri="{FF2B5EF4-FFF2-40B4-BE49-F238E27FC236}">
+                <a16:creationId xmlns:a16="http://schemas.microsoft.com/office/drawing/2014/main" id="{11B93F59-E86F-BB9B-E9F0-9F9F97DAAF6D}"/>
+              </a:ext>
+            </a:extLst>
+          </p:cNvPr>
+          <p:cNvSpPr>
+            <a:spLocks noGrp="1"/>
+          </p:cNvSpPr>
+          <p:nvPr>
+            <p:ph type="body" sz="quarter" idx="14"/>
+          </p:nvPr>
+        </p:nvSpPr>
+        <p:spPr>
+          <a:xfrm>
+            <a:off x="550862" y="2199122"/>
+            <a:ext cx="10948712" cy="2606792"/>
+          </a:xfrm>
+        </p:spPr>
+        <p:txBody>
+          <a:bodyPr/>
+          <a:lstStyle/>
+          <a:p>
+            <a:endParaRPr lang="en-US" dirty="0"/>
+          </a:p>
+          <a:p>
+            <a:endParaRPr lang="en-US" dirty="0"/>
+          </a:p>
+        </p:txBody>
+      </p:sp>
+      <p:sp>
+        <p:nvSpPr>
+          <p:cNvPr id="12" name="Text Placeholder 11">
+            <a:extLst>
+              <a:ext uri="{FF2B5EF4-FFF2-40B4-BE49-F238E27FC236}">
+                <a16:creationId xmlns:a16="http://schemas.microsoft.com/office/drawing/2014/main" id="{EF66C240-066A-6114-6051-A52BBF168323}"/>
+              </a:ext>
+            </a:extLst>
+          </p:cNvPr>
+          <p:cNvSpPr>
+            <a:spLocks noGrp="1"/>
+          </p:cNvSpPr>
+          <p:nvPr>
+            <p:ph type="body" sz="quarter" idx="15"/>
+          </p:nvPr>
+        </p:nvSpPr>
+        <p:spPr>
+          <a:xfrm>
+            <a:off x="550862" y="557213"/>
+            <a:ext cx="10153581" cy="1431925"/>
+          </a:xfrm>
+        </p:spPr>
+        <p:txBody>
+          <a:bodyPr/>
+          <a:lstStyle/>
+          <a:p>
+            <a:r>
+              <a:rPr lang="en-US" dirty="0"/>
+              <a:t>Closing words: </a:t>
+            </a:r>
+            <a:br>
+              <a:rPr lang="en-US" dirty="0"/>
+            </a:br>
+            <a:r>
+              <a:rPr lang="en-US" dirty="0"/>
+              <a:t>YOU </a:t>
+            </a:r>
+            <a:r>
+              <a:rPr lang="en-US" dirty="0" err="1"/>
+              <a:t>DON’t</a:t>
+            </a:r>
+            <a:r>
+              <a:rPr lang="en-US" dirty="0"/>
+              <a:t> HAVE TO BUILD THE TORMENT NEXUS</a:t>
+            </a:r>
+          </a:p>
+        </p:txBody>
+      </p:sp>
+      <p:sp>
+        <p:nvSpPr>
           <p:cNvPr id="4" name="Text Placeholder 3">
             <a:extLst>
               <a:ext uri="{FF2B5EF4-FFF2-40B4-BE49-F238E27FC236}">
@@ -36080,43 +37055,55 @@
       </p:sp>
       <p:pic>
         <p:nvPicPr>
-          <p:cNvPr id="9" name="Picture 8">
-            <a:extLst>
-              <a:ext uri="{FF2B5EF4-FFF2-40B4-BE49-F238E27FC236}">
-                <a16:creationId xmlns:a16="http://schemas.microsoft.com/office/drawing/2014/main" id="{A60884CA-629C-2D99-A10E-2FBFCA9B768D}"/>
+          <p:cNvPr id="1026" name="Picture 2" descr="Alex Blechman @AlexBlechman Sci-Fi Author: In my book I invented the Torment Nexus as a cautionary tale Tech Company: At long last, we have created the Torment Nexus from classic sci-fi novel Don't Create The Torment Nexus 5:49 PM Nov 8, 2021. Twitter Web App">
+            <a:extLst>
+              <a:ext uri="{FF2B5EF4-FFF2-40B4-BE49-F238E27FC236}">
+                <a16:creationId xmlns:a16="http://schemas.microsoft.com/office/drawing/2014/main" id="{8AD83AEF-D79C-31B4-42BC-95521827571C}"/>
               </a:ext>
             </a:extLst>
           </p:cNvPr>
           <p:cNvPicPr>
-            <a:picLocks noChangeAspect="1"/>
+            <a:picLocks noChangeAspect="1" noChangeArrowheads="1"/>
           </p:cNvPicPr>
           <p:nvPr/>
         </p:nvPicPr>
-        <p:blipFill rotWithShape="1">
-          <a:blip r:embed="rId2" cstate="hqprint">
+        <p:blipFill>
+          <a:blip r:embed="rId3">
             <a:extLst>
               <a:ext uri="{28A0092B-C50C-407E-A947-70E740481C1C}">
                 <a14:useLocalDpi xmlns:a14="http://schemas.microsoft.com/office/drawing/2010/main"/>
               </a:ext>
             </a:extLst>
           </a:blip>
-          <a:srcRect l="-765"/>
-          <a:stretch/>
+          <a:srcRect/>
+          <a:stretch>
+            <a:fillRect/>
+          </a:stretch>
         </p:blipFill>
-        <p:spPr>
+        <p:spPr bwMode="auto">
           <a:xfrm>
-            <a:off x="1958457" y="487679"/>
-            <a:ext cx="8275085" cy="5385598"/>
+            <a:off x="3189767" y="1998922"/>
+            <a:ext cx="5443869" cy="3962816"/>
           </a:xfrm>
           <a:prstGeom prst="rect">
             <a:avLst/>
           </a:prstGeom>
+          <a:noFill/>
+          <a:extLst>
+            <a:ext uri="{909E8E84-426E-40DD-AFC4-6F175D3DCCD1}">
+              <a14:hiddenFill xmlns:a14="http://schemas.microsoft.com/office/drawing/2010/main">
+                <a:solidFill>
+                  <a:srgbClr val="FFFFFF"/>
+                </a:solidFill>
+              </a14:hiddenFill>
+            </a:ext>
+          </a:extLst>
         </p:spPr>
       </p:pic>
     </p:spTree>
     <p:extLst>
       <p:ext uri="{BB962C8B-B14F-4D97-AF65-F5344CB8AC3E}">
-        <p14:creationId xmlns:p14="http://schemas.microsoft.com/office/powerpoint/2010/main" val="1172856531"/>
+        <p14:creationId xmlns:p14="http://schemas.microsoft.com/office/powerpoint/2010/main" val="3984467307"/>
       </p:ext>
     </p:extLst>
   </p:cSld>
@@ -36129,6 +37116,14 @@
 <file path=ppt/slides/slide3.xml><?xml version="1.0" encoding="utf-8"?>
 <p:sld xmlns:a="http://schemas.openxmlformats.org/drawingml/2006/main" xmlns:r="http://schemas.openxmlformats.org/officeDocument/2006/relationships" xmlns:p="http://schemas.openxmlformats.org/presentationml/2006/main">
   <p:cSld>
+    <p:bg>
+      <p:bgPr>
+        <a:solidFill>
+          <a:schemeClr val="bg1"/>
+        </a:solidFill>
+        <a:effectLst/>
+      </p:bgPr>
+    </p:bg>
     <p:spTree>
       <p:nvGrpSpPr>
         <p:cNvPr id="1" name=""/>
@@ -37680,6 +38675,124 @@
       </p:grpSpPr>
       <p:sp>
         <p:nvSpPr>
+          <p:cNvPr id="4" name="Text Placeholder 3">
+            <a:extLst>
+              <a:ext uri="{FF2B5EF4-FFF2-40B4-BE49-F238E27FC236}">
+                <a16:creationId xmlns:a16="http://schemas.microsoft.com/office/drawing/2014/main" id="{0758297B-DBEE-77FB-D44E-24DF4EBDA1CC}"/>
+              </a:ext>
+            </a:extLst>
+          </p:cNvPr>
+          <p:cNvSpPr>
+            <a:spLocks noGrp="1"/>
+          </p:cNvSpPr>
+          <p:nvPr>
+            <p:ph type="body" sz="quarter" idx="19"/>
+          </p:nvPr>
+        </p:nvSpPr>
+        <p:spPr/>
+        <p:txBody>
+          <a:bodyPr/>
+          <a:lstStyle/>
+          <a:p>
+            <a:r>
+              <a:rPr lang="en-US" dirty="0"/>
+              <a:t>OceanOmics</a:t>
+            </a:r>
+          </a:p>
+        </p:txBody>
+      </p:sp>
+      <p:sp>
+        <p:nvSpPr>
+          <p:cNvPr id="3" name="Footer Placeholder 2">
+            <a:extLst>
+              <a:ext uri="{FF2B5EF4-FFF2-40B4-BE49-F238E27FC236}">
+                <a16:creationId xmlns:a16="http://schemas.microsoft.com/office/drawing/2014/main" id="{D3B2DAC0-8F08-7376-11CC-10386AEADBD5}"/>
+              </a:ext>
+            </a:extLst>
+          </p:cNvPr>
+          <p:cNvSpPr>
+            <a:spLocks noGrp="1"/>
+          </p:cNvSpPr>
+          <p:nvPr>
+            <p:ph type="ftr" sz="quarter" idx="3"/>
+          </p:nvPr>
+        </p:nvSpPr>
+        <p:spPr/>
+        <p:txBody>
+          <a:bodyPr/>
+          <a:lstStyle/>
+          <a:p>
+            <a:endParaRPr lang="en-US" dirty="0"/>
+          </a:p>
+        </p:txBody>
+      </p:sp>
+      <p:pic>
+        <p:nvPicPr>
+          <p:cNvPr id="9" name="Picture 8">
+            <a:extLst>
+              <a:ext uri="{FF2B5EF4-FFF2-40B4-BE49-F238E27FC236}">
+                <a16:creationId xmlns:a16="http://schemas.microsoft.com/office/drawing/2014/main" id="{A60884CA-629C-2D99-A10E-2FBFCA9B768D}"/>
+              </a:ext>
+            </a:extLst>
+          </p:cNvPr>
+          <p:cNvPicPr>
+            <a:picLocks noChangeAspect="1"/>
+          </p:cNvPicPr>
+          <p:nvPr/>
+        </p:nvPicPr>
+        <p:blipFill rotWithShape="1">
+          <a:blip r:embed="rId3" cstate="hqprint">
+            <a:extLst>
+              <a:ext uri="{28A0092B-C50C-407E-A947-70E740481C1C}">
+                <a14:useLocalDpi xmlns:a14="http://schemas.microsoft.com/office/drawing/2010/main"/>
+              </a:ext>
+            </a:extLst>
+          </a:blip>
+          <a:srcRect l="-765"/>
+          <a:stretch/>
+        </p:blipFill>
+        <p:spPr>
+          <a:xfrm>
+            <a:off x="1958457" y="487679"/>
+            <a:ext cx="8275085" cy="5385598"/>
+          </a:xfrm>
+          <a:prstGeom prst="rect">
+            <a:avLst/>
+          </a:prstGeom>
+        </p:spPr>
+      </p:pic>
+    </p:spTree>
+    <p:extLst>
+      <p:ext uri="{BB962C8B-B14F-4D97-AF65-F5344CB8AC3E}">
+        <p14:creationId xmlns:p14="http://schemas.microsoft.com/office/powerpoint/2010/main" val="1172856531"/>
+      </p:ext>
+    </p:extLst>
+  </p:cSld>
+  <p:clrMapOvr>
+    <a:masterClrMapping/>
+  </p:clrMapOvr>
+</p:sld>
+</file>
+
+<file path=ppt/slides/slide31.xml><?xml version="1.0" encoding="utf-8"?>
+<p:sld xmlns:a="http://schemas.openxmlformats.org/drawingml/2006/main" xmlns:r="http://schemas.openxmlformats.org/officeDocument/2006/relationships" xmlns:p="http://schemas.openxmlformats.org/presentationml/2006/main">
+  <p:cSld>
+    <p:spTree>
+      <p:nvGrpSpPr>
+        <p:cNvPr id="1" name=""/>
+        <p:cNvGrpSpPr/>
+        <p:nvPr/>
+      </p:nvGrpSpPr>
+      <p:grpSpPr>
+        <a:xfrm>
+          <a:off x="0" y="0"/>
+          <a:ext cx="0" cy="0"/>
+          <a:chOff x="0" y="0"/>
+          <a:chExt cx="0" cy="0"/>
+        </a:xfrm>
+      </p:grpSpPr>
+      <p:sp>
+        <p:nvSpPr>
           <p:cNvPr id="3" name="Text Placeholder 2">
             <a:extLst>
               <a:ext uri="{FF2B5EF4-FFF2-40B4-BE49-F238E27FC236}">
@@ -37886,9 +38999,28 @@
           <a:bodyPr/>
           <a:lstStyle/>
           <a:p>
+            <a:pPr marL="457200" indent="-457200">
+              <a:buClr>
+                <a:schemeClr val="tx1"/>
+              </a:buClr>
+              <a:buFont typeface="Arial" panose="020B0604020202020204" pitchFamily="34" charset="0"/>
+              <a:buChar char="•"/>
+            </a:pPr>
             <a:r>
               <a:rPr lang="en-US" dirty="0"/>
-              <a:t>OceanOmics: we sequence DNA in sea water samples ‘left’ by fish. The goal: a scalable method to observer which fish species live where, ultimately which fish </a:t>
+              <a:t>We sequence DNA in sea water samples ‘left’ by fish. The </a:t>
+            </a:r>
+            <a:r>
+              <a:rPr lang="en-US" b="1" dirty="0">
+                <a:solidFill>
+                  <a:schemeClr val="accent1"/>
+                </a:solidFill>
+              </a:rPr>
+              <a:t>goal</a:t>
+            </a:r>
+            <a:r>
+              <a:rPr lang="en-US" dirty="0"/>
+              <a:t>: a scalable method to observer which fish species live where, ultimately which fish </a:t>
             </a:r>
             <a:r>
               <a:rPr lang="en-US" i="1" dirty="0"/>
@@ -37900,21 +39032,69 @@
             </a:r>
           </a:p>
           <a:p>
+            <a:pPr>
+              <a:buClr>
+                <a:schemeClr val="tx1"/>
+              </a:buClr>
+            </a:pPr>
             <a:endParaRPr lang="en-US" i="1" dirty="0"/>
           </a:p>
           <a:p>
+            <a:pPr marL="457200" indent="-457200">
+              <a:buClr>
+                <a:schemeClr val="tx1"/>
+              </a:buClr>
+              <a:buFont typeface="Arial" panose="020B0604020202020204" pitchFamily="34" charset="0"/>
+              <a:buChar char="•"/>
+            </a:pPr>
             <a:r>
               <a:rPr lang="en-US" dirty="0"/>
-              <a:t>The ultimate purpose: by knowing which species live where, we can have a voice in how marine protected areas are established by governments.</a:t>
-            </a:r>
-          </a:p>
-          <a:p>
+              <a:t>The ultimate </a:t>
+            </a:r>
+            <a:r>
+              <a:rPr lang="en-US" b="1" dirty="0">
+                <a:solidFill>
+                  <a:schemeClr val="accent1"/>
+                </a:solidFill>
+              </a:rPr>
+              <a:t>purpose</a:t>
+            </a:r>
+            <a:r>
+              <a:rPr lang="en-US" dirty="0"/>
+              <a:t>: by knowing which species live where, we can have a voice in how marine protected areas are established by governments.</a:t>
+            </a:r>
+          </a:p>
+          <a:p>
+            <a:pPr>
+              <a:buClr>
+                <a:schemeClr val="tx1"/>
+              </a:buClr>
+            </a:pPr>
             <a:endParaRPr lang="en-US" dirty="0"/>
           </a:p>
           <a:p>
+            <a:pPr marL="457200" indent="-457200">
+              <a:buClr>
+                <a:schemeClr val="tx1"/>
+              </a:buClr>
+              <a:buFont typeface="Arial" panose="020B0604020202020204" pitchFamily="34" charset="0"/>
+              <a:buChar char="•"/>
+            </a:pPr>
             <a:r>
               <a:rPr lang="en-US" dirty="0"/>
-              <a:t>Needle in a haystack problem, only little fish DNA in the sample (&gt;99% bacterial/viral); only few fish genomes are sequenced (3-4%)</a:t>
+              <a:t>Needle in a haystack </a:t>
+            </a:r>
+            <a:r>
+              <a:rPr lang="en-US" b="1" dirty="0">
+                <a:solidFill>
+                  <a:schemeClr val="accent1"/>
+                </a:solidFill>
+              </a:rPr>
+              <a:t>problem</a:t>
+            </a:r>
+            <a:r>
+              <a:rPr lang="en-US" dirty="0"/>
+              <a:t>, only little fish DNA in the sample (&gt;99% bacterial/viral); only few fish genomes are sequenced (3-4%)</a:t>
             </a:r>
           </a:p>
           <a:p>
@@ -38236,6 +39416,13 @@
           <a:bodyPr/>
           <a:lstStyle/>
           <a:p>
+            <a:pPr marL="457200" indent="-457200">
+              <a:buClr>
+                <a:schemeClr val="tx1"/>
+              </a:buClr>
+              <a:buFont typeface="Arial" panose="020B0604020202020204" pitchFamily="34" charset="0"/>
+              <a:buChar char="•"/>
+            </a:pPr>
             <a:r>
               <a:rPr lang="en-US" dirty="0"/>
               <a:t>One project I started is using LLMs/GPTs</a:t>
@@ -38250,9 +39437,23 @@
             </a:r>
           </a:p>
           <a:p>
+            <a:pPr marL="457200" indent="-457200">
+              <a:buClr>
+                <a:schemeClr val="tx1"/>
+              </a:buClr>
+              <a:buFont typeface="Arial" panose="020B0604020202020204" pitchFamily="34" charset="0"/>
+              <a:buChar char="•"/>
+            </a:pPr>
             <a:endParaRPr lang="en-US" i="1" dirty="0"/>
           </a:p>
           <a:p>
+            <a:pPr marL="457200" indent="-457200">
+              <a:buClr>
+                <a:schemeClr val="tx1"/>
+              </a:buClr>
+              <a:buFont typeface="Arial" panose="020B0604020202020204" pitchFamily="34" charset="0"/>
+              <a:buChar char="•"/>
+            </a:pPr>
             <a:r>
               <a:rPr lang="en-US" dirty="0"/>
               <a:t>We generate large amounts of DNA data and DNA-based fish sightings data. </a:t>
@@ -38266,9 +39467,23 @@
             </a:r>
           </a:p>
           <a:p>
+            <a:pPr marL="457200" indent="-457200">
+              <a:buClr>
+                <a:schemeClr val="tx1"/>
+              </a:buClr>
+              <a:buFont typeface="Arial" panose="020B0604020202020204" pitchFamily="34" charset="0"/>
+              <a:buChar char="•"/>
+            </a:pPr>
             <a:endParaRPr lang="en-US" dirty="0"/>
           </a:p>
           <a:p>
+            <a:pPr marL="457200" indent="-457200">
+              <a:buClr>
+                <a:schemeClr val="tx1"/>
+              </a:buClr>
+              <a:buFont typeface="Arial" panose="020B0604020202020204" pitchFamily="34" charset="0"/>
+              <a:buChar char="•"/>
+            </a:pPr>
             <a:r>
               <a:rPr lang="en-US" dirty="0"/>
               <a:t>But: what if we could use </a:t>
@@ -39028,7 +40243,7 @@
             </a:r>
             <a:r>
               <a:rPr lang="en-US" dirty="0"/>
-              <a:t>details wrong, but not overall story.	</a:t>
+              <a:t>details wrong, but not overall story.</a:t>
             </a:r>
           </a:p>
           <a:p>
@@ -39037,7 +40252,7 @@
             </a:br>
             <a:r>
               <a:rPr lang="en-US" dirty="0"/>
-              <a:t>Don’t have example screenshots, but the text often read something like:</a:t>
+              <a:t>The text would often read something like:</a:t>
             </a:r>
           </a:p>
           <a:p>
@@ -39046,7 +40261,19 @@
           <a:p>
             <a:r>
               <a:rPr lang="en-US" i="1" dirty="0"/>
-              <a:t>Fish X is within the family Y (correct). It is a schooling fish living in large schools of up to 1000 fish (correct). It is a strict herbivore (INCORRECT). It has complex social structures (correct).</a:t>
+              <a:t>Fish X is within the family Y (correct) living in large schools of up to 1000 fish (correct). It is a strict herbivore (</a:t>
+            </a:r>
+            <a:r>
+              <a:rPr lang="en-US" b="1" dirty="0">
+                <a:solidFill>
+                  <a:schemeClr val="accent1"/>
+                </a:solidFill>
+              </a:rPr>
+              <a:t>INCORRECT</a:t>
+            </a:r>
+            <a:r>
+              <a:rPr lang="en-US" i="1" dirty="0"/>
+              <a:t>). It has complex social structures (correct).</a:t>
             </a:r>
           </a:p>
         </p:txBody>
@@ -40928,6 +42155,96 @@
 </file>
 
 <file path=customXml/item2.xml><?xml version="1.0" encoding="utf-8"?>
+<?mso-contentType ?>
+<FormTemplates xmlns="http://schemas.microsoft.com/sharepoint/v3/contenttype/forms">
+  <Display>DocumentLibraryForm</Display>
+  <Edit>DocumentLibraryForm</Edit>
+  <New>DocumentLibraryForm</New>
+</FormTemplates>
+</file>
+
+<file path=customXml/item3.xml><?xml version="1.0" encoding="utf-8"?>
+<?mso-contentType ?>
+<spe:Receivers xmlns:spe="http://schemas.microsoft.com/sharepoint/events">
+  <Receiver>
+    <Name>Document ID Generator</Name>
+    <Synchronization>Synchronous</Synchronization>
+    <Type>10001</Type>
+    <SequenceNumber>1000</SequenceNumber>
+    <Url/>
+    <Assembly>Microsoft.Office.DocumentManagement, Version=16.0.0.0, Culture=neutral, PublicKeyToken=71e9bce111e9429c</Assembly>
+    <Class>Microsoft.Office.DocumentManagement.Internal.DocIdHandler</Class>
+    <Data/>
+    <Filter/>
+  </Receiver>
+  <Receiver>
+    <Name>Document ID Generator</Name>
+    <Synchronization>Synchronous</Synchronization>
+    <Type>10002</Type>
+    <SequenceNumber>1001</SequenceNumber>
+    <Url/>
+    <Assembly>Microsoft.Office.DocumentManagement, Version=16.0.0.0, Culture=neutral, PublicKeyToken=71e9bce111e9429c</Assembly>
+    <Class>Microsoft.Office.DocumentManagement.Internal.DocIdHandler</Class>
+    <Data/>
+    <Filter/>
+  </Receiver>
+  <Receiver>
+    <Name>Document ID Generator</Name>
+    <Synchronization>Synchronous</Synchronization>
+    <Type>10004</Type>
+    <SequenceNumber>1002</SequenceNumber>
+    <Url/>
+    <Assembly>Microsoft.Office.DocumentManagement, Version=16.0.0.0, Culture=neutral, PublicKeyToken=71e9bce111e9429c</Assembly>
+    <Class>Microsoft.Office.DocumentManagement.Internal.DocIdHandler</Class>
+    <Data/>
+    <Filter/>
+  </Receiver>
+  <Receiver>
+    <Name>Document ID Generator</Name>
+    <Synchronization>Synchronous</Synchronization>
+    <Type>10006</Type>
+    <SequenceNumber>1003</SequenceNumber>
+    <Url/>
+    <Assembly>Microsoft.Office.DocumentManagement, Version=16.0.0.0, Culture=neutral, PublicKeyToken=71e9bce111e9429c</Assembly>
+    <Class>Microsoft.Office.DocumentManagement.Internal.DocIdHandler</Class>
+    <Data/>
+    <Filter/>
+  </Receiver>
+</spe:Receivers>
+</file>
+
+<file path=customXml/item4.xml><?xml version="1.0" encoding="utf-8"?>
+<p:properties xmlns:p="http://schemas.microsoft.com/office/2006/metadata/properties" xmlns:xsi="http://www.w3.org/2001/XMLSchema-instance" xmlns:pc="http://schemas.microsoft.com/office/infopath/2007/PartnerControls">
+  <documentManagement>
+    <TaxCatchAll xmlns="f3afbf2d-beef-446a-8758-84a7ca43c063" xsi:nil="true"/>
+    <ExternalReference xmlns="f3afbf2d-beef-446a-8758-84a7ca43c063" xsi:nil="true"/>
+    <ReferenceDate xmlns="f3afbf2d-beef-446a-8758-84a7ca43c063" xsi:nil="true"/>
+    <a56f4471668a4971aa5e522031e743d4 xmlns="f3afbf2d-beef-446a-8758-84a7ca43c063">
+      <Terms xmlns="http://schemas.microsoft.com/office/infopath/2007/PartnerControls"/>
+    </a56f4471668a4971aa5e522031e743d4>
+    <DocumentDescription xmlns="f3afbf2d-beef-446a-8758-84a7ca43c063" xsi:nil="true"/>
+    <c74b6a8103324c29a83f9d5791147f18 xmlns="f3afbf2d-beef-446a-8758-84a7ca43c063">
+      <Terms xmlns="http://schemas.microsoft.com/office/infopath/2007/PartnerControls"/>
+    </c74b6a8103324c29a83f9d5791147f18>
+    <k3db5a6ad8144d86b71ffb3933be1fde xmlns="f3afbf2d-beef-446a-8758-84a7ca43c063">
+      <Terms xmlns="http://schemas.microsoft.com/office/infopath/2007/PartnerControls"/>
+    </k3db5a6ad8144d86b71ffb3933be1fde>
+    <pef3073c00d0478f9309cb7481f1c06f xmlns="f3afbf2d-beef-446a-8758-84a7ca43c063">
+      <Terms xmlns="http://schemas.microsoft.com/office/infopath/2007/PartnerControls"/>
+    </pef3073c00d0478f9309cb7481f1c06f>
+    <bae8dbfb9d2943418f2fcf8e1975c6e3 xmlns="f3afbf2d-beef-446a-8758-84a7ca43c063">
+      <Terms xmlns="http://schemas.microsoft.com/office/infopath/2007/PartnerControls"/>
+    </bae8dbfb9d2943418f2fcf8e1975c6e3>
+    <_dlc_DocId xmlns="9fd4432a-144b-407a-b5c0-3f4ed8389bd1">OOED-1804857394-12544</_dlc_DocId>
+    <_dlc_DocIdUrl xmlns="9fd4432a-144b-407a-b5c0-3f4ed8389bd1">
+      <Url>https://minderoofoundationtrust.sharepoint.com/sites/OOE/oo/_layouts/15/DocIdRedir.aspx?ID=OOED-1804857394-12544</Url>
+      <Description>OOED-1804857394-12544</Description>
+    </_dlc_DocIdUrl>
+  </documentManagement>
+</p:properties>
+</file>
+
+<file path=customXml/item5.xml><?xml version="1.0" encoding="utf-8"?>
 <ct:contentTypeSchema xmlns:ct="http://schemas.microsoft.com/office/2006/metadata/contentType" xmlns:ma="http://schemas.microsoft.com/office/2006/metadata/properties/metaAttributes" ct:_="" ma:_="" ma:contentTypeName="Word Document" ma:contentTypeID="0x01010011BE212375D21747994FD40CFDB2CFA1020027E56D3C45A4904A9A477F7951F07491" ma:contentTypeVersion="0" ma:contentTypeDescription="" ma:contentTypeScope="" ma:versionID="95d6ff7a7bb9ab199f744e617cce672d">
   <xsd:schema xmlns:xsd="http://www.w3.org/2001/XMLSchema" xmlns:xs="http://www.w3.org/2001/XMLSchema" xmlns:p="http://schemas.microsoft.com/office/2006/metadata/properties" xmlns:ns2="f3afbf2d-beef-446a-8758-84a7ca43c063" xmlns:ns3="9fd4432a-144b-407a-b5c0-3f4ed8389bd1" targetNamespace="http://schemas.microsoft.com/office/2006/metadata/properties" ma:root="true" ma:fieldsID="73aa7b01b5becf7177ac312d4322327f" ns2:_="" ns3:_="">
     <xsd:import namespace="f3afbf2d-beef-446a-8758-84a7ca43c063"/>
@@ -41163,96 +42480,6 @@
 </ct:contentTypeSchema>
 </file>
 
-<file path=customXml/item3.xml><?xml version="1.0" encoding="utf-8"?>
-<?mso-contentType ?>
-<FormTemplates xmlns="http://schemas.microsoft.com/sharepoint/v3/contenttype/forms">
-  <Display>DocumentLibraryForm</Display>
-  <Edit>DocumentLibraryForm</Edit>
-  <New>DocumentLibraryForm</New>
-</FormTemplates>
-</file>
-
-<file path=customXml/item4.xml><?xml version="1.0" encoding="utf-8"?>
-<p:properties xmlns:p="http://schemas.microsoft.com/office/2006/metadata/properties" xmlns:xsi="http://www.w3.org/2001/XMLSchema-instance" xmlns:pc="http://schemas.microsoft.com/office/infopath/2007/PartnerControls">
-  <documentManagement>
-    <TaxCatchAll xmlns="f3afbf2d-beef-446a-8758-84a7ca43c063" xsi:nil="true"/>
-    <ExternalReference xmlns="f3afbf2d-beef-446a-8758-84a7ca43c063" xsi:nil="true"/>
-    <ReferenceDate xmlns="f3afbf2d-beef-446a-8758-84a7ca43c063" xsi:nil="true"/>
-    <a56f4471668a4971aa5e522031e743d4 xmlns="f3afbf2d-beef-446a-8758-84a7ca43c063">
-      <Terms xmlns="http://schemas.microsoft.com/office/infopath/2007/PartnerControls"/>
-    </a56f4471668a4971aa5e522031e743d4>
-    <DocumentDescription xmlns="f3afbf2d-beef-446a-8758-84a7ca43c063" xsi:nil="true"/>
-    <c74b6a8103324c29a83f9d5791147f18 xmlns="f3afbf2d-beef-446a-8758-84a7ca43c063">
-      <Terms xmlns="http://schemas.microsoft.com/office/infopath/2007/PartnerControls"/>
-    </c74b6a8103324c29a83f9d5791147f18>
-    <k3db5a6ad8144d86b71ffb3933be1fde xmlns="f3afbf2d-beef-446a-8758-84a7ca43c063">
-      <Terms xmlns="http://schemas.microsoft.com/office/infopath/2007/PartnerControls"/>
-    </k3db5a6ad8144d86b71ffb3933be1fde>
-    <pef3073c00d0478f9309cb7481f1c06f xmlns="f3afbf2d-beef-446a-8758-84a7ca43c063">
-      <Terms xmlns="http://schemas.microsoft.com/office/infopath/2007/PartnerControls"/>
-    </pef3073c00d0478f9309cb7481f1c06f>
-    <bae8dbfb9d2943418f2fcf8e1975c6e3 xmlns="f3afbf2d-beef-446a-8758-84a7ca43c063">
-      <Terms xmlns="http://schemas.microsoft.com/office/infopath/2007/PartnerControls"/>
-    </bae8dbfb9d2943418f2fcf8e1975c6e3>
-    <_dlc_DocId xmlns="9fd4432a-144b-407a-b5c0-3f4ed8389bd1">OOED-1804857394-12544</_dlc_DocId>
-    <_dlc_DocIdUrl xmlns="9fd4432a-144b-407a-b5c0-3f4ed8389bd1">
-      <Url>https://minderoofoundationtrust.sharepoint.com/sites/OOE/oo/_layouts/15/DocIdRedir.aspx?ID=OOED-1804857394-12544</Url>
-      <Description>OOED-1804857394-12544</Description>
-    </_dlc_DocIdUrl>
-  </documentManagement>
-</p:properties>
-</file>
-
-<file path=customXml/item5.xml><?xml version="1.0" encoding="utf-8"?>
-<?mso-contentType ?>
-<spe:Receivers xmlns:spe="http://schemas.microsoft.com/sharepoint/events">
-  <Receiver>
-    <Name>Document ID Generator</Name>
-    <Synchronization>Synchronous</Synchronization>
-    <Type>10001</Type>
-    <SequenceNumber>1000</SequenceNumber>
-    <Url/>
-    <Assembly>Microsoft.Office.DocumentManagement, Version=16.0.0.0, Culture=neutral, PublicKeyToken=71e9bce111e9429c</Assembly>
-    <Class>Microsoft.Office.DocumentManagement.Internal.DocIdHandler</Class>
-    <Data/>
-    <Filter/>
-  </Receiver>
-  <Receiver>
-    <Name>Document ID Generator</Name>
-    <Synchronization>Synchronous</Synchronization>
-    <Type>10002</Type>
-    <SequenceNumber>1001</SequenceNumber>
-    <Url/>
-    <Assembly>Microsoft.Office.DocumentManagement, Version=16.0.0.0, Culture=neutral, PublicKeyToken=71e9bce111e9429c</Assembly>
-    <Class>Microsoft.Office.DocumentManagement.Internal.DocIdHandler</Class>
-    <Data/>
-    <Filter/>
-  </Receiver>
-  <Receiver>
-    <Name>Document ID Generator</Name>
-    <Synchronization>Synchronous</Synchronization>
-    <Type>10004</Type>
-    <SequenceNumber>1002</SequenceNumber>
-    <Url/>
-    <Assembly>Microsoft.Office.DocumentManagement, Version=16.0.0.0, Culture=neutral, PublicKeyToken=71e9bce111e9429c</Assembly>
-    <Class>Microsoft.Office.DocumentManagement.Internal.DocIdHandler</Class>
-    <Data/>
-    <Filter/>
-  </Receiver>
-  <Receiver>
-    <Name>Document ID Generator</Name>
-    <Synchronization>Synchronous</Synchronization>
-    <Type>10006</Type>
-    <SequenceNumber>1003</SequenceNumber>
-    <Url/>
-    <Assembly>Microsoft.Office.DocumentManagement, Version=16.0.0.0, Culture=neutral, PublicKeyToken=71e9bce111e9429c</Assembly>
-    <Class>Microsoft.Office.DocumentManagement.Internal.DocIdHandler</Class>
-    <Data/>
-    <Filter/>
-  </Receiver>
-</spe:Receivers>
-</file>
-
 <file path=customXml/itemProps1.xml><?xml version="1.0" encoding="utf-8"?>
 <ds:datastoreItem xmlns:ds="http://schemas.openxmlformats.org/officeDocument/2006/customXml" ds:itemID="{920B81B2-2919-403C-8203-64145A41F1F1}">
   <ds:schemaRefs>
@@ -41262,25 +42489,6 @@
 </file>
 
 <file path=customXml/itemProps2.xml><?xml version="1.0" encoding="utf-8"?>
-<ds:datastoreItem xmlns:ds="http://schemas.openxmlformats.org/officeDocument/2006/customXml" ds:itemID="{B5B596C8-1159-469B-AA3E-BA8D32107128}">
-  <ds:schemaRefs>
-    <ds:schemaRef ds:uri="http://schemas.microsoft.com/office/2006/metadata/contentType"/>
-    <ds:schemaRef ds:uri="http://schemas.microsoft.com/office/2006/metadata/properties/metaAttributes"/>
-    <ds:schemaRef ds:uri="http://www.w3.org/2001/XMLSchema"/>
-    <ds:schemaRef ds:uri="http://schemas.microsoft.com/office/2006/metadata/properties"/>
-    <ds:schemaRef ds:uri="f3afbf2d-beef-446a-8758-84a7ca43c063"/>
-    <ds:schemaRef ds:uri="9fd4432a-144b-407a-b5c0-3f4ed8389bd1"/>
-    <ds:schemaRef ds:uri="http://schemas.microsoft.com/office/2006/documentManagement/types"/>
-    <ds:schemaRef ds:uri="http://schemas.microsoft.com/office/infopath/2007/PartnerControls"/>
-    <ds:schemaRef ds:uri="http://schemas.openxmlformats.org/package/2006/metadata/core-properties"/>
-    <ds:schemaRef ds:uri="http://purl.org/dc/elements/1.1/"/>
-    <ds:schemaRef ds:uri="http://purl.org/dc/terms/"/>
-    <ds:schemaRef ds:uri="http://schemas.microsoft.com/internal/obd"/>
-  </ds:schemaRefs>
-</ds:datastoreItem>
-</file>
-
-<file path=customXml/itemProps3.xml><?xml version="1.0" encoding="utf-8"?>
 <ds:datastoreItem xmlns:ds="http://schemas.openxmlformats.org/officeDocument/2006/customXml" ds:itemID="{85DE8646-0884-464F-84E6-2794DE2F9EEA}">
   <ds:schemaRefs>
     <ds:schemaRef ds:uri="http://schemas.microsoft.com/sharepoint/v3/contenttype/forms"/>
@@ -41288,27 +42496,46 @@
 </ds:datastoreItem>
 </file>
 
+<file path=customXml/itemProps3.xml><?xml version="1.0" encoding="utf-8"?>
+<ds:datastoreItem xmlns:ds="http://schemas.openxmlformats.org/officeDocument/2006/customXml" ds:itemID="{AC69F26C-E4C2-4558-A8F3-CECD12FD5324}">
+  <ds:schemaRefs>
+    <ds:schemaRef ds:uri="http://schemas.microsoft.com/sharepoint/events"/>
+  </ds:schemaRefs>
+</ds:datastoreItem>
+</file>
+
 <file path=customXml/itemProps4.xml><?xml version="1.0" encoding="utf-8"?>
 <ds:datastoreItem xmlns:ds="http://schemas.openxmlformats.org/officeDocument/2006/customXml" ds:itemID="{5424892E-6F5B-4B3D-A0B2-C94E0E70757D}">
   <ds:schemaRefs>
+    <ds:schemaRef ds:uri="9fd4432a-144b-407a-b5c0-3f4ed8389bd1"/>
+    <ds:schemaRef ds:uri="f3afbf2d-beef-446a-8758-84a7ca43c063"/>
+    <ds:schemaRef ds:uri="http://purl.org/dc/dcmitype/"/>
+    <ds:schemaRef ds:uri="http://purl.org/dc/elements/1.1/"/>
     <ds:schemaRef ds:uri="http://purl.org/dc/terms/"/>
     <ds:schemaRef ds:uri="http://schemas.microsoft.com/office/2006/documentManagement/types"/>
+    <ds:schemaRef ds:uri="http://schemas.microsoft.com/office/2006/metadata/properties"/>
+    <ds:schemaRef ds:uri="http://schemas.microsoft.com/office/infopath/2007/PartnerControls"/>
+    <ds:schemaRef ds:uri="http://schemas.openxmlformats.org/package/2006/metadata/core-properties"/>
     <ds:schemaRef ds:uri="http://www.w3.org/XML/1998/namespace"/>
-    <ds:schemaRef ds:uri="http://purl.org/dc/elements/1.1/"/>
-    <ds:schemaRef ds:uri="http://schemas.openxmlformats.org/package/2006/metadata/core-properties"/>
-    <ds:schemaRef ds:uri="http://schemas.microsoft.com/office/infopath/2007/PartnerControls"/>
-    <ds:schemaRef ds:uri="http://purl.org/dc/dcmitype/"/>
-    <ds:schemaRef ds:uri="9fd4432a-144b-407a-b5c0-3f4ed8389bd1"/>
-    <ds:schemaRef ds:uri="f3afbf2d-beef-446a-8758-84a7ca43c063"/>
-    <ds:schemaRef ds:uri="http://schemas.microsoft.com/office/2006/metadata/properties"/>
   </ds:schemaRefs>
 </ds:datastoreItem>
 </file>
 
 <file path=customXml/itemProps5.xml><?xml version="1.0" encoding="utf-8"?>
-<ds:datastoreItem xmlns:ds="http://schemas.openxmlformats.org/officeDocument/2006/customXml" ds:itemID="{AC69F26C-E4C2-4558-A8F3-CECD12FD5324}">
+<ds:datastoreItem xmlns:ds="http://schemas.openxmlformats.org/officeDocument/2006/customXml" ds:itemID="{B5B596C8-1159-469B-AA3E-BA8D32107128}">
   <ds:schemaRefs>
-    <ds:schemaRef ds:uri="http://schemas.microsoft.com/sharepoint/events"/>
+    <ds:schemaRef ds:uri="9fd4432a-144b-407a-b5c0-3f4ed8389bd1"/>
+    <ds:schemaRef ds:uri="f3afbf2d-beef-446a-8758-84a7ca43c063"/>
+    <ds:schemaRef ds:uri="http://purl.org/dc/elements/1.1/"/>
+    <ds:schemaRef ds:uri="http://purl.org/dc/terms/"/>
+    <ds:schemaRef ds:uri="http://schemas.microsoft.com/internal/obd"/>
+    <ds:schemaRef ds:uri="http://schemas.microsoft.com/office/2006/documentManagement/types"/>
+    <ds:schemaRef ds:uri="http://schemas.microsoft.com/office/2006/metadata/contentType"/>
+    <ds:schemaRef ds:uri="http://schemas.microsoft.com/office/2006/metadata/properties"/>
+    <ds:schemaRef ds:uri="http://schemas.microsoft.com/office/2006/metadata/properties/metaAttributes"/>
+    <ds:schemaRef ds:uri="http://schemas.microsoft.com/office/infopath/2007/PartnerControls"/>
+    <ds:schemaRef ds:uri="http://schemas.openxmlformats.org/package/2006/metadata/core-properties"/>
+    <ds:schemaRef ds:uri="http://www.w3.org/2001/XMLSchema"/>
   </ds:schemaRefs>
 </ds:datastoreItem>
 </file>
</xml_diff>

<commit_message>
yet another final upload ; this time for real
</commit_message>
<xml_diff>
--- a/PMLG talk.pptx
+++ b/PMLG talk.pptx
@@ -163,8 +163,7 @@
 <file path=ppt/revisionInfo.xml><?xml version="1.0" encoding="utf-8"?>
 <p1510:revInfo xmlns:a="http://schemas.openxmlformats.org/drawingml/2006/main" xmlns:r="http://schemas.openxmlformats.org/officeDocument/2006/relationships" xmlns:p1510="http://schemas.microsoft.com/office/powerpoint/2015/10/main">
   <p1510:revLst>
-    <p1510:client id="{292EE10E-3F08-0641-B982-B0567F30FFDF}" v="23" dt="2023-06-19T04:11:05.307"/>
-    <p1510:client id="{80D561A8-B16A-4DB0-ADD0-1D4EA6CA7967}" v="1637" dt="2023-06-19T05:29:47.892"/>
+    <p1510:client id="{80D561A8-B16A-4DB0-ADD0-1D4EA6CA7967}" v="1740" dt="2023-06-21T02:52:30.335"/>
   </p1510:revLst>
 </p1510:revInfo>
 </file>
@@ -247,7 +246,7 @@
   <pc:docChgLst>
     <pc:chgData name="Philipp Bayer" userId="f1ce6f2d-d6ba-4d38-8b9a-d25f69ad1513" providerId="ADAL" clId="{80D561A8-B16A-4DB0-ADD0-1D4EA6CA7967}"/>
     <pc:docChg chg="undo custSel addSld delSld modSld modMainMaster">
-      <pc:chgData name="Philipp Bayer" userId="f1ce6f2d-d6ba-4d38-8b9a-d25f69ad1513" providerId="ADAL" clId="{80D561A8-B16A-4DB0-ADD0-1D4EA6CA7967}" dt="2023-06-19T05:30:35.673" v="2230" actId="20577"/>
+      <pc:chgData name="Philipp Bayer" userId="f1ce6f2d-d6ba-4d38-8b9a-d25f69ad1513" providerId="ADAL" clId="{80D561A8-B16A-4DB0-ADD0-1D4EA6CA7967}" dt="2023-06-21T02:52:30.335" v="2333" actId="20577"/>
       <pc:docMkLst>
         <pc:docMk/>
       </pc:docMkLst>
@@ -524,7 +523,7 @@
         </pc:extLst>
       </pc:sldChg>
       <pc:sldChg chg="modSp mod modAnim modNotesTx">
-        <pc:chgData name="Philipp Bayer" userId="f1ce6f2d-d6ba-4d38-8b9a-d25f69ad1513" providerId="ADAL" clId="{80D561A8-B16A-4DB0-ADD0-1D4EA6CA7967}" dt="2023-06-19T05:22:24.180" v="1936" actId="20577"/>
+        <pc:chgData name="Philipp Bayer" userId="f1ce6f2d-d6ba-4d38-8b9a-d25f69ad1513" providerId="ADAL" clId="{80D561A8-B16A-4DB0-ADD0-1D4EA6CA7967}" dt="2023-06-21T02:48:13.608" v="2324" actId="20577"/>
         <pc:sldMkLst>
           <pc:docMk/>
           <pc:sldMk cId="1077690869" sldId="288"/>
@@ -538,7 +537,7 @@
           </ac:spMkLst>
         </pc:spChg>
         <pc:spChg chg="mod">
-          <ac:chgData name="Philipp Bayer" userId="f1ce6f2d-d6ba-4d38-8b9a-d25f69ad1513" providerId="ADAL" clId="{80D561A8-B16A-4DB0-ADD0-1D4EA6CA7967}" dt="2023-06-19T05:22:20.847" v="1930" actId="21"/>
+          <ac:chgData name="Philipp Bayer" userId="f1ce6f2d-d6ba-4d38-8b9a-d25f69ad1513" providerId="ADAL" clId="{80D561A8-B16A-4DB0-ADD0-1D4EA6CA7967}" dt="2023-06-21T02:48:13.608" v="2324" actId="20577"/>
           <ac:spMkLst>
             <pc:docMk/>
             <pc:sldMk cId="1077690869" sldId="288"/>
@@ -921,7 +920,7 @@
         </pc:spChg>
       </pc:sldChg>
       <pc:sldChg chg="modSp add modAnim">
-        <pc:chgData name="Philipp Bayer" userId="f1ce6f2d-d6ba-4d38-8b9a-d25f69ad1513" providerId="ADAL" clId="{80D561A8-B16A-4DB0-ADD0-1D4EA6CA7967}" dt="2023-06-19T05:27:12.736" v="2094" actId="207"/>
+        <pc:chgData name="Philipp Bayer" userId="f1ce6f2d-d6ba-4d38-8b9a-d25f69ad1513" providerId="ADAL" clId="{80D561A8-B16A-4DB0-ADD0-1D4EA6CA7967}" dt="2023-06-21T02:52:30.335" v="2333" actId="20577"/>
         <pc:sldMkLst>
           <pc:docMk/>
           <pc:sldMk cId="22732068" sldId="8417"/>
@@ -935,7 +934,7 @@
           </ac:spMkLst>
         </pc:spChg>
         <pc:spChg chg="mod">
-          <ac:chgData name="Philipp Bayer" userId="f1ce6f2d-d6ba-4d38-8b9a-d25f69ad1513" providerId="ADAL" clId="{80D561A8-B16A-4DB0-ADD0-1D4EA6CA7967}" dt="2023-06-19T05:27:12.736" v="2094" actId="207"/>
+          <ac:chgData name="Philipp Bayer" userId="f1ce6f2d-d6ba-4d38-8b9a-d25f69ad1513" providerId="ADAL" clId="{80D561A8-B16A-4DB0-ADD0-1D4EA6CA7967}" dt="2023-06-21T02:52:30.335" v="2333" actId="20577"/>
           <ac:spMkLst>
             <pc:docMk/>
             <pc:sldMk cId="22732068" sldId="8417"/>
@@ -1448,7 +1447,7 @@
           <a:p>
             <a:fld id="{48F0A80C-92E7-DB49-AE63-B2F956E951EE}" type="datetimeFigureOut">
               <a:rPr lang="en-US" smtClean="0"/>
-              <a:t>6/19/2023</a:t>
+              <a:t>6/21/2023</a:t>
             </a:fld>
             <a:endParaRPr lang="en-US"/>
           </a:p>
@@ -1641,7 +1640,7 @@
           <a:p>
             <a:fld id="{A7440A9C-2DCF-4342-81E6-FCA45242C801}" type="datetimeFigureOut">
               <a:rPr lang="en-US" smtClean="0"/>
-              <a:t>6/19/2023</a:t>
+              <a:t>6/21/2023</a:t>
             </a:fld>
             <a:endParaRPr lang="en-US"/>
           </a:p>
@@ -35379,7 +35378,7 @@
           <a:p>
             <a:r>
               <a:rPr lang="en-US" dirty="0"/>
-              <a:t>The biggest problem remains:</a:t>
+              <a:t>The biggest problems:</a:t>
             </a:r>
           </a:p>
           <a:p>
@@ -35397,7 +35396,11 @@
           <a:p>
             <a:r>
               <a:rPr lang="en-US" i="1" dirty="0"/>
-              <a:t>The way GPTs/LLMs are currently trained means we will never get to 100%.</a:t>
+              <a:t>The way GPTs/LLMs are currently trained means we will never get to 100</a:t>
+            </a:r>
+            <a:r>
+              <a:rPr lang="en-US" i="1"/>
+              <a:t>% truth.</a:t>
             </a:r>
             <a:br>
               <a:rPr lang="en-US" i="1" dirty="0"/>
@@ -36267,6 +36270,23 @@
           <a:p>
             <a:r>
               <a:rPr lang="en-US" dirty="0"/>
+              <a:t>Partner-in-writing: editing text for clarity, for structure (-&gt; </a:t>
+            </a:r>
+            <a:r>
+              <a:rPr lang="en-US" dirty="0" err="1"/>
+              <a:t>manubot</a:t>
+            </a:r>
+            <a:r>
+              <a:rPr lang="en-US" dirty="0"/>
+              <a:t>-ai-editor)</a:t>
+            </a:r>
+          </a:p>
+          <a:p>
+            <a:endParaRPr lang="en-US" dirty="0"/>
+          </a:p>
+          <a:p>
+            <a:r>
+              <a:rPr lang="en-US" dirty="0"/>
               <a:t>Do you have large amounts of unstructured text that you’d like to get into a structured format? </a:t>
             </a:r>
             <a:br>
@@ -36538,6 +36558,55 @@
                                           <p:spTgt spid="8">
                                             <p:txEl>
                                               <p:pRg st="4" end="4"/>
+                                            </p:txEl>
+                                          </p:spTgt>
+                                        </p:tgtEl>
+                                        <p:attrNameLst>
+                                          <p:attrName>style.visibility</p:attrName>
+                                        </p:attrNameLst>
+                                      </p:cBhvr>
+                                      <p:to>
+                                        <p:strVal val="visible"/>
+                                      </p:to>
+                                    </p:set>
+                                  </p:childTnLst>
+                                </p:cTn>
+                              </p:par>
+                            </p:childTnLst>
+                          </p:cTn>
+                        </p:par>
+                      </p:childTnLst>
+                    </p:cTn>
+                  </p:par>
+                  <p:par>
+                    <p:cTn id="15" fill="hold">
+                      <p:stCondLst>
+                        <p:cond delay="indefinite"/>
+                      </p:stCondLst>
+                      <p:childTnLst>
+                        <p:par>
+                          <p:cTn id="16" fill="hold">
+                            <p:stCondLst>
+                              <p:cond delay="0"/>
+                            </p:stCondLst>
+                            <p:childTnLst>
+                              <p:par>
+                                <p:cTn id="17" presetID="1" presetClass="entr" presetSubtype="0" fill="hold" grpId="0" nodeType="clickEffect">
+                                  <p:stCondLst>
+                                    <p:cond delay="0"/>
+                                  </p:stCondLst>
+                                  <p:childTnLst>
+                                    <p:set>
+                                      <p:cBhvr>
+                                        <p:cTn id="18" dur="1" fill="hold">
+                                          <p:stCondLst>
+                                            <p:cond delay="0"/>
+                                          </p:stCondLst>
+                                        </p:cTn>
+                                        <p:tgtEl>
+                                          <p:spTgt spid="8">
+                                            <p:txEl>
+                                              <p:pRg st="6" end="6"/>
                                             </p:txEl>
                                           </p:spTgt>
                                         </p:tgtEl>
@@ -42151,11 +42220,6 @@
 
 <file path=customXml/item1.xml><?xml version="1.0" encoding="utf-8"?>
 <?mso-contentType ?>
-<SharedContentType xmlns="Microsoft.SharePoint.Taxonomy.ContentTypeSync" SourceId="a73a0f41-acff-4f94-90ca-11a2a97b1bb5" ContentTypeId="0x01010011BE212375D21747994FD40CFDB2CFA102" PreviousValue="false"/>
-</file>
-
-<file path=customXml/item2.xml><?xml version="1.0" encoding="utf-8"?>
-<?mso-contentType ?>
 <FormTemplates xmlns="http://schemas.microsoft.com/sharepoint/v3/contenttype/forms">
   <Display>DocumentLibraryForm</Display>
   <Edit>DocumentLibraryForm</Edit>
@@ -42163,88 +42227,12 @@
 </FormTemplates>
 </file>
 
-<file path=customXml/item3.xml><?xml version="1.0" encoding="utf-8"?>
+<file path=customXml/item2.xml><?xml version="1.0" encoding="utf-8"?>
 <?mso-contentType ?>
-<spe:Receivers xmlns:spe="http://schemas.microsoft.com/sharepoint/events">
-  <Receiver>
-    <Name>Document ID Generator</Name>
-    <Synchronization>Synchronous</Synchronization>
-    <Type>10001</Type>
-    <SequenceNumber>1000</SequenceNumber>
-    <Url/>
-    <Assembly>Microsoft.Office.DocumentManagement, Version=16.0.0.0, Culture=neutral, PublicKeyToken=71e9bce111e9429c</Assembly>
-    <Class>Microsoft.Office.DocumentManagement.Internal.DocIdHandler</Class>
-    <Data/>
-    <Filter/>
-  </Receiver>
-  <Receiver>
-    <Name>Document ID Generator</Name>
-    <Synchronization>Synchronous</Synchronization>
-    <Type>10002</Type>
-    <SequenceNumber>1001</SequenceNumber>
-    <Url/>
-    <Assembly>Microsoft.Office.DocumentManagement, Version=16.0.0.0, Culture=neutral, PublicKeyToken=71e9bce111e9429c</Assembly>
-    <Class>Microsoft.Office.DocumentManagement.Internal.DocIdHandler</Class>
-    <Data/>
-    <Filter/>
-  </Receiver>
-  <Receiver>
-    <Name>Document ID Generator</Name>
-    <Synchronization>Synchronous</Synchronization>
-    <Type>10004</Type>
-    <SequenceNumber>1002</SequenceNumber>
-    <Url/>
-    <Assembly>Microsoft.Office.DocumentManagement, Version=16.0.0.0, Culture=neutral, PublicKeyToken=71e9bce111e9429c</Assembly>
-    <Class>Microsoft.Office.DocumentManagement.Internal.DocIdHandler</Class>
-    <Data/>
-    <Filter/>
-  </Receiver>
-  <Receiver>
-    <Name>Document ID Generator</Name>
-    <Synchronization>Synchronous</Synchronization>
-    <Type>10006</Type>
-    <SequenceNumber>1003</SequenceNumber>
-    <Url/>
-    <Assembly>Microsoft.Office.DocumentManagement, Version=16.0.0.0, Culture=neutral, PublicKeyToken=71e9bce111e9429c</Assembly>
-    <Class>Microsoft.Office.DocumentManagement.Internal.DocIdHandler</Class>
-    <Data/>
-    <Filter/>
-  </Receiver>
-</spe:Receivers>
+<SharedContentType xmlns="Microsoft.SharePoint.Taxonomy.ContentTypeSync" SourceId="a73a0f41-acff-4f94-90ca-11a2a97b1bb5" ContentTypeId="0x01010011BE212375D21747994FD40CFDB2CFA102" PreviousValue="false"/>
 </file>
 
-<file path=customXml/item4.xml><?xml version="1.0" encoding="utf-8"?>
-<p:properties xmlns:p="http://schemas.microsoft.com/office/2006/metadata/properties" xmlns:xsi="http://www.w3.org/2001/XMLSchema-instance" xmlns:pc="http://schemas.microsoft.com/office/infopath/2007/PartnerControls">
-  <documentManagement>
-    <TaxCatchAll xmlns="f3afbf2d-beef-446a-8758-84a7ca43c063" xsi:nil="true"/>
-    <ExternalReference xmlns="f3afbf2d-beef-446a-8758-84a7ca43c063" xsi:nil="true"/>
-    <ReferenceDate xmlns="f3afbf2d-beef-446a-8758-84a7ca43c063" xsi:nil="true"/>
-    <a56f4471668a4971aa5e522031e743d4 xmlns="f3afbf2d-beef-446a-8758-84a7ca43c063">
-      <Terms xmlns="http://schemas.microsoft.com/office/infopath/2007/PartnerControls"/>
-    </a56f4471668a4971aa5e522031e743d4>
-    <DocumentDescription xmlns="f3afbf2d-beef-446a-8758-84a7ca43c063" xsi:nil="true"/>
-    <c74b6a8103324c29a83f9d5791147f18 xmlns="f3afbf2d-beef-446a-8758-84a7ca43c063">
-      <Terms xmlns="http://schemas.microsoft.com/office/infopath/2007/PartnerControls"/>
-    </c74b6a8103324c29a83f9d5791147f18>
-    <k3db5a6ad8144d86b71ffb3933be1fde xmlns="f3afbf2d-beef-446a-8758-84a7ca43c063">
-      <Terms xmlns="http://schemas.microsoft.com/office/infopath/2007/PartnerControls"/>
-    </k3db5a6ad8144d86b71ffb3933be1fde>
-    <pef3073c00d0478f9309cb7481f1c06f xmlns="f3afbf2d-beef-446a-8758-84a7ca43c063">
-      <Terms xmlns="http://schemas.microsoft.com/office/infopath/2007/PartnerControls"/>
-    </pef3073c00d0478f9309cb7481f1c06f>
-    <bae8dbfb9d2943418f2fcf8e1975c6e3 xmlns="f3afbf2d-beef-446a-8758-84a7ca43c063">
-      <Terms xmlns="http://schemas.microsoft.com/office/infopath/2007/PartnerControls"/>
-    </bae8dbfb9d2943418f2fcf8e1975c6e3>
-    <_dlc_DocId xmlns="9fd4432a-144b-407a-b5c0-3f4ed8389bd1">OOED-1804857394-12544</_dlc_DocId>
-    <_dlc_DocIdUrl xmlns="9fd4432a-144b-407a-b5c0-3f4ed8389bd1">
-      <Url>https://minderoofoundationtrust.sharepoint.com/sites/OOE/oo/_layouts/15/DocIdRedir.aspx?ID=OOED-1804857394-12544</Url>
-      <Description>OOED-1804857394-12544</Description>
-    </_dlc_DocIdUrl>
-  </documentManagement>
-</p:properties>
-</file>
-
-<file path=customXml/item5.xml><?xml version="1.0" encoding="utf-8"?>
+<file path=customXml/item3.xml><?xml version="1.0" encoding="utf-8"?>
 <ct:contentTypeSchema xmlns:ct="http://schemas.microsoft.com/office/2006/metadata/contentType" xmlns:ma="http://schemas.microsoft.com/office/2006/metadata/properties/metaAttributes" ct:_="" ma:_="" ma:contentTypeName="Word Document" ma:contentTypeID="0x01010011BE212375D21747994FD40CFDB2CFA1020027E56D3C45A4904A9A477F7951F07491" ma:contentTypeVersion="0" ma:contentTypeDescription="" ma:contentTypeScope="" ma:versionID="95d6ff7a7bb9ab199f744e617cce672d">
   <xsd:schema xmlns:xsd="http://www.w3.org/2001/XMLSchema" xmlns:xs="http://www.w3.org/2001/XMLSchema" xmlns:p="http://schemas.microsoft.com/office/2006/metadata/properties" xmlns:ns2="f3afbf2d-beef-446a-8758-84a7ca43c063" xmlns:ns3="9fd4432a-144b-407a-b5c0-3f4ed8389bd1" targetNamespace="http://schemas.microsoft.com/office/2006/metadata/properties" ma:root="true" ma:fieldsID="73aa7b01b5becf7177ac312d4322327f" ns2:_="" ns3:_="">
     <xsd:import namespace="f3afbf2d-beef-446a-8758-84a7ca43c063"/>
@@ -42480,7 +42468,96 @@
 </ct:contentTypeSchema>
 </file>
 
+<file path=customXml/item4.xml><?xml version="1.0" encoding="utf-8"?>
+<p:properties xmlns:p="http://schemas.microsoft.com/office/2006/metadata/properties" xmlns:xsi="http://www.w3.org/2001/XMLSchema-instance" xmlns:pc="http://schemas.microsoft.com/office/infopath/2007/PartnerControls">
+  <documentManagement>
+    <TaxCatchAll xmlns="f3afbf2d-beef-446a-8758-84a7ca43c063" xsi:nil="true"/>
+    <ExternalReference xmlns="f3afbf2d-beef-446a-8758-84a7ca43c063" xsi:nil="true"/>
+    <ReferenceDate xmlns="f3afbf2d-beef-446a-8758-84a7ca43c063" xsi:nil="true"/>
+    <a56f4471668a4971aa5e522031e743d4 xmlns="f3afbf2d-beef-446a-8758-84a7ca43c063">
+      <Terms xmlns="http://schemas.microsoft.com/office/infopath/2007/PartnerControls"/>
+    </a56f4471668a4971aa5e522031e743d4>
+    <DocumentDescription xmlns="f3afbf2d-beef-446a-8758-84a7ca43c063" xsi:nil="true"/>
+    <c74b6a8103324c29a83f9d5791147f18 xmlns="f3afbf2d-beef-446a-8758-84a7ca43c063">
+      <Terms xmlns="http://schemas.microsoft.com/office/infopath/2007/PartnerControls"/>
+    </c74b6a8103324c29a83f9d5791147f18>
+    <k3db5a6ad8144d86b71ffb3933be1fde xmlns="f3afbf2d-beef-446a-8758-84a7ca43c063">
+      <Terms xmlns="http://schemas.microsoft.com/office/infopath/2007/PartnerControls"/>
+    </k3db5a6ad8144d86b71ffb3933be1fde>
+    <pef3073c00d0478f9309cb7481f1c06f xmlns="f3afbf2d-beef-446a-8758-84a7ca43c063">
+      <Terms xmlns="http://schemas.microsoft.com/office/infopath/2007/PartnerControls"/>
+    </pef3073c00d0478f9309cb7481f1c06f>
+    <bae8dbfb9d2943418f2fcf8e1975c6e3 xmlns="f3afbf2d-beef-446a-8758-84a7ca43c063">
+      <Terms xmlns="http://schemas.microsoft.com/office/infopath/2007/PartnerControls"/>
+    </bae8dbfb9d2943418f2fcf8e1975c6e3>
+    <_dlc_DocId xmlns="9fd4432a-144b-407a-b5c0-3f4ed8389bd1">OOED-1804857394-12544</_dlc_DocId>
+    <_dlc_DocIdUrl xmlns="9fd4432a-144b-407a-b5c0-3f4ed8389bd1">
+      <Url>https://minderoofoundationtrust.sharepoint.com/sites/OOE/oo/_layouts/15/DocIdRedir.aspx?ID=OOED-1804857394-12544</Url>
+      <Description>OOED-1804857394-12544</Description>
+    </_dlc_DocIdUrl>
+  </documentManagement>
+</p:properties>
+</file>
+
+<file path=customXml/item5.xml><?xml version="1.0" encoding="utf-8"?>
+<?mso-contentType ?>
+<spe:Receivers xmlns:spe="http://schemas.microsoft.com/sharepoint/events">
+  <Receiver>
+    <Name>Document ID Generator</Name>
+    <Synchronization>Synchronous</Synchronization>
+    <Type>10001</Type>
+    <SequenceNumber>1000</SequenceNumber>
+    <Url/>
+    <Assembly>Microsoft.Office.DocumentManagement, Version=16.0.0.0, Culture=neutral, PublicKeyToken=71e9bce111e9429c</Assembly>
+    <Class>Microsoft.Office.DocumentManagement.Internal.DocIdHandler</Class>
+    <Data/>
+    <Filter/>
+  </Receiver>
+  <Receiver>
+    <Name>Document ID Generator</Name>
+    <Synchronization>Synchronous</Synchronization>
+    <Type>10002</Type>
+    <SequenceNumber>1001</SequenceNumber>
+    <Url/>
+    <Assembly>Microsoft.Office.DocumentManagement, Version=16.0.0.0, Culture=neutral, PublicKeyToken=71e9bce111e9429c</Assembly>
+    <Class>Microsoft.Office.DocumentManagement.Internal.DocIdHandler</Class>
+    <Data/>
+    <Filter/>
+  </Receiver>
+  <Receiver>
+    <Name>Document ID Generator</Name>
+    <Synchronization>Synchronous</Synchronization>
+    <Type>10004</Type>
+    <SequenceNumber>1002</SequenceNumber>
+    <Url/>
+    <Assembly>Microsoft.Office.DocumentManagement, Version=16.0.0.0, Culture=neutral, PublicKeyToken=71e9bce111e9429c</Assembly>
+    <Class>Microsoft.Office.DocumentManagement.Internal.DocIdHandler</Class>
+    <Data/>
+    <Filter/>
+  </Receiver>
+  <Receiver>
+    <Name>Document ID Generator</Name>
+    <Synchronization>Synchronous</Synchronization>
+    <Type>10006</Type>
+    <SequenceNumber>1003</SequenceNumber>
+    <Url/>
+    <Assembly>Microsoft.Office.DocumentManagement, Version=16.0.0.0, Culture=neutral, PublicKeyToken=71e9bce111e9429c</Assembly>
+    <Class>Microsoft.Office.DocumentManagement.Internal.DocIdHandler</Class>
+    <Data/>
+    <Filter/>
+  </Receiver>
+</spe:Receivers>
+</file>
+
 <file path=customXml/itemProps1.xml><?xml version="1.0" encoding="utf-8"?>
+<ds:datastoreItem xmlns:ds="http://schemas.openxmlformats.org/officeDocument/2006/customXml" ds:itemID="{85DE8646-0884-464F-84E6-2794DE2F9EEA}">
+  <ds:schemaRefs>
+    <ds:schemaRef ds:uri="http://schemas.microsoft.com/sharepoint/v3/contenttype/forms"/>
+  </ds:schemaRefs>
+</ds:datastoreItem>
+</file>
+
+<file path=customXml/itemProps2.xml><?xml version="1.0" encoding="utf-8"?>
 <ds:datastoreItem xmlns:ds="http://schemas.openxmlformats.org/officeDocument/2006/customXml" ds:itemID="{920B81B2-2919-403C-8203-64145A41F1F1}">
   <ds:schemaRefs>
     <ds:schemaRef ds:uri="Microsoft.SharePoint.Taxonomy.ContentTypeSync"/>
@@ -42488,18 +42565,21 @@
 </ds:datastoreItem>
 </file>
 
-<file path=customXml/itemProps2.xml><?xml version="1.0" encoding="utf-8"?>
-<ds:datastoreItem xmlns:ds="http://schemas.openxmlformats.org/officeDocument/2006/customXml" ds:itemID="{85DE8646-0884-464F-84E6-2794DE2F9EEA}">
+<file path=customXml/itemProps3.xml><?xml version="1.0" encoding="utf-8"?>
+<ds:datastoreItem xmlns:ds="http://schemas.openxmlformats.org/officeDocument/2006/customXml" ds:itemID="{B5B596C8-1159-469B-AA3E-BA8D32107128}">
   <ds:schemaRefs>
-    <ds:schemaRef ds:uri="http://schemas.microsoft.com/sharepoint/v3/contenttype/forms"/>
-  </ds:schemaRefs>
-</ds:datastoreItem>
-</file>
-
-<file path=customXml/itemProps3.xml><?xml version="1.0" encoding="utf-8"?>
-<ds:datastoreItem xmlns:ds="http://schemas.openxmlformats.org/officeDocument/2006/customXml" ds:itemID="{AC69F26C-E4C2-4558-A8F3-CECD12FD5324}">
-  <ds:schemaRefs>
-    <ds:schemaRef ds:uri="http://schemas.microsoft.com/sharepoint/events"/>
+    <ds:schemaRef ds:uri="9fd4432a-144b-407a-b5c0-3f4ed8389bd1"/>
+    <ds:schemaRef ds:uri="f3afbf2d-beef-446a-8758-84a7ca43c063"/>
+    <ds:schemaRef ds:uri="http://purl.org/dc/elements/1.1/"/>
+    <ds:schemaRef ds:uri="http://purl.org/dc/terms/"/>
+    <ds:schemaRef ds:uri="http://schemas.microsoft.com/internal/obd"/>
+    <ds:schemaRef ds:uri="http://schemas.microsoft.com/office/2006/documentManagement/types"/>
+    <ds:schemaRef ds:uri="http://schemas.microsoft.com/office/2006/metadata/contentType"/>
+    <ds:schemaRef ds:uri="http://schemas.microsoft.com/office/2006/metadata/properties"/>
+    <ds:schemaRef ds:uri="http://schemas.microsoft.com/office/2006/metadata/properties/metaAttributes"/>
+    <ds:schemaRef ds:uri="http://schemas.microsoft.com/office/infopath/2007/PartnerControls"/>
+    <ds:schemaRef ds:uri="http://schemas.openxmlformats.org/package/2006/metadata/core-properties"/>
+    <ds:schemaRef ds:uri="http://www.w3.org/2001/XMLSchema"/>
   </ds:schemaRefs>
 </ds:datastoreItem>
 </file>
@@ -42522,20 +42602,9 @@
 </file>
 
 <file path=customXml/itemProps5.xml><?xml version="1.0" encoding="utf-8"?>
-<ds:datastoreItem xmlns:ds="http://schemas.openxmlformats.org/officeDocument/2006/customXml" ds:itemID="{B5B596C8-1159-469B-AA3E-BA8D32107128}">
+<ds:datastoreItem xmlns:ds="http://schemas.openxmlformats.org/officeDocument/2006/customXml" ds:itemID="{AC69F26C-E4C2-4558-A8F3-CECD12FD5324}">
   <ds:schemaRefs>
-    <ds:schemaRef ds:uri="9fd4432a-144b-407a-b5c0-3f4ed8389bd1"/>
-    <ds:schemaRef ds:uri="f3afbf2d-beef-446a-8758-84a7ca43c063"/>
-    <ds:schemaRef ds:uri="http://purl.org/dc/elements/1.1/"/>
-    <ds:schemaRef ds:uri="http://purl.org/dc/terms/"/>
-    <ds:schemaRef ds:uri="http://schemas.microsoft.com/internal/obd"/>
-    <ds:schemaRef ds:uri="http://schemas.microsoft.com/office/2006/documentManagement/types"/>
-    <ds:schemaRef ds:uri="http://schemas.microsoft.com/office/2006/metadata/contentType"/>
-    <ds:schemaRef ds:uri="http://schemas.microsoft.com/office/2006/metadata/properties"/>
-    <ds:schemaRef ds:uri="http://schemas.microsoft.com/office/2006/metadata/properties/metaAttributes"/>
-    <ds:schemaRef ds:uri="http://schemas.microsoft.com/office/infopath/2007/PartnerControls"/>
-    <ds:schemaRef ds:uri="http://schemas.openxmlformats.org/package/2006/metadata/core-properties"/>
-    <ds:schemaRef ds:uri="http://www.w3.org/2001/XMLSchema"/>
+    <ds:schemaRef ds:uri="http://schemas.microsoft.com/sharepoint/events"/>
   </ds:schemaRefs>
 </ds:datastoreItem>
 </file>
</xml_diff>